<commit_message>
Updated ppt and notes
</commit_message>
<xml_diff>
--- a/DevOps.pptx
+++ b/DevOps.pptx
@@ -24,9 +24,12 @@
     <p:sldId id="273" r:id="rId18"/>
     <p:sldId id="274" r:id="rId19"/>
     <p:sldId id="275" r:id="rId20"/>
-    <p:sldId id="277" r:id="rId21"/>
-    <p:sldId id="276" r:id="rId22"/>
-    <p:sldId id="258" r:id="rId23"/>
+    <p:sldId id="279" r:id="rId21"/>
+    <p:sldId id="278" r:id="rId22"/>
+    <p:sldId id="277" r:id="rId23"/>
+    <p:sldId id="280" r:id="rId24"/>
+    <p:sldId id="281" r:id="rId25"/>
+    <p:sldId id="258" r:id="rId26"/>
   </p:sldIdLst>
   <p:sldSz cx="12192000" cy="6858000"/>
   <p:notesSz cx="6858000" cy="9144000"/>
@@ -127,7 +130,7 @@
   </p:defaultTextStyle>
   <p:extLst>
     <p:ext uri="{EFAFB233-063F-42B5-8137-9DF3F51BA10A}">
-      <p15:sldGuideLst xmlns:p15="http://schemas.microsoft.com/office/powerpoint/2012/main"/>
+      <p15:sldGuideLst xmlns:p15="http://schemas.microsoft.com/office/powerpoint/2012/main" xmlns=""/>
     </p:ext>
   </p:extLst>
 </p:presentation>
@@ -155,7 +158,7 @@
           <p:cNvPr id="2" name="Title 1">
             <a:extLst>
               <a:ext uri="{FF2B5EF4-FFF2-40B4-BE49-F238E27FC236}">
-                <a16:creationId xmlns:a16="http://schemas.microsoft.com/office/drawing/2014/main" id="{11334219-D3AB-41B2-8ADB-644EE7709C17}"/>
+                <a16:creationId xmlns:a16="http://schemas.microsoft.com/office/drawing/2014/main" xmlns="" id="{11334219-D3AB-41B2-8ADB-644EE7709C17}"/>
               </a:ext>
             </a:extLst>
           </p:cNvPr>
@@ -192,7 +195,7 @@
           <p:cNvPr id="3" name="Subtitle 2">
             <a:extLst>
               <a:ext uri="{FF2B5EF4-FFF2-40B4-BE49-F238E27FC236}">
-                <a16:creationId xmlns:a16="http://schemas.microsoft.com/office/drawing/2014/main" id="{95413D5A-B558-4E1E-A41A-E1A9FC472792}"/>
+                <a16:creationId xmlns:a16="http://schemas.microsoft.com/office/drawing/2014/main" xmlns="" id="{95413D5A-B558-4E1E-A41A-E1A9FC472792}"/>
               </a:ext>
             </a:extLst>
           </p:cNvPr>
@@ -262,7 +265,7 @@
           <p:cNvPr id="4" name="Date Placeholder 3">
             <a:extLst>
               <a:ext uri="{FF2B5EF4-FFF2-40B4-BE49-F238E27FC236}">
-                <a16:creationId xmlns:a16="http://schemas.microsoft.com/office/drawing/2014/main" id="{A690AC1A-AF18-4A14-9E8D-EB4B7B22D3B5}"/>
+                <a16:creationId xmlns:a16="http://schemas.microsoft.com/office/drawing/2014/main" xmlns="" id="{A690AC1A-AF18-4A14-9E8D-EB4B7B22D3B5}"/>
               </a:ext>
             </a:extLst>
           </p:cNvPr>
@@ -280,6 +283,7 @@
           <a:p>
             <a:fld id="{07C149BE-AC79-4548-8B96-E3E2494BEA7F}" type="datetimeFigureOut">
               <a:rPr lang="en-US" smtClean="0"/>
+              <a:pPr/>
               <a:t>5/30/2022</a:t>
             </a:fld>
             <a:endParaRPr lang="en-US"/>
@@ -291,7 +295,7 @@
           <p:cNvPr id="5" name="Footer Placeholder 4">
             <a:extLst>
               <a:ext uri="{FF2B5EF4-FFF2-40B4-BE49-F238E27FC236}">
-                <a16:creationId xmlns:a16="http://schemas.microsoft.com/office/drawing/2014/main" id="{FE625D2A-8362-4F07-B36B-0870C863ADF3}"/>
+                <a16:creationId xmlns:a16="http://schemas.microsoft.com/office/drawing/2014/main" xmlns="" id="{FE625D2A-8362-4F07-B36B-0870C863ADF3}"/>
               </a:ext>
             </a:extLst>
           </p:cNvPr>
@@ -316,7 +320,7 @@
           <p:cNvPr id="6" name="Slide Number Placeholder 5">
             <a:extLst>
               <a:ext uri="{FF2B5EF4-FFF2-40B4-BE49-F238E27FC236}">
-                <a16:creationId xmlns:a16="http://schemas.microsoft.com/office/drawing/2014/main" id="{1549429C-19E9-4F2C-B4FD-8F54CDD00E8B}"/>
+                <a16:creationId xmlns:a16="http://schemas.microsoft.com/office/drawing/2014/main" xmlns="" id="{1549429C-19E9-4F2C-B4FD-8F54CDD00E8B}"/>
               </a:ext>
             </a:extLst>
           </p:cNvPr>
@@ -334,6 +338,7 @@
           <a:p>
             <a:fld id="{D5B41888-593B-4C9A-883D-13341236B250}" type="slidenum">
               <a:rPr lang="en-US" smtClean="0"/>
+              <a:pPr/>
               <a:t>‹#›</a:t>
             </a:fld>
             <a:endParaRPr lang="en-US"/>
@@ -343,7 +348,7 @@
     </p:spTree>
     <p:extLst>
       <p:ext uri="{BB962C8B-B14F-4D97-AF65-F5344CB8AC3E}">
-        <p14:creationId xmlns:p14="http://schemas.microsoft.com/office/powerpoint/2010/main" val="795564747"/>
+        <p14:creationId xmlns:p14="http://schemas.microsoft.com/office/powerpoint/2010/main" xmlns="" val="795564747"/>
       </p:ext>
     </p:extLst>
   </p:cSld>
@@ -375,7 +380,7 @@
           <p:cNvPr id="2" name="Title 1">
             <a:extLst>
               <a:ext uri="{FF2B5EF4-FFF2-40B4-BE49-F238E27FC236}">
-                <a16:creationId xmlns:a16="http://schemas.microsoft.com/office/drawing/2014/main" id="{EDFFEACB-671B-4E99-90DE-FCA203D82464}"/>
+                <a16:creationId xmlns:a16="http://schemas.microsoft.com/office/drawing/2014/main" xmlns="" id="{EDFFEACB-671B-4E99-90DE-FCA203D82464}"/>
               </a:ext>
             </a:extLst>
           </p:cNvPr>
@@ -403,7 +408,7 @@
           <p:cNvPr id="3" name="Vertical Text Placeholder 2">
             <a:extLst>
               <a:ext uri="{FF2B5EF4-FFF2-40B4-BE49-F238E27FC236}">
-                <a16:creationId xmlns:a16="http://schemas.microsoft.com/office/drawing/2014/main" id="{5EBBDE48-CEA1-4233-8F0D-3609C5C8686C}"/>
+                <a16:creationId xmlns:a16="http://schemas.microsoft.com/office/drawing/2014/main" xmlns="" id="{5EBBDE48-CEA1-4233-8F0D-3609C5C8686C}"/>
               </a:ext>
             </a:extLst>
           </p:cNvPr>
@@ -460,7 +465,7 @@
           <p:cNvPr id="4" name="Date Placeholder 3">
             <a:extLst>
               <a:ext uri="{FF2B5EF4-FFF2-40B4-BE49-F238E27FC236}">
-                <a16:creationId xmlns:a16="http://schemas.microsoft.com/office/drawing/2014/main" id="{2E5C6FEC-E6F2-4DA5-830B-16AC04370781}"/>
+                <a16:creationId xmlns:a16="http://schemas.microsoft.com/office/drawing/2014/main" xmlns="" id="{2E5C6FEC-E6F2-4DA5-830B-16AC04370781}"/>
               </a:ext>
             </a:extLst>
           </p:cNvPr>
@@ -478,6 +483,7 @@
           <a:p>
             <a:fld id="{07C149BE-AC79-4548-8B96-E3E2494BEA7F}" type="datetimeFigureOut">
               <a:rPr lang="en-US" smtClean="0"/>
+              <a:pPr/>
               <a:t>5/30/2022</a:t>
             </a:fld>
             <a:endParaRPr lang="en-US"/>
@@ -489,7 +495,7 @@
           <p:cNvPr id="5" name="Footer Placeholder 4">
             <a:extLst>
               <a:ext uri="{FF2B5EF4-FFF2-40B4-BE49-F238E27FC236}">
-                <a16:creationId xmlns:a16="http://schemas.microsoft.com/office/drawing/2014/main" id="{33C34678-02FE-470D-8230-588A1EC87C80}"/>
+                <a16:creationId xmlns:a16="http://schemas.microsoft.com/office/drawing/2014/main" xmlns="" id="{33C34678-02FE-470D-8230-588A1EC87C80}"/>
               </a:ext>
             </a:extLst>
           </p:cNvPr>
@@ -514,7 +520,7 @@
           <p:cNvPr id="6" name="Slide Number Placeholder 5">
             <a:extLst>
               <a:ext uri="{FF2B5EF4-FFF2-40B4-BE49-F238E27FC236}">
-                <a16:creationId xmlns:a16="http://schemas.microsoft.com/office/drawing/2014/main" id="{DB95C7E1-CB97-4125-A4CF-1126A5676968}"/>
+                <a16:creationId xmlns:a16="http://schemas.microsoft.com/office/drawing/2014/main" xmlns="" id="{DB95C7E1-CB97-4125-A4CF-1126A5676968}"/>
               </a:ext>
             </a:extLst>
           </p:cNvPr>
@@ -532,6 +538,7 @@
           <a:p>
             <a:fld id="{D5B41888-593B-4C9A-883D-13341236B250}" type="slidenum">
               <a:rPr lang="en-US" smtClean="0"/>
+              <a:pPr/>
               <a:t>‹#›</a:t>
             </a:fld>
             <a:endParaRPr lang="en-US"/>
@@ -541,7 +548,7 @@
     </p:spTree>
     <p:extLst>
       <p:ext uri="{BB962C8B-B14F-4D97-AF65-F5344CB8AC3E}">
-        <p14:creationId xmlns:p14="http://schemas.microsoft.com/office/powerpoint/2010/main" val="652119031"/>
+        <p14:creationId xmlns:p14="http://schemas.microsoft.com/office/powerpoint/2010/main" xmlns="" val="652119031"/>
       </p:ext>
     </p:extLst>
   </p:cSld>
@@ -573,7 +580,7 @@
           <p:cNvPr id="2" name="Vertical Title 1">
             <a:extLst>
               <a:ext uri="{FF2B5EF4-FFF2-40B4-BE49-F238E27FC236}">
-                <a16:creationId xmlns:a16="http://schemas.microsoft.com/office/drawing/2014/main" id="{5F6B2C60-1B25-4BBB-B8DD-182CD312DF98}"/>
+                <a16:creationId xmlns:a16="http://schemas.microsoft.com/office/drawing/2014/main" xmlns="" id="{5F6B2C60-1B25-4BBB-B8DD-182CD312DF98}"/>
               </a:ext>
             </a:extLst>
           </p:cNvPr>
@@ -606,7 +613,7 @@
           <p:cNvPr id="3" name="Vertical Text Placeholder 2">
             <a:extLst>
               <a:ext uri="{FF2B5EF4-FFF2-40B4-BE49-F238E27FC236}">
-                <a16:creationId xmlns:a16="http://schemas.microsoft.com/office/drawing/2014/main" id="{DBD4EC11-F684-45FE-A670-6839F3BD1D01}"/>
+                <a16:creationId xmlns:a16="http://schemas.microsoft.com/office/drawing/2014/main" xmlns="" id="{DBD4EC11-F684-45FE-A670-6839F3BD1D01}"/>
               </a:ext>
             </a:extLst>
           </p:cNvPr>
@@ -668,7 +675,7 @@
           <p:cNvPr id="4" name="Date Placeholder 3">
             <a:extLst>
               <a:ext uri="{FF2B5EF4-FFF2-40B4-BE49-F238E27FC236}">
-                <a16:creationId xmlns:a16="http://schemas.microsoft.com/office/drawing/2014/main" id="{B6ADFE61-028C-4DF5-AB65-16A348AADBA3}"/>
+                <a16:creationId xmlns:a16="http://schemas.microsoft.com/office/drawing/2014/main" xmlns="" id="{B6ADFE61-028C-4DF5-AB65-16A348AADBA3}"/>
               </a:ext>
             </a:extLst>
           </p:cNvPr>
@@ -686,6 +693,7 @@
           <a:p>
             <a:fld id="{07C149BE-AC79-4548-8B96-E3E2494BEA7F}" type="datetimeFigureOut">
               <a:rPr lang="en-US" smtClean="0"/>
+              <a:pPr/>
               <a:t>5/30/2022</a:t>
             </a:fld>
             <a:endParaRPr lang="en-US"/>
@@ -697,7 +705,7 @@
           <p:cNvPr id="5" name="Footer Placeholder 4">
             <a:extLst>
               <a:ext uri="{FF2B5EF4-FFF2-40B4-BE49-F238E27FC236}">
-                <a16:creationId xmlns:a16="http://schemas.microsoft.com/office/drawing/2014/main" id="{F6690023-6460-406A-BFA3-91376048F033}"/>
+                <a16:creationId xmlns:a16="http://schemas.microsoft.com/office/drawing/2014/main" xmlns="" id="{F6690023-6460-406A-BFA3-91376048F033}"/>
               </a:ext>
             </a:extLst>
           </p:cNvPr>
@@ -722,7 +730,7 @@
           <p:cNvPr id="6" name="Slide Number Placeholder 5">
             <a:extLst>
               <a:ext uri="{FF2B5EF4-FFF2-40B4-BE49-F238E27FC236}">
-                <a16:creationId xmlns:a16="http://schemas.microsoft.com/office/drawing/2014/main" id="{141DF3AE-7E06-4D8F-B0BE-4A8B1C2210AF}"/>
+                <a16:creationId xmlns:a16="http://schemas.microsoft.com/office/drawing/2014/main" xmlns="" id="{141DF3AE-7E06-4D8F-B0BE-4A8B1C2210AF}"/>
               </a:ext>
             </a:extLst>
           </p:cNvPr>
@@ -740,6 +748,7 @@
           <a:p>
             <a:fld id="{D5B41888-593B-4C9A-883D-13341236B250}" type="slidenum">
               <a:rPr lang="en-US" smtClean="0"/>
+              <a:pPr/>
               <a:t>‹#›</a:t>
             </a:fld>
             <a:endParaRPr lang="en-US"/>
@@ -749,7 +758,7 @@
     </p:spTree>
     <p:extLst>
       <p:ext uri="{BB962C8B-B14F-4D97-AF65-F5344CB8AC3E}">
-        <p14:creationId xmlns:p14="http://schemas.microsoft.com/office/powerpoint/2010/main" val="2150503476"/>
+        <p14:creationId xmlns:p14="http://schemas.microsoft.com/office/powerpoint/2010/main" xmlns="" val="2150503476"/>
       </p:ext>
     </p:extLst>
   </p:cSld>
@@ -781,7 +790,7 @@
           <p:cNvPr id="2" name="Title 1">
             <a:extLst>
               <a:ext uri="{FF2B5EF4-FFF2-40B4-BE49-F238E27FC236}">
-                <a16:creationId xmlns:a16="http://schemas.microsoft.com/office/drawing/2014/main" id="{D1D68E82-B91F-4B08-82A6-5B478BD41DEE}"/>
+                <a16:creationId xmlns:a16="http://schemas.microsoft.com/office/drawing/2014/main" xmlns="" id="{D1D68E82-B91F-4B08-82A6-5B478BD41DEE}"/>
               </a:ext>
             </a:extLst>
           </p:cNvPr>
@@ -809,7 +818,7 @@
           <p:cNvPr id="3" name="Content Placeholder 2">
             <a:extLst>
               <a:ext uri="{FF2B5EF4-FFF2-40B4-BE49-F238E27FC236}">
-                <a16:creationId xmlns:a16="http://schemas.microsoft.com/office/drawing/2014/main" id="{4E0DD447-5B02-4B26-B6E8-D59B9E6C6E14}"/>
+                <a16:creationId xmlns:a16="http://schemas.microsoft.com/office/drawing/2014/main" xmlns="" id="{4E0DD447-5B02-4B26-B6E8-D59B9E6C6E14}"/>
               </a:ext>
             </a:extLst>
           </p:cNvPr>
@@ -866,7 +875,7 @@
           <p:cNvPr id="4" name="Date Placeholder 3">
             <a:extLst>
               <a:ext uri="{FF2B5EF4-FFF2-40B4-BE49-F238E27FC236}">
-                <a16:creationId xmlns:a16="http://schemas.microsoft.com/office/drawing/2014/main" id="{87AA1E80-2C38-45D7-82A0-F5815CA2CFDE}"/>
+                <a16:creationId xmlns:a16="http://schemas.microsoft.com/office/drawing/2014/main" xmlns="" id="{87AA1E80-2C38-45D7-82A0-F5815CA2CFDE}"/>
               </a:ext>
             </a:extLst>
           </p:cNvPr>
@@ -884,6 +893,7 @@
           <a:p>
             <a:fld id="{07C149BE-AC79-4548-8B96-E3E2494BEA7F}" type="datetimeFigureOut">
               <a:rPr lang="en-US" smtClean="0"/>
+              <a:pPr/>
               <a:t>5/30/2022</a:t>
             </a:fld>
             <a:endParaRPr lang="en-US"/>
@@ -895,7 +905,7 @@
           <p:cNvPr id="5" name="Footer Placeholder 4">
             <a:extLst>
               <a:ext uri="{FF2B5EF4-FFF2-40B4-BE49-F238E27FC236}">
-                <a16:creationId xmlns:a16="http://schemas.microsoft.com/office/drawing/2014/main" id="{ACEB29ED-FF33-419A-BA01-9E26545D9A03}"/>
+                <a16:creationId xmlns:a16="http://schemas.microsoft.com/office/drawing/2014/main" xmlns="" id="{ACEB29ED-FF33-419A-BA01-9E26545D9A03}"/>
               </a:ext>
             </a:extLst>
           </p:cNvPr>
@@ -920,7 +930,7 @@
           <p:cNvPr id="6" name="Slide Number Placeholder 5">
             <a:extLst>
               <a:ext uri="{FF2B5EF4-FFF2-40B4-BE49-F238E27FC236}">
-                <a16:creationId xmlns:a16="http://schemas.microsoft.com/office/drawing/2014/main" id="{DF00D132-37E7-49C6-9E8B-17AE4ECE0880}"/>
+                <a16:creationId xmlns:a16="http://schemas.microsoft.com/office/drawing/2014/main" xmlns="" id="{DF00D132-37E7-49C6-9E8B-17AE4ECE0880}"/>
               </a:ext>
             </a:extLst>
           </p:cNvPr>
@@ -938,6 +948,7 @@
           <a:p>
             <a:fld id="{D5B41888-593B-4C9A-883D-13341236B250}" type="slidenum">
               <a:rPr lang="en-US" smtClean="0"/>
+              <a:pPr/>
               <a:t>‹#›</a:t>
             </a:fld>
             <a:endParaRPr lang="en-US"/>
@@ -947,7 +958,7 @@
     </p:spTree>
     <p:extLst>
       <p:ext uri="{BB962C8B-B14F-4D97-AF65-F5344CB8AC3E}">
-        <p14:creationId xmlns:p14="http://schemas.microsoft.com/office/powerpoint/2010/main" val="3713423787"/>
+        <p14:creationId xmlns:p14="http://schemas.microsoft.com/office/powerpoint/2010/main" xmlns="" val="3713423787"/>
       </p:ext>
     </p:extLst>
   </p:cSld>
@@ -979,7 +990,7 @@
           <p:cNvPr id="2" name="Title 1">
             <a:extLst>
               <a:ext uri="{FF2B5EF4-FFF2-40B4-BE49-F238E27FC236}">
-                <a16:creationId xmlns:a16="http://schemas.microsoft.com/office/drawing/2014/main" id="{DF5FC28B-5CC4-48E9-BDE1-B169642EC31A}"/>
+                <a16:creationId xmlns:a16="http://schemas.microsoft.com/office/drawing/2014/main" xmlns="" id="{DF5FC28B-5CC4-48E9-BDE1-B169642EC31A}"/>
               </a:ext>
             </a:extLst>
           </p:cNvPr>
@@ -1016,7 +1027,7 @@
           <p:cNvPr id="3" name="Text Placeholder 2">
             <a:extLst>
               <a:ext uri="{FF2B5EF4-FFF2-40B4-BE49-F238E27FC236}">
-                <a16:creationId xmlns:a16="http://schemas.microsoft.com/office/drawing/2014/main" id="{FCA71FCE-28E1-457C-8703-C49B5EB0DD44}"/>
+                <a16:creationId xmlns:a16="http://schemas.microsoft.com/office/drawing/2014/main" xmlns="" id="{FCA71FCE-28E1-457C-8703-C49B5EB0DD44}"/>
               </a:ext>
             </a:extLst>
           </p:cNvPr>
@@ -1141,7 +1152,7 @@
           <p:cNvPr id="4" name="Date Placeholder 3">
             <a:extLst>
               <a:ext uri="{FF2B5EF4-FFF2-40B4-BE49-F238E27FC236}">
-                <a16:creationId xmlns:a16="http://schemas.microsoft.com/office/drawing/2014/main" id="{2C056420-8791-4343-B934-FEF438B6E8DA}"/>
+                <a16:creationId xmlns:a16="http://schemas.microsoft.com/office/drawing/2014/main" xmlns="" id="{2C056420-8791-4343-B934-FEF438B6E8DA}"/>
               </a:ext>
             </a:extLst>
           </p:cNvPr>
@@ -1159,6 +1170,7 @@
           <a:p>
             <a:fld id="{07C149BE-AC79-4548-8B96-E3E2494BEA7F}" type="datetimeFigureOut">
               <a:rPr lang="en-US" smtClean="0"/>
+              <a:pPr/>
               <a:t>5/30/2022</a:t>
             </a:fld>
             <a:endParaRPr lang="en-US"/>
@@ -1170,7 +1182,7 @@
           <p:cNvPr id="5" name="Footer Placeholder 4">
             <a:extLst>
               <a:ext uri="{FF2B5EF4-FFF2-40B4-BE49-F238E27FC236}">
-                <a16:creationId xmlns:a16="http://schemas.microsoft.com/office/drawing/2014/main" id="{1EEA5C3E-B0C4-41E0-837C-395B1EBC85AC}"/>
+                <a16:creationId xmlns:a16="http://schemas.microsoft.com/office/drawing/2014/main" xmlns="" id="{1EEA5C3E-B0C4-41E0-837C-395B1EBC85AC}"/>
               </a:ext>
             </a:extLst>
           </p:cNvPr>
@@ -1195,7 +1207,7 @@
           <p:cNvPr id="6" name="Slide Number Placeholder 5">
             <a:extLst>
               <a:ext uri="{FF2B5EF4-FFF2-40B4-BE49-F238E27FC236}">
-                <a16:creationId xmlns:a16="http://schemas.microsoft.com/office/drawing/2014/main" id="{C68A01E3-40E8-451A-8CDE-226B8C496FDC}"/>
+                <a16:creationId xmlns:a16="http://schemas.microsoft.com/office/drawing/2014/main" xmlns="" id="{C68A01E3-40E8-451A-8CDE-226B8C496FDC}"/>
               </a:ext>
             </a:extLst>
           </p:cNvPr>
@@ -1213,6 +1225,7 @@
           <a:p>
             <a:fld id="{D5B41888-593B-4C9A-883D-13341236B250}" type="slidenum">
               <a:rPr lang="en-US" smtClean="0"/>
+              <a:pPr/>
               <a:t>‹#›</a:t>
             </a:fld>
             <a:endParaRPr lang="en-US"/>
@@ -1222,7 +1235,7 @@
     </p:spTree>
     <p:extLst>
       <p:ext uri="{BB962C8B-B14F-4D97-AF65-F5344CB8AC3E}">
-        <p14:creationId xmlns:p14="http://schemas.microsoft.com/office/powerpoint/2010/main" val="3638162829"/>
+        <p14:creationId xmlns:p14="http://schemas.microsoft.com/office/powerpoint/2010/main" xmlns="" val="3638162829"/>
       </p:ext>
     </p:extLst>
   </p:cSld>
@@ -1254,7 +1267,7 @@
           <p:cNvPr id="2" name="Title 1">
             <a:extLst>
               <a:ext uri="{FF2B5EF4-FFF2-40B4-BE49-F238E27FC236}">
-                <a16:creationId xmlns:a16="http://schemas.microsoft.com/office/drawing/2014/main" id="{D0804C39-3520-497B-B728-36E8D7A09097}"/>
+                <a16:creationId xmlns:a16="http://schemas.microsoft.com/office/drawing/2014/main" xmlns="" id="{D0804C39-3520-497B-B728-36E8D7A09097}"/>
               </a:ext>
             </a:extLst>
           </p:cNvPr>
@@ -1282,7 +1295,7 @@
           <p:cNvPr id="3" name="Content Placeholder 2">
             <a:extLst>
               <a:ext uri="{FF2B5EF4-FFF2-40B4-BE49-F238E27FC236}">
-                <a16:creationId xmlns:a16="http://schemas.microsoft.com/office/drawing/2014/main" id="{D36DBC9B-1113-4517-8AAA-EC09A66ACB61}"/>
+                <a16:creationId xmlns:a16="http://schemas.microsoft.com/office/drawing/2014/main" xmlns="" id="{D36DBC9B-1113-4517-8AAA-EC09A66ACB61}"/>
               </a:ext>
             </a:extLst>
           </p:cNvPr>
@@ -1344,7 +1357,7 @@
           <p:cNvPr id="4" name="Content Placeholder 3">
             <a:extLst>
               <a:ext uri="{FF2B5EF4-FFF2-40B4-BE49-F238E27FC236}">
-                <a16:creationId xmlns:a16="http://schemas.microsoft.com/office/drawing/2014/main" id="{63199ED8-C916-4935-81E4-92A4AA331363}"/>
+                <a16:creationId xmlns:a16="http://schemas.microsoft.com/office/drawing/2014/main" xmlns="" id="{63199ED8-C916-4935-81E4-92A4AA331363}"/>
               </a:ext>
             </a:extLst>
           </p:cNvPr>
@@ -1406,7 +1419,7 @@
           <p:cNvPr id="5" name="Date Placeholder 4">
             <a:extLst>
               <a:ext uri="{FF2B5EF4-FFF2-40B4-BE49-F238E27FC236}">
-                <a16:creationId xmlns:a16="http://schemas.microsoft.com/office/drawing/2014/main" id="{978C82B4-CCDC-4969-955D-1C3DF5594292}"/>
+                <a16:creationId xmlns:a16="http://schemas.microsoft.com/office/drawing/2014/main" xmlns="" id="{978C82B4-CCDC-4969-955D-1C3DF5594292}"/>
               </a:ext>
             </a:extLst>
           </p:cNvPr>
@@ -1424,6 +1437,7 @@
           <a:p>
             <a:fld id="{07C149BE-AC79-4548-8B96-E3E2494BEA7F}" type="datetimeFigureOut">
               <a:rPr lang="en-US" smtClean="0"/>
+              <a:pPr/>
               <a:t>5/30/2022</a:t>
             </a:fld>
             <a:endParaRPr lang="en-US"/>
@@ -1435,7 +1449,7 @@
           <p:cNvPr id="6" name="Footer Placeholder 5">
             <a:extLst>
               <a:ext uri="{FF2B5EF4-FFF2-40B4-BE49-F238E27FC236}">
-                <a16:creationId xmlns:a16="http://schemas.microsoft.com/office/drawing/2014/main" id="{E435F21D-9875-4B44-9D30-2D24D0757376}"/>
+                <a16:creationId xmlns:a16="http://schemas.microsoft.com/office/drawing/2014/main" xmlns="" id="{E435F21D-9875-4B44-9D30-2D24D0757376}"/>
               </a:ext>
             </a:extLst>
           </p:cNvPr>
@@ -1460,7 +1474,7 @@
           <p:cNvPr id="7" name="Slide Number Placeholder 6">
             <a:extLst>
               <a:ext uri="{FF2B5EF4-FFF2-40B4-BE49-F238E27FC236}">
-                <a16:creationId xmlns:a16="http://schemas.microsoft.com/office/drawing/2014/main" id="{9D004062-54C1-4222-A6B6-A1E95B544192}"/>
+                <a16:creationId xmlns:a16="http://schemas.microsoft.com/office/drawing/2014/main" xmlns="" id="{9D004062-54C1-4222-A6B6-A1E95B544192}"/>
               </a:ext>
             </a:extLst>
           </p:cNvPr>
@@ -1478,6 +1492,7 @@
           <a:p>
             <a:fld id="{D5B41888-593B-4C9A-883D-13341236B250}" type="slidenum">
               <a:rPr lang="en-US" smtClean="0"/>
+              <a:pPr/>
               <a:t>‹#›</a:t>
             </a:fld>
             <a:endParaRPr lang="en-US"/>
@@ -1487,7 +1502,7 @@
     </p:spTree>
     <p:extLst>
       <p:ext uri="{BB962C8B-B14F-4D97-AF65-F5344CB8AC3E}">
-        <p14:creationId xmlns:p14="http://schemas.microsoft.com/office/powerpoint/2010/main" val="398648364"/>
+        <p14:creationId xmlns:p14="http://schemas.microsoft.com/office/powerpoint/2010/main" xmlns="" val="398648364"/>
       </p:ext>
     </p:extLst>
   </p:cSld>
@@ -1519,7 +1534,7 @@
           <p:cNvPr id="2" name="Title 1">
             <a:extLst>
               <a:ext uri="{FF2B5EF4-FFF2-40B4-BE49-F238E27FC236}">
-                <a16:creationId xmlns:a16="http://schemas.microsoft.com/office/drawing/2014/main" id="{16565F24-44A1-4474-A897-5458FE40457A}"/>
+                <a16:creationId xmlns:a16="http://schemas.microsoft.com/office/drawing/2014/main" xmlns="" id="{16565F24-44A1-4474-A897-5458FE40457A}"/>
               </a:ext>
             </a:extLst>
           </p:cNvPr>
@@ -1552,7 +1567,7 @@
           <p:cNvPr id="3" name="Text Placeholder 2">
             <a:extLst>
               <a:ext uri="{FF2B5EF4-FFF2-40B4-BE49-F238E27FC236}">
-                <a16:creationId xmlns:a16="http://schemas.microsoft.com/office/drawing/2014/main" id="{EAB450F1-61A6-481D-90C9-AB4F610628D0}"/>
+                <a16:creationId xmlns:a16="http://schemas.microsoft.com/office/drawing/2014/main" xmlns="" id="{EAB450F1-61A6-481D-90C9-AB4F610628D0}"/>
               </a:ext>
             </a:extLst>
           </p:cNvPr>
@@ -1623,7 +1638,7 @@
           <p:cNvPr id="4" name="Content Placeholder 3">
             <a:extLst>
               <a:ext uri="{FF2B5EF4-FFF2-40B4-BE49-F238E27FC236}">
-                <a16:creationId xmlns:a16="http://schemas.microsoft.com/office/drawing/2014/main" id="{04CD3414-E418-4FCD-90B2-88DF359CF349}"/>
+                <a16:creationId xmlns:a16="http://schemas.microsoft.com/office/drawing/2014/main" xmlns="" id="{04CD3414-E418-4FCD-90B2-88DF359CF349}"/>
               </a:ext>
             </a:extLst>
           </p:cNvPr>
@@ -1685,7 +1700,7 @@
           <p:cNvPr id="5" name="Text Placeholder 4">
             <a:extLst>
               <a:ext uri="{FF2B5EF4-FFF2-40B4-BE49-F238E27FC236}">
-                <a16:creationId xmlns:a16="http://schemas.microsoft.com/office/drawing/2014/main" id="{64F705CD-D52B-4D91-BF40-B15961189A60}"/>
+                <a16:creationId xmlns:a16="http://schemas.microsoft.com/office/drawing/2014/main" xmlns="" id="{64F705CD-D52B-4D91-BF40-B15961189A60}"/>
               </a:ext>
             </a:extLst>
           </p:cNvPr>
@@ -1756,7 +1771,7 @@
           <p:cNvPr id="6" name="Content Placeholder 5">
             <a:extLst>
               <a:ext uri="{FF2B5EF4-FFF2-40B4-BE49-F238E27FC236}">
-                <a16:creationId xmlns:a16="http://schemas.microsoft.com/office/drawing/2014/main" id="{817FBBFE-BF97-4614-8310-72E7BE74C89C}"/>
+                <a16:creationId xmlns:a16="http://schemas.microsoft.com/office/drawing/2014/main" xmlns="" id="{817FBBFE-BF97-4614-8310-72E7BE74C89C}"/>
               </a:ext>
             </a:extLst>
           </p:cNvPr>
@@ -1818,7 +1833,7 @@
           <p:cNvPr id="7" name="Date Placeholder 6">
             <a:extLst>
               <a:ext uri="{FF2B5EF4-FFF2-40B4-BE49-F238E27FC236}">
-                <a16:creationId xmlns:a16="http://schemas.microsoft.com/office/drawing/2014/main" id="{9BAE9B3E-67CF-4238-AA8C-573C476A8148}"/>
+                <a16:creationId xmlns:a16="http://schemas.microsoft.com/office/drawing/2014/main" xmlns="" id="{9BAE9B3E-67CF-4238-AA8C-573C476A8148}"/>
               </a:ext>
             </a:extLst>
           </p:cNvPr>
@@ -1836,6 +1851,7 @@
           <a:p>
             <a:fld id="{07C149BE-AC79-4548-8B96-E3E2494BEA7F}" type="datetimeFigureOut">
               <a:rPr lang="en-US" smtClean="0"/>
+              <a:pPr/>
               <a:t>5/30/2022</a:t>
             </a:fld>
             <a:endParaRPr lang="en-US"/>
@@ -1847,7 +1863,7 @@
           <p:cNvPr id="8" name="Footer Placeholder 7">
             <a:extLst>
               <a:ext uri="{FF2B5EF4-FFF2-40B4-BE49-F238E27FC236}">
-                <a16:creationId xmlns:a16="http://schemas.microsoft.com/office/drawing/2014/main" id="{AAF1C478-AA43-41B1-A0FA-2EA3E8AC03E1}"/>
+                <a16:creationId xmlns:a16="http://schemas.microsoft.com/office/drawing/2014/main" xmlns="" id="{AAF1C478-AA43-41B1-A0FA-2EA3E8AC03E1}"/>
               </a:ext>
             </a:extLst>
           </p:cNvPr>
@@ -1872,7 +1888,7 @@
           <p:cNvPr id="9" name="Slide Number Placeholder 8">
             <a:extLst>
               <a:ext uri="{FF2B5EF4-FFF2-40B4-BE49-F238E27FC236}">
-                <a16:creationId xmlns:a16="http://schemas.microsoft.com/office/drawing/2014/main" id="{39D11F40-FE32-4B11-8D8B-858985BDB255}"/>
+                <a16:creationId xmlns:a16="http://schemas.microsoft.com/office/drawing/2014/main" xmlns="" id="{39D11F40-FE32-4B11-8D8B-858985BDB255}"/>
               </a:ext>
             </a:extLst>
           </p:cNvPr>
@@ -1890,6 +1906,7 @@
           <a:p>
             <a:fld id="{D5B41888-593B-4C9A-883D-13341236B250}" type="slidenum">
               <a:rPr lang="en-US" smtClean="0"/>
+              <a:pPr/>
               <a:t>‹#›</a:t>
             </a:fld>
             <a:endParaRPr lang="en-US"/>
@@ -1899,7 +1916,7 @@
     </p:spTree>
     <p:extLst>
       <p:ext uri="{BB962C8B-B14F-4D97-AF65-F5344CB8AC3E}">
-        <p14:creationId xmlns:p14="http://schemas.microsoft.com/office/powerpoint/2010/main" val="3611413196"/>
+        <p14:creationId xmlns:p14="http://schemas.microsoft.com/office/powerpoint/2010/main" xmlns="" val="3611413196"/>
       </p:ext>
     </p:extLst>
   </p:cSld>
@@ -1931,7 +1948,7 @@
           <p:cNvPr id="2" name="Title 1">
             <a:extLst>
               <a:ext uri="{FF2B5EF4-FFF2-40B4-BE49-F238E27FC236}">
-                <a16:creationId xmlns:a16="http://schemas.microsoft.com/office/drawing/2014/main" id="{9A3B2D40-1278-47A7-B00B-BEAEB10D7449}"/>
+                <a16:creationId xmlns:a16="http://schemas.microsoft.com/office/drawing/2014/main" xmlns="" id="{9A3B2D40-1278-47A7-B00B-BEAEB10D7449}"/>
               </a:ext>
             </a:extLst>
           </p:cNvPr>
@@ -1959,7 +1976,7 @@
           <p:cNvPr id="3" name="Date Placeholder 2">
             <a:extLst>
               <a:ext uri="{FF2B5EF4-FFF2-40B4-BE49-F238E27FC236}">
-                <a16:creationId xmlns:a16="http://schemas.microsoft.com/office/drawing/2014/main" id="{51ACC5B6-3F4F-4E29-8FBA-EE5ABDF6610C}"/>
+                <a16:creationId xmlns:a16="http://schemas.microsoft.com/office/drawing/2014/main" xmlns="" id="{51ACC5B6-3F4F-4E29-8FBA-EE5ABDF6610C}"/>
               </a:ext>
             </a:extLst>
           </p:cNvPr>
@@ -1977,6 +1994,7 @@
           <a:p>
             <a:fld id="{07C149BE-AC79-4548-8B96-E3E2494BEA7F}" type="datetimeFigureOut">
               <a:rPr lang="en-US" smtClean="0"/>
+              <a:pPr/>
               <a:t>5/30/2022</a:t>
             </a:fld>
             <a:endParaRPr lang="en-US"/>
@@ -1988,7 +2006,7 @@
           <p:cNvPr id="4" name="Footer Placeholder 3">
             <a:extLst>
               <a:ext uri="{FF2B5EF4-FFF2-40B4-BE49-F238E27FC236}">
-                <a16:creationId xmlns:a16="http://schemas.microsoft.com/office/drawing/2014/main" id="{694B7179-4429-4A90-B9E3-20F804747E03}"/>
+                <a16:creationId xmlns:a16="http://schemas.microsoft.com/office/drawing/2014/main" xmlns="" id="{694B7179-4429-4A90-B9E3-20F804747E03}"/>
               </a:ext>
             </a:extLst>
           </p:cNvPr>
@@ -2013,7 +2031,7 @@
           <p:cNvPr id="5" name="Slide Number Placeholder 4">
             <a:extLst>
               <a:ext uri="{FF2B5EF4-FFF2-40B4-BE49-F238E27FC236}">
-                <a16:creationId xmlns:a16="http://schemas.microsoft.com/office/drawing/2014/main" id="{C866BDC4-B09E-4ACA-924E-7346BBA9833C}"/>
+                <a16:creationId xmlns:a16="http://schemas.microsoft.com/office/drawing/2014/main" xmlns="" id="{C866BDC4-B09E-4ACA-924E-7346BBA9833C}"/>
               </a:ext>
             </a:extLst>
           </p:cNvPr>
@@ -2031,6 +2049,7 @@
           <a:p>
             <a:fld id="{D5B41888-593B-4C9A-883D-13341236B250}" type="slidenum">
               <a:rPr lang="en-US" smtClean="0"/>
+              <a:pPr/>
               <a:t>‹#›</a:t>
             </a:fld>
             <a:endParaRPr lang="en-US"/>
@@ -2040,7 +2059,7 @@
     </p:spTree>
     <p:extLst>
       <p:ext uri="{BB962C8B-B14F-4D97-AF65-F5344CB8AC3E}">
-        <p14:creationId xmlns:p14="http://schemas.microsoft.com/office/powerpoint/2010/main" val="65293535"/>
+        <p14:creationId xmlns:p14="http://schemas.microsoft.com/office/powerpoint/2010/main" xmlns="" val="65293535"/>
       </p:ext>
     </p:extLst>
   </p:cSld>
@@ -2072,7 +2091,7 @@
           <p:cNvPr id="2" name="Date Placeholder 1">
             <a:extLst>
               <a:ext uri="{FF2B5EF4-FFF2-40B4-BE49-F238E27FC236}">
-                <a16:creationId xmlns:a16="http://schemas.microsoft.com/office/drawing/2014/main" id="{52EDBB9C-D01C-43DC-BF39-7AE024622638}"/>
+                <a16:creationId xmlns:a16="http://schemas.microsoft.com/office/drawing/2014/main" xmlns="" id="{52EDBB9C-D01C-43DC-BF39-7AE024622638}"/>
               </a:ext>
             </a:extLst>
           </p:cNvPr>
@@ -2090,6 +2109,7 @@
           <a:p>
             <a:fld id="{07C149BE-AC79-4548-8B96-E3E2494BEA7F}" type="datetimeFigureOut">
               <a:rPr lang="en-US" smtClean="0"/>
+              <a:pPr/>
               <a:t>5/30/2022</a:t>
             </a:fld>
             <a:endParaRPr lang="en-US"/>
@@ -2101,7 +2121,7 @@
           <p:cNvPr id="3" name="Footer Placeholder 2">
             <a:extLst>
               <a:ext uri="{FF2B5EF4-FFF2-40B4-BE49-F238E27FC236}">
-                <a16:creationId xmlns:a16="http://schemas.microsoft.com/office/drawing/2014/main" id="{EFC6F569-BF4D-4312-B5F7-95C63D994C34}"/>
+                <a16:creationId xmlns:a16="http://schemas.microsoft.com/office/drawing/2014/main" xmlns="" id="{EFC6F569-BF4D-4312-B5F7-95C63D994C34}"/>
               </a:ext>
             </a:extLst>
           </p:cNvPr>
@@ -2126,7 +2146,7 @@
           <p:cNvPr id="4" name="Slide Number Placeholder 3">
             <a:extLst>
               <a:ext uri="{FF2B5EF4-FFF2-40B4-BE49-F238E27FC236}">
-                <a16:creationId xmlns:a16="http://schemas.microsoft.com/office/drawing/2014/main" id="{05A678D3-D636-48A7-96B4-4DF65FC5E633}"/>
+                <a16:creationId xmlns:a16="http://schemas.microsoft.com/office/drawing/2014/main" xmlns="" id="{05A678D3-D636-48A7-96B4-4DF65FC5E633}"/>
               </a:ext>
             </a:extLst>
           </p:cNvPr>
@@ -2144,6 +2164,7 @@
           <a:p>
             <a:fld id="{D5B41888-593B-4C9A-883D-13341236B250}" type="slidenum">
               <a:rPr lang="en-US" smtClean="0"/>
+              <a:pPr/>
               <a:t>‹#›</a:t>
             </a:fld>
             <a:endParaRPr lang="en-US"/>
@@ -2153,7 +2174,7 @@
     </p:spTree>
     <p:extLst>
       <p:ext uri="{BB962C8B-B14F-4D97-AF65-F5344CB8AC3E}">
-        <p14:creationId xmlns:p14="http://schemas.microsoft.com/office/powerpoint/2010/main" val="1971089693"/>
+        <p14:creationId xmlns:p14="http://schemas.microsoft.com/office/powerpoint/2010/main" xmlns="" val="1971089693"/>
       </p:ext>
     </p:extLst>
   </p:cSld>
@@ -2185,7 +2206,7 @@
           <p:cNvPr id="2" name="Title 1">
             <a:extLst>
               <a:ext uri="{FF2B5EF4-FFF2-40B4-BE49-F238E27FC236}">
-                <a16:creationId xmlns:a16="http://schemas.microsoft.com/office/drawing/2014/main" id="{33DA4A39-68CC-488B-B2E1-095F40173249}"/>
+                <a16:creationId xmlns:a16="http://schemas.microsoft.com/office/drawing/2014/main" xmlns="" id="{33DA4A39-68CC-488B-B2E1-095F40173249}"/>
               </a:ext>
             </a:extLst>
           </p:cNvPr>
@@ -2222,7 +2243,7 @@
           <p:cNvPr id="3" name="Content Placeholder 2">
             <a:extLst>
               <a:ext uri="{FF2B5EF4-FFF2-40B4-BE49-F238E27FC236}">
-                <a16:creationId xmlns:a16="http://schemas.microsoft.com/office/drawing/2014/main" id="{A9B2EB30-FE99-4029-A9D4-C2DB0D87C9EA}"/>
+                <a16:creationId xmlns:a16="http://schemas.microsoft.com/office/drawing/2014/main" xmlns="" id="{A9B2EB30-FE99-4029-A9D4-C2DB0D87C9EA}"/>
               </a:ext>
             </a:extLst>
           </p:cNvPr>
@@ -2312,7 +2333,7 @@
           <p:cNvPr id="4" name="Text Placeholder 3">
             <a:extLst>
               <a:ext uri="{FF2B5EF4-FFF2-40B4-BE49-F238E27FC236}">
-                <a16:creationId xmlns:a16="http://schemas.microsoft.com/office/drawing/2014/main" id="{E8DFD7CF-5764-42CB-B5FF-12BD892D678E}"/>
+                <a16:creationId xmlns:a16="http://schemas.microsoft.com/office/drawing/2014/main" xmlns="" id="{E8DFD7CF-5764-42CB-B5FF-12BD892D678E}"/>
               </a:ext>
             </a:extLst>
           </p:cNvPr>
@@ -2383,7 +2404,7 @@
           <p:cNvPr id="5" name="Date Placeholder 4">
             <a:extLst>
               <a:ext uri="{FF2B5EF4-FFF2-40B4-BE49-F238E27FC236}">
-                <a16:creationId xmlns:a16="http://schemas.microsoft.com/office/drawing/2014/main" id="{E0FA76F1-D39D-413C-A743-E5997E592E5B}"/>
+                <a16:creationId xmlns:a16="http://schemas.microsoft.com/office/drawing/2014/main" xmlns="" id="{E0FA76F1-D39D-413C-A743-E5997E592E5B}"/>
               </a:ext>
             </a:extLst>
           </p:cNvPr>
@@ -2401,6 +2422,7 @@
           <a:p>
             <a:fld id="{07C149BE-AC79-4548-8B96-E3E2494BEA7F}" type="datetimeFigureOut">
               <a:rPr lang="en-US" smtClean="0"/>
+              <a:pPr/>
               <a:t>5/30/2022</a:t>
             </a:fld>
             <a:endParaRPr lang="en-US"/>
@@ -2412,7 +2434,7 @@
           <p:cNvPr id="6" name="Footer Placeholder 5">
             <a:extLst>
               <a:ext uri="{FF2B5EF4-FFF2-40B4-BE49-F238E27FC236}">
-                <a16:creationId xmlns:a16="http://schemas.microsoft.com/office/drawing/2014/main" id="{6EDAF82F-4212-4499-8FC7-105FA6E5D4E7}"/>
+                <a16:creationId xmlns:a16="http://schemas.microsoft.com/office/drawing/2014/main" xmlns="" id="{6EDAF82F-4212-4499-8FC7-105FA6E5D4E7}"/>
               </a:ext>
             </a:extLst>
           </p:cNvPr>
@@ -2437,7 +2459,7 @@
           <p:cNvPr id="7" name="Slide Number Placeholder 6">
             <a:extLst>
               <a:ext uri="{FF2B5EF4-FFF2-40B4-BE49-F238E27FC236}">
-                <a16:creationId xmlns:a16="http://schemas.microsoft.com/office/drawing/2014/main" id="{1BE13BF2-8B19-4998-BD28-0B70072A8D6D}"/>
+                <a16:creationId xmlns:a16="http://schemas.microsoft.com/office/drawing/2014/main" xmlns="" id="{1BE13BF2-8B19-4998-BD28-0B70072A8D6D}"/>
               </a:ext>
             </a:extLst>
           </p:cNvPr>
@@ -2455,6 +2477,7 @@
           <a:p>
             <a:fld id="{D5B41888-593B-4C9A-883D-13341236B250}" type="slidenum">
               <a:rPr lang="en-US" smtClean="0"/>
+              <a:pPr/>
               <a:t>‹#›</a:t>
             </a:fld>
             <a:endParaRPr lang="en-US"/>
@@ -2464,7 +2487,7 @@
     </p:spTree>
     <p:extLst>
       <p:ext uri="{BB962C8B-B14F-4D97-AF65-F5344CB8AC3E}">
-        <p14:creationId xmlns:p14="http://schemas.microsoft.com/office/powerpoint/2010/main" val="2704192708"/>
+        <p14:creationId xmlns:p14="http://schemas.microsoft.com/office/powerpoint/2010/main" xmlns="" val="2704192708"/>
       </p:ext>
     </p:extLst>
   </p:cSld>
@@ -2496,7 +2519,7 @@
           <p:cNvPr id="2" name="Title 1">
             <a:extLst>
               <a:ext uri="{FF2B5EF4-FFF2-40B4-BE49-F238E27FC236}">
-                <a16:creationId xmlns:a16="http://schemas.microsoft.com/office/drawing/2014/main" id="{DC1643C1-50D4-4368-8A3F-8AD61FB07FFA}"/>
+                <a16:creationId xmlns:a16="http://schemas.microsoft.com/office/drawing/2014/main" xmlns="" id="{DC1643C1-50D4-4368-8A3F-8AD61FB07FFA}"/>
               </a:ext>
             </a:extLst>
           </p:cNvPr>
@@ -2533,7 +2556,7 @@
           <p:cNvPr id="3" name="Picture Placeholder 2">
             <a:extLst>
               <a:ext uri="{FF2B5EF4-FFF2-40B4-BE49-F238E27FC236}">
-                <a16:creationId xmlns:a16="http://schemas.microsoft.com/office/drawing/2014/main" id="{A37CC594-CED6-4BC1-9787-C13121E617AF}"/>
+                <a16:creationId xmlns:a16="http://schemas.microsoft.com/office/drawing/2014/main" xmlns="" id="{A37CC594-CED6-4BC1-9787-C13121E617AF}"/>
               </a:ext>
             </a:extLst>
           </p:cNvPr>
@@ -2600,7 +2623,7 @@
           <p:cNvPr id="4" name="Text Placeholder 3">
             <a:extLst>
               <a:ext uri="{FF2B5EF4-FFF2-40B4-BE49-F238E27FC236}">
-                <a16:creationId xmlns:a16="http://schemas.microsoft.com/office/drawing/2014/main" id="{D963BFA9-E985-47A5-A187-5582E2D24CEF}"/>
+                <a16:creationId xmlns:a16="http://schemas.microsoft.com/office/drawing/2014/main" xmlns="" id="{D963BFA9-E985-47A5-A187-5582E2D24CEF}"/>
               </a:ext>
             </a:extLst>
           </p:cNvPr>
@@ -2671,7 +2694,7 @@
           <p:cNvPr id="5" name="Date Placeholder 4">
             <a:extLst>
               <a:ext uri="{FF2B5EF4-FFF2-40B4-BE49-F238E27FC236}">
-                <a16:creationId xmlns:a16="http://schemas.microsoft.com/office/drawing/2014/main" id="{05B04AFB-0592-446C-9C8F-BBCEAC1B4CE2}"/>
+                <a16:creationId xmlns:a16="http://schemas.microsoft.com/office/drawing/2014/main" xmlns="" id="{05B04AFB-0592-446C-9C8F-BBCEAC1B4CE2}"/>
               </a:ext>
             </a:extLst>
           </p:cNvPr>
@@ -2689,6 +2712,7 @@
           <a:p>
             <a:fld id="{07C149BE-AC79-4548-8B96-E3E2494BEA7F}" type="datetimeFigureOut">
               <a:rPr lang="en-US" smtClean="0"/>
+              <a:pPr/>
               <a:t>5/30/2022</a:t>
             </a:fld>
             <a:endParaRPr lang="en-US"/>
@@ -2700,7 +2724,7 @@
           <p:cNvPr id="6" name="Footer Placeholder 5">
             <a:extLst>
               <a:ext uri="{FF2B5EF4-FFF2-40B4-BE49-F238E27FC236}">
-                <a16:creationId xmlns:a16="http://schemas.microsoft.com/office/drawing/2014/main" id="{C83F3E0B-D30B-467E-821E-44CFA91419E1}"/>
+                <a16:creationId xmlns:a16="http://schemas.microsoft.com/office/drawing/2014/main" xmlns="" id="{C83F3E0B-D30B-467E-821E-44CFA91419E1}"/>
               </a:ext>
             </a:extLst>
           </p:cNvPr>
@@ -2725,7 +2749,7 @@
           <p:cNvPr id="7" name="Slide Number Placeholder 6">
             <a:extLst>
               <a:ext uri="{FF2B5EF4-FFF2-40B4-BE49-F238E27FC236}">
-                <a16:creationId xmlns:a16="http://schemas.microsoft.com/office/drawing/2014/main" id="{8927534D-FB98-40EB-B1E6-33B94173D12A}"/>
+                <a16:creationId xmlns:a16="http://schemas.microsoft.com/office/drawing/2014/main" xmlns="" id="{8927534D-FB98-40EB-B1E6-33B94173D12A}"/>
               </a:ext>
             </a:extLst>
           </p:cNvPr>
@@ -2743,6 +2767,7 @@
           <a:p>
             <a:fld id="{D5B41888-593B-4C9A-883D-13341236B250}" type="slidenum">
               <a:rPr lang="en-US" smtClean="0"/>
+              <a:pPr/>
               <a:t>‹#›</a:t>
             </a:fld>
             <a:endParaRPr lang="en-US"/>
@@ -2752,7 +2777,7 @@
     </p:spTree>
     <p:extLst>
       <p:ext uri="{BB962C8B-B14F-4D97-AF65-F5344CB8AC3E}">
-        <p14:creationId xmlns:p14="http://schemas.microsoft.com/office/powerpoint/2010/main" val="1278080938"/>
+        <p14:creationId xmlns:p14="http://schemas.microsoft.com/office/powerpoint/2010/main" xmlns="" val="1278080938"/>
       </p:ext>
     </p:extLst>
   </p:cSld>
@@ -2789,7 +2814,7 @@
           <p:cNvPr id="2" name="Title Placeholder 1">
             <a:extLst>
               <a:ext uri="{FF2B5EF4-FFF2-40B4-BE49-F238E27FC236}">
-                <a16:creationId xmlns:a16="http://schemas.microsoft.com/office/drawing/2014/main" id="{852422CA-C0EA-4719-9777-D1F04F93DE16}"/>
+                <a16:creationId xmlns:a16="http://schemas.microsoft.com/office/drawing/2014/main" xmlns="" id="{852422CA-C0EA-4719-9777-D1F04F93DE16}"/>
               </a:ext>
             </a:extLst>
           </p:cNvPr>
@@ -2827,7 +2852,7 @@
           <p:cNvPr id="3" name="Text Placeholder 2">
             <a:extLst>
               <a:ext uri="{FF2B5EF4-FFF2-40B4-BE49-F238E27FC236}">
-                <a16:creationId xmlns:a16="http://schemas.microsoft.com/office/drawing/2014/main" id="{8153B004-3B3D-41A5-9173-314908540CD8}"/>
+                <a16:creationId xmlns:a16="http://schemas.microsoft.com/office/drawing/2014/main" xmlns="" id="{8153B004-3B3D-41A5-9173-314908540CD8}"/>
               </a:ext>
             </a:extLst>
           </p:cNvPr>
@@ -2894,7 +2919,7 @@
           <p:cNvPr id="4" name="Date Placeholder 3">
             <a:extLst>
               <a:ext uri="{FF2B5EF4-FFF2-40B4-BE49-F238E27FC236}">
-                <a16:creationId xmlns:a16="http://schemas.microsoft.com/office/drawing/2014/main" id="{A89CE9E8-C902-4953-9D45-52329A2CBE10}"/>
+                <a16:creationId xmlns:a16="http://schemas.microsoft.com/office/drawing/2014/main" xmlns="" id="{A89CE9E8-C902-4953-9D45-52329A2CBE10}"/>
               </a:ext>
             </a:extLst>
           </p:cNvPr>
@@ -2930,6 +2955,7 @@
           <a:p>
             <a:fld id="{07C149BE-AC79-4548-8B96-E3E2494BEA7F}" type="datetimeFigureOut">
               <a:rPr lang="en-US" smtClean="0"/>
+              <a:pPr/>
               <a:t>5/30/2022</a:t>
             </a:fld>
             <a:endParaRPr lang="en-US"/>
@@ -2941,7 +2967,7 @@
           <p:cNvPr id="5" name="Footer Placeholder 4">
             <a:extLst>
               <a:ext uri="{FF2B5EF4-FFF2-40B4-BE49-F238E27FC236}">
-                <a16:creationId xmlns:a16="http://schemas.microsoft.com/office/drawing/2014/main" id="{529C69BF-04D0-43A8-8ED3-9E44BDFD8678}"/>
+                <a16:creationId xmlns:a16="http://schemas.microsoft.com/office/drawing/2014/main" xmlns="" id="{529C69BF-04D0-43A8-8ED3-9E44BDFD8678}"/>
               </a:ext>
             </a:extLst>
           </p:cNvPr>
@@ -2984,7 +3010,7 @@
           <p:cNvPr id="6" name="Slide Number Placeholder 5">
             <a:extLst>
               <a:ext uri="{FF2B5EF4-FFF2-40B4-BE49-F238E27FC236}">
-                <a16:creationId xmlns:a16="http://schemas.microsoft.com/office/drawing/2014/main" id="{E539C80B-D141-48A1-B602-0CFBFD20E28C}"/>
+                <a16:creationId xmlns:a16="http://schemas.microsoft.com/office/drawing/2014/main" xmlns="" id="{E539C80B-D141-48A1-B602-0CFBFD20E28C}"/>
               </a:ext>
             </a:extLst>
           </p:cNvPr>
@@ -3020,6 +3046,7 @@
           <a:p>
             <a:fld id="{D5B41888-593B-4C9A-883D-13341236B250}" type="slidenum">
               <a:rPr lang="en-US" smtClean="0"/>
+              <a:pPr/>
               <a:t>‹#›</a:t>
             </a:fld>
             <a:endParaRPr lang="en-US"/>
@@ -3029,7 +3056,7 @@
     </p:spTree>
     <p:extLst>
       <p:ext uri="{BB962C8B-B14F-4D97-AF65-F5344CB8AC3E}">
-        <p14:creationId xmlns:p14="http://schemas.microsoft.com/office/powerpoint/2010/main" val="2670624358"/>
+        <p14:creationId xmlns:p14="http://schemas.microsoft.com/office/powerpoint/2010/main" xmlns="" val="2670624358"/>
       </p:ext>
     </p:extLst>
   </p:cSld>
@@ -3352,7 +3379,7 @@
           <p:cNvPr id="4" name="Picture 3">
             <a:extLst>
               <a:ext uri="{FF2B5EF4-FFF2-40B4-BE49-F238E27FC236}">
-                <a16:creationId xmlns:a16="http://schemas.microsoft.com/office/drawing/2014/main" id="{2A31A68F-50A9-4114-81FC-0F57A61BB33C}"/>
+                <a16:creationId xmlns:a16="http://schemas.microsoft.com/office/drawing/2014/main" xmlns="" id="{2A31A68F-50A9-4114-81FC-0F57A61BB33C}"/>
               </a:ext>
             </a:extLst>
           </p:cNvPr>
@@ -3382,7 +3409,7 @@
           <p:cNvPr id="5" name="TextBox 4">
             <a:extLst>
               <a:ext uri="{FF2B5EF4-FFF2-40B4-BE49-F238E27FC236}">
-                <a16:creationId xmlns:a16="http://schemas.microsoft.com/office/drawing/2014/main" id="{342270AA-492E-468C-B5DF-D005AB39834E}"/>
+                <a16:creationId xmlns:a16="http://schemas.microsoft.com/office/drawing/2014/main" xmlns="" id="{342270AA-492E-468C-B5DF-D005AB39834E}"/>
               </a:ext>
             </a:extLst>
           </p:cNvPr>
@@ -3424,7 +3451,7 @@
           <p:cNvPr id="6" name="TextBox 5">
             <a:extLst>
               <a:ext uri="{FF2B5EF4-FFF2-40B4-BE49-F238E27FC236}">
-                <a16:creationId xmlns:a16="http://schemas.microsoft.com/office/drawing/2014/main" id="{E0095EF9-56A7-4741-B557-CC969F954602}"/>
+                <a16:creationId xmlns:a16="http://schemas.microsoft.com/office/drawing/2014/main" xmlns="" id="{E0095EF9-56A7-4741-B557-CC969F954602}"/>
               </a:ext>
             </a:extLst>
           </p:cNvPr>
@@ -3463,7 +3490,7 @@
     </p:spTree>
     <p:extLst>
       <p:ext uri="{BB962C8B-B14F-4D97-AF65-F5344CB8AC3E}">
-        <p14:creationId xmlns:p14="http://schemas.microsoft.com/office/powerpoint/2010/main" val="3818400074"/>
+        <p14:creationId xmlns:p14="http://schemas.microsoft.com/office/powerpoint/2010/main" xmlns="" val="3818400074"/>
       </p:ext>
     </p:extLst>
   </p:cSld>
@@ -3495,7 +3522,7 @@
           <p:cNvPr id="2" name="TextBox 1">
             <a:extLst>
               <a:ext uri="{FF2B5EF4-FFF2-40B4-BE49-F238E27FC236}">
-                <a16:creationId xmlns:a16="http://schemas.microsoft.com/office/drawing/2014/main" id="{8DA34F60-C036-4B57-8DAB-1153FCC4B013}"/>
+                <a16:creationId xmlns:a16="http://schemas.microsoft.com/office/drawing/2014/main" xmlns="" id="{8DA34F60-C036-4B57-8DAB-1153FCC4B013}"/>
               </a:ext>
             </a:extLst>
           </p:cNvPr>
@@ -3527,7 +3554,7 @@
           <p:cNvPr id="3" name="TextBox 2">
             <a:extLst>
               <a:ext uri="{FF2B5EF4-FFF2-40B4-BE49-F238E27FC236}">
-                <a16:creationId xmlns:a16="http://schemas.microsoft.com/office/drawing/2014/main" id="{B544C6B0-EF6C-4250-91BF-FF09779362BA}"/>
+                <a16:creationId xmlns:a16="http://schemas.microsoft.com/office/drawing/2014/main" xmlns="" id="{B544C6B0-EF6C-4250-91BF-FF09779362BA}"/>
               </a:ext>
             </a:extLst>
           </p:cNvPr>
@@ -3577,7 +3604,7 @@
           <p:cNvPr id="5" name="TextBox 4">
             <a:extLst>
               <a:ext uri="{FF2B5EF4-FFF2-40B4-BE49-F238E27FC236}">
-                <a16:creationId xmlns:a16="http://schemas.microsoft.com/office/drawing/2014/main" id="{71212FCE-4877-450F-9633-F9048A38CCF7}"/>
+                <a16:creationId xmlns:a16="http://schemas.microsoft.com/office/drawing/2014/main" xmlns="" id="{71212FCE-4877-450F-9633-F9048A38CCF7}"/>
               </a:ext>
             </a:extLst>
           </p:cNvPr>
@@ -3678,7 +3705,7 @@
     </p:spTree>
     <p:extLst>
       <p:ext uri="{BB962C8B-B14F-4D97-AF65-F5344CB8AC3E}">
-        <p14:creationId xmlns:p14="http://schemas.microsoft.com/office/powerpoint/2010/main" val="3816688537"/>
+        <p14:creationId xmlns:p14="http://schemas.microsoft.com/office/powerpoint/2010/main" xmlns="" val="3816688537"/>
       </p:ext>
     </p:extLst>
   </p:cSld>
@@ -3710,7 +3737,7 @@
           <p:cNvPr id="2" name="TextBox 1">
             <a:extLst>
               <a:ext uri="{FF2B5EF4-FFF2-40B4-BE49-F238E27FC236}">
-                <a16:creationId xmlns:a16="http://schemas.microsoft.com/office/drawing/2014/main" id="{8DA34F60-C036-4B57-8DAB-1153FCC4B013}"/>
+                <a16:creationId xmlns:a16="http://schemas.microsoft.com/office/drawing/2014/main" xmlns="" id="{8DA34F60-C036-4B57-8DAB-1153FCC4B013}"/>
               </a:ext>
             </a:extLst>
           </p:cNvPr>
@@ -3742,7 +3769,7 @@
           <p:cNvPr id="3" name="TextBox 2">
             <a:extLst>
               <a:ext uri="{FF2B5EF4-FFF2-40B4-BE49-F238E27FC236}">
-                <a16:creationId xmlns:a16="http://schemas.microsoft.com/office/drawing/2014/main" id="{B544C6B0-EF6C-4250-91BF-FF09779362BA}"/>
+                <a16:creationId xmlns:a16="http://schemas.microsoft.com/office/drawing/2014/main" xmlns="" id="{B544C6B0-EF6C-4250-91BF-FF09779362BA}"/>
               </a:ext>
             </a:extLst>
           </p:cNvPr>
@@ -3792,7 +3819,7 @@
           <p:cNvPr id="5" name="TextBox 4">
             <a:extLst>
               <a:ext uri="{FF2B5EF4-FFF2-40B4-BE49-F238E27FC236}">
-                <a16:creationId xmlns:a16="http://schemas.microsoft.com/office/drawing/2014/main" id="{71212FCE-4877-450F-9633-F9048A38CCF7}"/>
+                <a16:creationId xmlns:a16="http://schemas.microsoft.com/office/drawing/2014/main" xmlns="" id="{71212FCE-4877-450F-9633-F9048A38CCF7}"/>
               </a:ext>
             </a:extLst>
           </p:cNvPr>
@@ -3975,7 +4002,7 @@
     </p:spTree>
     <p:extLst>
       <p:ext uri="{BB962C8B-B14F-4D97-AF65-F5344CB8AC3E}">
-        <p14:creationId xmlns:p14="http://schemas.microsoft.com/office/powerpoint/2010/main" val="1542755298"/>
+        <p14:creationId xmlns:p14="http://schemas.microsoft.com/office/powerpoint/2010/main" xmlns="" val="1542755298"/>
       </p:ext>
     </p:extLst>
   </p:cSld>
@@ -4007,7 +4034,7 @@
           <p:cNvPr id="2" name="TextBox 1">
             <a:extLst>
               <a:ext uri="{FF2B5EF4-FFF2-40B4-BE49-F238E27FC236}">
-                <a16:creationId xmlns:a16="http://schemas.microsoft.com/office/drawing/2014/main" id="{8DA34F60-C036-4B57-8DAB-1153FCC4B013}"/>
+                <a16:creationId xmlns:a16="http://schemas.microsoft.com/office/drawing/2014/main" xmlns="" id="{8DA34F60-C036-4B57-8DAB-1153FCC4B013}"/>
               </a:ext>
             </a:extLst>
           </p:cNvPr>
@@ -4039,7 +4066,7 @@
           <p:cNvPr id="3" name="TextBox 2">
             <a:extLst>
               <a:ext uri="{FF2B5EF4-FFF2-40B4-BE49-F238E27FC236}">
-                <a16:creationId xmlns:a16="http://schemas.microsoft.com/office/drawing/2014/main" id="{B544C6B0-EF6C-4250-91BF-FF09779362BA}"/>
+                <a16:creationId xmlns:a16="http://schemas.microsoft.com/office/drawing/2014/main" xmlns="" id="{B544C6B0-EF6C-4250-91BF-FF09779362BA}"/>
               </a:ext>
             </a:extLst>
           </p:cNvPr>
@@ -4089,7 +4116,7 @@
           <p:cNvPr id="4" name="Picture 3">
             <a:extLst>
               <a:ext uri="{FF2B5EF4-FFF2-40B4-BE49-F238E27FC236}">
-                <a16:creationId xmlns:a16="http://schemas.microsoft.com/office/drawing/2014/main" id="{DF3D909F-A6CC-4C81-9FD6-0C6DE085A7C2}"/>
+                <a16:creationId xmlns:a16="http://schemas.microsoft.com/office/drawing/2014/main" xmlns="" id="{DF3D909F-A6CC-4C81-9FD6-0C6DE085A7C2}"/>
               </a:ext>
             </a:extLst>
           </p:cNvPr>
@@ -4117,7 +4144,7 @@
     </p:spTree>
     <p:extLst>
       <p:ext uri="{BB962C8B-B14F-4D97-AF65-F5344CB8AC3E}">
-        <p14:creationId xmlns:p14="http://schemas.microsoft.com/office/powerpoint/2010/main" val="3958164192"/>
+        <p14:creationId xmlns:p14="http://schemas.microsoft.com/office/powerpoint/2010/main" xmlns="" val="3958164192"/>
       </p:ext>
     </p:extLst>
   </p:cSld>
@@ -4149,7 +4176,7 @@
           <p:cNvPr id="3" name="TextBox 2">
             <a:extLst>
               <a:ext uri="{FF2B5EF4-FFF2-40B4-BE49-F238E27FC236}">
-                <a16:creationId xmlns:a16="http://schemas.microsoft.com/office/drawing/2014/main" id="{B544C6B0-EF6C-4250-91BF-FF09779362BA}"/>
+                <a16:creationId xmlns:a16="http://schemas.microsoft.com/office/drawing/2014/main" xmlns="" id="{B544C6B0-EF6C-4250-91BF-FF09779362BA}"/>
               </a:ext>
             </a:extLst>
           </p:cNvPr>
@@ -4199,7 +4226,7 @@
           <p:cNvPr id="5" name="TextBox 4">
             <a:extLst>
               <a:ext uri="{FF2B5EF4-FFF2-40B4-BE49-F238E27FC236}">
-                <a16:creationId xmlns:a16="http://schemas.microsoft.com/office/drawing/2014/main" id="{71212FCE-4877-450F-9633-F9048A38CCF7}"/>
+                <a16:creationId xmlns:a16="http://schemas.microsoft.com/office/drawing/2014/main" xmlns="" id="{71212FCE-4877-450F-9633-F9048A38CCF7}"/>
               </a:ext>
             </a:extLst>
           </p:cNvPr>
@@ -4287,7 +4314,7 @@
           <p:cNvPr id="4" name="Picture 3">
             <a:extLst>
               <a:ext uri="{FF2B5EF4-FFF2-40B4-BE49-F238E27FC236}">
-                <a16:creationId xmlns:a16="http://schemas.microsoft.com/office/drawing/2014/main" id="{8C545747-1B29-4E85-8E6F-DF7F259899FA}"/>
+                <a16:creationId xmlns:a16="http://schemas.microsoft.com/office/drawing/2014/main" xmlns="" id="{8C545747-1B29-4E85-8E6F-DF7F259899FA}"/>
               </a:ext>
             </a:extLst>
           </p:cNvPr>
@@ -4315,7 +4342,7 @@
     </p:spTree>
     <p:extLst>
       <p:ext uri="{BB962C8B-B14F-4D97-AF65-F5344CB8AC3E}">
-        <p14:creationId xmlns:p14="http://schemas.microsoft.com/office/powerpoint/2010/main" val="3203566452"/>
+        <p14:creationId xmlns:p14="http://schemas.microsoft.com/office/powerpoint/2010/main" xmlns="" val="3203566452"/>
       </p:ext>
     </p:extLst>
   </p:cSld>
@@ -4347,7 +4374,7 @@
           <p:cNvPr id="2" name="TextBox 1">
             <a:extLst>
               <a:ext uri="{FF2B5EF4-FFF2-40B4-BE49-F238E27FC236}">
-                <a16:creationId xmlns:a16="http://schemas.microsoft.com/office/drawing/2014/main" id="{8DA34F60-C036-4B57-8DAB-1153FCC4B013}"/>
+                <a16:creationId xmlns:a16="http://schemas.microsoft.com/office/drawing/2014/main" xmlns="" id="{8DA34F60-C036-4B57-8DAB-1153FCC4B013}"/>
               </a:ext>
             </a:extLst>
           </p:cNvPr>
@@ -4379,7 +4406,7 @@
           <p:cNvPr id="3" name="TextBox 2">
             <a:extLst>
               <a:ext uri="{FF2B5EF4-FFF2-40B4-BE49-F238E27FC236}">
-                <a16:creationId xmlns:a16="http://schemas.microsoft.com/office/drawing/2014/main" id="{B544C6B0-EF6C-4250-91BF-FF09779362BA}"/>
+                <a16:creationId xmlns:a16="http://schemas.microsoft.com/office/drawing/2014/main" xmlns="" id="{B544C6B0-EF6C-4250-91BF-FF09779362BA}"/>
               </a:ext>
             </a:extLst>
           </p:cNvPr>
@@ -4429,7 +4456,7 @@
           <p:cNvPr id="5" name="Picture 4">
             <a:extLst>
               <a:ext uri="{FF2B5EF4-FFF2-40B4-BE49-F238E27FC236}">
-                <a16:creationId xmlns:a16="http://schemas.microsoft.com/office/drawing/2014/main" id="{E6BB3409-F607-4F56-BD1E-C3D13C48AC59}"/>
+                <a16:creationId xmlns:a16="http://schemas.microsoft.com/office/drawing/2014/main" xmlns="" id="{E6BB3409-F607-4F56-BD1E-C3D13C48AC59}"/>
               </a:ext>
             </a:extLst>
           </p:cNvPr>
@@ -4457,7 +4484,7 @@
     </p:spTree>
     <p:extLst>
       <p:ext uri="{BB962C8B-B14F-4D97-AF65-F5344CB8AC3E}">
-        <p14:creationId xmlns:p14="http://schemas.microsoft.com/office/powerpoint/2010/main" val="3022272611"/>
+        <p14:creationId xmlns:p14="http://schemas.microsoft.com/office/powerpoint/2010/main" xmlns="" val="3022272611"/>
       </p:ext>
     </p:extLst>
   </p:cSld>
@@ -4489,7 +4516,7 @@
           <p:cNvPr id="2" name="TextBox 1">
             <a:extLst>
               <a:ext uri="{FF2B5EF4-FFF2-40B4-BE49-F238E27FC236}">
-                <a16:creationId xmlns:a16="http://schemas.microsoft.com/office/drawing/2014/main" id="{8DA34F60-C036-4B57-8DAB-1153FCC4B013}"/>
+                <a16:creationId xmlns:a16="http://schemas.microsoft.com/office/drawing/2014/main" xmlns="" id="{8DA34F60-C036-4B57-8DAB-1153FCC4B013}"/>
               </a:ext>
             </a:extLst>
           </p:cNvPr>
@@ -4521,7 +4548,7 @@
           <p:cNvPr id="3" name="TextBox 2">
             <a:extLst>
               <a:ext uri="{FF2B5EF4-FFF2-40B4-BE49-F238E27FC236}">
-                <a16:creationId xmlns:a16="http://schemas.microsoft.com/office/drawing/2014/main" id="{B544C6B0-EF6C-4250-91BF-FF09779362BA}"/>
+                <a16:creationId xmlns:a16="http://schemas.microsoft.com/office/drawing/2014/main" xmlns="" id="{B544C6B0-EF6C-4250-91BF-FF09779362BA}"/>
               </a:ext>
             </a:extLst>
           </p:cNvPr>
@@ -4571,7 +4598,7 @@
           <p:cNvPr id="4" name="TextBox 3">
             <a:extLst>
               <a:ext uri="{FF2B5EF4-FFF2-40B4-BE49-F238E27FC236}">
-                <a16:creationId xmlns:a16="http://schemas.microsoft.com/office/drawing/2014/main" id="{7D225B5D-7E58-4C92-AE25-5EBB812C70BD}"/>
+                <a16:creationId xmlns:a16="http://schemas.microsoft.com/office/drawing/2014/main" xmlns="" id="{7D225B5D-7E58-4C92-AE25-5EBB812C70BD}"/>
               </a:ext>
             </a:extLst>
           </p:cNvPr>
@@ -4612,7 +4639,7 @@
           <p:cNvPr id="6" name="Picture 5">
             <a:extLst>
               <a:ext uri="{FF2B5EF4-FFF2-40B4-BE49-F238E27FC236}">
-                <a16:creationId xmlns:a16="http://schemas.microsoft.com/office/drawing/2014/main" id="{81BA0196-9092-4FC1-9994-35E934224F1C}"/>
+                <a16:creationId xmlns:a16="http://schemas.microsoft.com/office/drawing/2014/main" xmlns="" id="{81BA0196-9092-4FC1-9994-35E934224F1C}"/>
               </a:ext>
             </a:extLst>
           </p:cNvPr>
@@ -4640,7 +4667,7 @@
     </p:spTree>
     <p:extLst>
       <p:ext uri="{BB962C8B-B14F-4D97-AF65-F5344CB8AC3E}">
-        <p14:creationId xmlns:p14="http://schemas.microsoft.com/office/powerpoint/2010/main" val="766276886"/>
+        <p14:creationId xmlns:p14="http://schemas.microsoft.com/office/powerpoint/2010/main" xmlns="" val="766276886"/>
       </p:ext>
     </p:extLst>
   </p:cSld>
@@ -4672,7 +4699,7 @@
           <p:cNvPr id="2" name="TextBox 1">
             <a:extLst>
               <a:ext uri="{FF2B5EF4-FFF2-40B4-BE49-F238E27FC236}">
-                <a16:creationId xmlns:a16="http://schemas.microsoft.com/office/drawing/2014/main" id="{8DA34F60-C036-4B57-8DAB-1153FCC4B013}"/>
+                <a16:creationId xmlns:a16="http://schemas.microsoft.com/office/drawing/2014/main" xmlns="" id="{8DA34F60-C036-4B57-8DAB-1153FCC4B013}"/>
               </a:ext>
             </a:extLst>
           </p:cNvPr>
@@ -4704,7 +4731,7 @@
           <p:cNvPr id="3" name="TextBox 2">
             <a:extLst>
               <a:ext uri="{FF2B5EF4-FFF2-40B4-BE49-F238E27FC236}">
-                <a16:creationId xmlns:a16="http://schemas.microsoft.com/office/drawing/2014/main" id="{B544C6B0-EF6C-4250-91BF-FF09779362BA}"/>
+                <a16:creationId xmlns:a16="http://schemas.microsoft.com/office/drawing/2014/main" xmlns="" id="{B544C6B0-EF6C-4250-91BF-FF09779362BA}"/>
               </a:ext>
             </a:extLst>
           </p:cNvPr>
@@ -4754,7 +4781,7 @@
           <p:cNvPr id="4" name="TextBox 3">
             <a:extLst>
               <a:ext uri="{FF2B5EF4-FFF2-40B4-BE49-F238E27FC236}">
-                <a16:creationId xmlns:a16="http://schemas.microsoft.com/office/drawing/2014/main" id="{7D225B5D-7E58-4C92-AE25-5EBB812C70BD}"/>
+                <a16:creationId xmlns:a16="http://schemas.microsoft.com/office/drawing/2014/main" xmlns="" id="{7D225B5D-7E58-4C92-AE25-5EBB812C70BD}"/>
               </a:ext>
             </a:extLst>
           </p:cNvPr>
@@ -4797,7 +4824,7 @@
           <p:cNvPr id="5" name="Picture 4">
             <a:extLst>
               <a:ext uri="{FF2B5EF4-FFF2-40B4-BE49-F238E27FC236}">
-                <a16:creationId xmlns:a16="http://schemas.microsoft.com/office/drawing/2014/main" id="{FB95B9C8-D0D8-4476-BA5B-091292DE81AB}"/>
+                <a16:creationId xmlns:a16="http://schemas.microsoft.com/office/drawing/2014/main" xmlns="" id="{FB95B9C8-D0D8-4476-BA5B-091292DE81AB}"/>
               </a:ext>
             </a:extLst>
           </p:cNvPr>
@@ -4825,7 +4852,7 @@
     </p:spTree>
     <p:extLst>
       <p:ext uri="{BB962C8B-B14F-4D97-AF65-F5344CB8AC3E}">
-        <p14:creationId xmlns:p14="http://schemas.microsoft.com/office/powerpoint/2010/main" val="4223697484"/>
+        <p14:creationId xmlns:p14="http://schemas.microsoft.com/office/powerpoint/2010/main" xmlns="" val="4223697484"/>
       </p:ext>
     </p:extLst>
   </p:cSld>
@@ -4857,7 +4884,7 @@
           <p:cNvPr id="2" name="TextBox 1">
             <a:extLst>
               <a:ext uri="{FF2B5EF4-FFF2-40B4-BE49-F238E27FC236}">
-                <a16:creationId xmlns:a16="http://schemas.microsoft.com/office/drawing/2014/main" id="{8DA34F60-C036-4B57-8DAB-1153FCC4B013}"/>
+                <a16:creationId xmlns:a16="http://schemas.microsoft.com/office/drawing/2014/main" xmlns="" id="{8DA34F60-C036-4B57-8DAB-1153FCC4B013}"/>
               </a:ext>
             </a:extLst>
           </p:cNvPr>
@@ -4889,7 +4916,7 @@
           <p:cNvPr id="3" name="TextBox 2">
             <a:extLst>
               <a:ext uri="{FF2B5EF4-FFF2-40B4-BE49-F238E27FC236}">
-                <a16:creationId xmlns:a16="http://schemas.microsoft.com/office/drawing/2014/main" id="{B544C6B0-EF6C-4250-91BF-FF09779362BA}"/>
+                <a16:creationId xmlns:a16="http://schemas.microsoft.com/office/drawing/2014/main" xmlns="" id="{B544C6B0-EF6C-4250-91BF-FF09779362BA}"/>
               </a:ext>
             </a:extLst>
           </p:cNvPr>
@@ -4939,7 +4966,7 @@
           <p:cNvPr id="6" name="Picture 5">
             <a:extLst>
               <a:ext uri="{FF2B5EF4-FFF2-40B4-BE49-F238E27FC236}">
-                <a16:creationId xmlns:a16="http://schemas.microsoft.com/office/drawing/2014/main" id="{67BADEDF-A29C-47F4-ABE8-17DB91AAFB08}"/>
+                <a16:creationId xmlns:a16="http://schemas.microsoft.com/office/drawing/2014/main" xmlns="" id="{67BADEDF-A29C-47F4-ABE8-17DB91AAFB08}"/>
               </a:ext>
             </a:extLst>
           </p:cNvPr>
@@ -4967,7 +4994,7 @@
     </p:spTree>
     <p:extLst>
       <p:ext uri="{BB962C8B-B14F-4D97-AF65-F5344CB8AC3E}">
-        <p14:creationId xmlns:p14="http://schemas.microsoft.com/office/powerpoint/2010/main" val="645252625"/>
+        <p14:creationId xmlns:p14="http://schemas.microsoft.com/office/powerpoint/2010/main" xmlns="" val="645252625"/>
       </p:ext>
     </p:extLst>
   </p:cSld>
@@ -4999,7 +5026,7 @@
           <p:cNvPr id="3" name="TextBox 2">
             <a:extLst>
               <a:ext uri="{FF2B5EF4-FFF2-40B4-BE49-F238E27FC236}">
-                <a16:creationId xmlns:a16="http://schemas.microsoft.com/office/drawing/2014/main" id="{B544C6B0-EF6C-4250-91BF-FF09779362BA}"/>
+                <a16:creationId xmlns:a16="http://schemas.microsoft.com/office/drawing/2014/main" xmlns="" id="{B544C6B0-EF6C-4250-91BF-FF09779362BA}"/>
               </a:ext>
             </a:extLst>
           </p:cNvPr>
@@ -5073,7 +5100,7 @@
           <p:cNvPr id="4" name="Picture 3">
             <a:extLst>
               <a:ext uri="{FF2B5EF4-FFF2-40B4-BE49-F238E27FC236}">
-                <a16:creationId xmlns:a16="http://schemas.microsoft.com/office/drawing/2014/main" id="{DD427C27-EAF9-4FB5-988B-DD7EA9C9B3EE}"/>
+                <a16:creationId xmlns:a16="http://schemas.microsoft.com/office/drawing/2014/main" xmlns="" id="{DD427C27-EAF9-4FB5-988B-DD7EA9C9B3EE}"/>
               </a:ext>
             </a:extLst>
           </p:cNvPr>
@@ -5103,7 +5130,7 @@
           <p:cNvPr id="5" name="TextBox 4">
             <a:extLst>
               <a:ext uri="{FF2B5EF4-FFF2-40B4-BE49-F238E27FC236}">
-                <a16:creationId xmlns:a16="http://schemas.microsoft.com/office/drawing/2014/main" id="{CBE994F0-5260-4159-B053-FBF3864A99F7}"/>
+                <a16:creationId xmlns:a16="http://schemas.microsoft.com/office/drawing/2014/main" xmlns="" id="{CBE994F0-5260-4159-B053-FBF3864A99F7}"/>
               </a:ext>
             </a:extLst>
           </p:cNvPr>
@@ -5142,7 +5169,7 @@
     </p:spTree>
     <p:extLst>
       <p:ext uri="{BB962C8B-B14F-4D97-AF65-F5344CB8AC3E}">
-        <p14:creationId xmlns:p14="http://schemas.microsoft.com/office/powerpoint/2010/main" val="3253466569"/>
+        <p14:creationId xmlns:p14="http://schemas.microsoft.com/office/powerpoint/2010/main" xmlns="" val="3253466569"/>
       </p:ext>
     </p:extLst>
   </p:cSld>
@@ -5174,7 +5201,7 @@
           <p:cNvPr id="2" name="TextBox 1">
             <a:extLst>
               <a:ext uri="{FF2B5EF4-FFF2-40B4-BE49-F238E27FC236}">
-                <a16:creationId xmlns:a16="http://schemas.microsoft.com/office/drawing/2014/main" id="{8DA34F60-C036-4B57-8DAB-1153FCC4B013}"/>
+                <a16:creationId xmlns:a16="http://schemas.microsoft.com/office/drawing/2014/main" xmlns="" id="{8DA34F60-C036-4B57-8DAB-1153FCC4B013}"/>
               </a:ext>
             </a:extLst>
           </p:cNvPr>
@@ -5206,7 +5233,7 @@
           <p:cNvPr id="3" name="TextBox 2">
             <a:extLst>
               <a:ext uri="{FF2B5EF4-FFF2-40B4-BE49-F238E27FC236}">
-                <a16:creationId xmlns:a16="http://schemas.microsoft.com/office/drawing/2014/main" id="{B544C6B0-EF6C-4250-91BF-FF09779362BA}"/>
+                <a16:creationId xmlns:a16="http://schemas.microsoft.com/office/drawing/2014/main" xmlns="" id="{B544C6B0-EF6C-4250-91BF-FF09779362BA}"/>
               </a:ext>
             </a:extLst>
           </p:cNvPr>
@@ -5256,7 +5283,7 @@
           <p:cNvPr id="4" name="TextBox 3">
             <a:extLst>
               <a:ext uri="{FF2B5EF4-FFF2-40B4-BE49-F238E27FC236}">
-                <a16:creationId xmlns:a16="http://schemas.microsoft.com/office/drawing/2014/main" id="{9B8DFFC6-F5A1-437C-96C6-D9151B948833}"/>
+                <a16:creationId xmlns:a16="http://schemas.microsoft.com/office/drawing/2014/main" xmlns="" id="{9B8DFFC6-F5A1-437C-96C6-D9151B948833}"/>
               </a:ext>
             </a:extLst>
           </p:cNvPr>
@@ -5480,7 +5507,7 @@
     </p:spTree>
     <p:extLst>
       <p:ext uri="{BB962C8B-B14F-4D97-AF65-F5344CB8AC3E}">
-        <p14:creationId xmlns:p14="http://schemas.microsoft.com/office/powerpoint/2010/main" val="1591769494"/>
+        <p14:creationId xmlns:p14="http://schemas.microsoft.com/office/powerpoint/2010/main" xmlns="" val="1591769494"/>
       </p:ext>
     </p:extLst>
   </p:cSld>
@@ -5512,7 +5539,7 @@
           <p:cNvPr id="5" name="TextBox 4">
             <a:extLst>
               <a:ext uri="{FF2B5EF4-FFF2-40B4-BE49-F238E27FC236}">
-                <a16:creationId xmlns:a16="http://schemas.microsoft.com/office/drawing/2014/main" id="{342270AA-492E-468C-B5DF-D005AB39834E}"/>
+                <a16:creationId xmlns:a16="http://schemas.microsoft.com/office/drawing/2014/main" xmlns="" id="{342270AA-492E-468C-B5DF-D005AB39834E}"/>
               </a:ext>
             </a:extLst>
           </p:cNvPr>
@@ -5565,7 +5592,7 @@
           <p:cNvPr id="2" name="Picture 1">
             <a:extLst>
               <a:ext uri="{FF2B5EF4-FFF2-40B4-BE49-F238E27FC236}">
-                <a16:creationId xmlns:a16="http://schemas.microsoft.com/office/drawing/2014/main" id="{980B4F3C-5353-4BCE-AD42-3222A6EAC2EE}"/>
+                <a16:creationId xmlns:a16="http://schemas.microsoft.com/office/drawing/2014/main" xmlns="" id="{980B4F3C-5353-4BCE-AD42-3222A6EAC2EE}"/>
               </a:ext>
             </a:extLst>
           </p:cNvPr>
@@ -5593,7 +5620,7 @@
     </p:spTree>
     <p:extLst>
       <p:ext uri="{BB962C8B-B14F-4D97-AF65-F5344CB8AC3E}">
-        <p14:creationId xmlns:p14="http://schemas.microsoft.com/office/powerpoint/2010/main" val="2322284118"/>
+        <p14:creationId xmlns:p14="http://schemas.microsoft.com/office/powerpoint/2010/main" xmlns="" val="2322284118"/>
       </p:ext>
     </p:extLst>
   </p:cSld>
@@ -5620,12 +5647,696 @@
           <a:chExt cx="0" cy="0"/>
         </a:xfrm>
       </p:grpSpPr>
-      <p:sp>
-        <p:nvSpPr>
-          <p:cNvPr id="2" name="TextBox 1">
-            <a:extLst>
-              <a:ext uri="{FF2B5EF4-FFF2-40B4-BE49-F238E27FC236}">
-                <a16:creationId xmlns:a16="http://schemas.microsoft.com/office/drawing/2014/main" id="{8DA34F60-C036-4B57-8DAB-1153FCC4B013}"/>
+      <p:grpSp>
+        <p:nvGrpSpPr>
+          <p:cNvPr id="29" name="Group 28"/>
+          <p:cNvGrpSpPr/>
+          <p:nvPr/>
+        </p:nvGrpSpPr>
+        <p:grpSpPr>
+          <a:xfrm>
+            <a:off x="599440" y="2164112"/>
+            <a:ext cx="11043910" cy="2828052"/>
+            <a:chOff x="599440" y="701040"/>
+            <a:chExt cx="11043910" cy="2828052"/>
+          </a:xfrm>
+        </p:grpSpPr>
+        <p:sp>
+          <p:nvSpPr>
+            <p:cNvPr id="4" name="Rectangle 3">
+              <a:extLst>
+                <a:ext uri="{FF2B5EF4-FFF2-40B4-BE49-F238E27FC236}">
+                  <a16:creationId xmlns:a16="http://schemas.microsoft.com/office/drawing/2014/main" xmlns="" id="{EC5143AD-4D67-4C7B-AD8E-160E06C245D1}"/>
+                </a:ext>
+              </a:extLst>
+            </p:cNvPr>
+            <p:cNvSpPr/>
+            <p:nvPr/>
+          </p:nvSpPr>
+          <p:spPr>
+            <a:xfrm>
+              <a:off x="3942080" y="701040"/>
+              <a:ext cx="3881120" cy="548640"/>
+            </a:xfrm>
+            <a:prstGeom prst="rect">
+              <a:avLst/>
+            </a:prstGeom>
+            <a:noFill/>
+          </p:spPr>
+          <p:style>
+            <a:lnRef idx="2">
+              <a:schemeClr val="accent1">
+                <a:shade val="50000"/>
+              </a:schemeClr>
+            </a:lnRef>
+            <a:fillRef idx="1">
+              <a:schemeClr val="accent1"/>
+            </a:fillRef>
+            <a:effectRef idx="0">
+              <a:schemeClr val="accent1"/>
+            </a:effectRef>
+            <a:fontRef idx="minor">
+              <a:schemeClr val="lt1"/>
+            </a:fontRef>
+          </p:style>
+          <p:txBody>
+            <a:bodyPr rtlCol="0" anchor="ctr"/>
+            <a:lstStyle/>
+            <a:p>
+              <a:pPr algn="ctr"/>
+              <a:endParaRPr lang="en-US"/>
+            </a:p>
+          </p:txBody>
+        </p:sp>
+        <p:sp>
+          <p:nvSpPr>
+            <p:cNvPr id="5" name="TextBox 4">
+              <a:extLst>
+                <a:ext uri="{FF2B5EF4-FFF2-40B4-BE49-F238E27FC236}">
+                  <a16:creationId xmlns:a16="http://schemas.microsoft.com/office/drawing/2014/main" xmlns="" id="{8C56556E-E067-4FC4-B0B5-ED770D22DC5F}"/>
+                </a:ext>
+              </a:extLst>
+            </p:cNvPr>
+            <p:cNvSpPr txBox="1"/>
+            <p:nvPr/>
+          </p:nvSpPr>
+          <p:spPr>
+            <a:xfrm>
+              <a:off x="5049520" y="812800"/>
+              <a:ext cx="1402080" cy="369332"/>
+            </a:xfrm>
+            <a:prstGeom prst="rect">
+              <a:avLst/>
+            </a:prstGeom>
+            <a:noFill/>
+          </p:spPr>
+          <p:txBody>
+            <a:bodyPr wrap="square" rtlCol="0">
+              <a:spAutoFit/>
+            </a:bodyPr>
+            <a:lstStyle/>
+            <a:p>
+              <a:r>
+                <a:rPr lang="en-US" dirty="0"/>
+                <a:t>Main branch</a:t>
+              </a:r>
+            </a:p>
+          </p:txBody>
+        </p:sp>
+        <p:cxnSp>
+          <p:nvCxnSpPr>
+            <p:cNvPr id="7" name="Straight Connector 6">
+              <a:extLst>
+                <a:ext uri="{FF2B5EF4-FFF2-40B4-BE49-F238E27FC236}">
+                  <a16:creationId xmlns:a16="http://schemas.microsoft.com/office/drawing/2014/main" xmlns="" id="{19BBE1A2-E3F7-4197-BF83-99EAA1C6DAEE}"/>
+                </a:ext>
+              </a:extLst>
+            </p:cNvPr>
+            <p:cNvCxnSpPr>
+              <a:cxnSpLocks/>
+              <a:stCxn id="4" idx="2"/>
+              <a:endCxn id="8" idx="0"/>
+            </p:cNvCxnSpPr>
+            <p:nvPr/>
+          </p:nvCxnSpPr>
+          <p:spPr>
+            <a:xfrm>
+              <a:off x="5882640" y="1249680"/>
+              <a:ext cx="35560" cy="467360"/>
+            </a:xfrm>
+            <a:prstGeom prst="line">
+              <a:avLst/>
+            </a:prstGeom>
+          </p:spPr>
+          <p:style>
+            <a:lnRef idx="1">
+              <a:schemeClr val="accent1"/>
+            </a:lnRef>
+            <a:fillRef idx="0">
+              <a:schemeClr val="accent1"/>
+            </a:fillRef>
+            <a:effectRef idx="0">
+              <a:schemeClr val="accent1"/>
+            </a:effectRef>
+            <a:fontRef idx="minor">
+              <a:schemeClr val="tx1"/>
+            </a:fontRef>
+          </p:style>
+        </p:cxnSp>
+        <p:sp>
+          <p:nvSpPr>
+            <p:cNvPr id="8" name="Rectangle 7">
+              <a:extLst>
+                <a:ext uri="{FF2B5EF4-FFF2-40B4-BE49-F238E27FC236}">
+                  <a16:creationId xmlns:a16="http://schemas.microsoft.com/office/drawing/2014/main" xmlns="" id="{53FB852D-81CE-4E91-88D7-F5A6315E7F9D}"/>
+                </a:ext>
+              </a:extLst>
+            </p:cNvPr>
+            <p:cNvSpPr/>
+            <p:nvPr/>
+          </p:nvSpPr>
+          <p:spPr>
+            <a:xfrm>
+              <a:off x="3942080" y="1717040"/>
+              <a:ext cx="3952240" cy="548640"/>
+            </a:xfrm>
+            <a:prstGeom prst="rect">
+              <a:avLst/>
+            </a:prstGeom>
+            <a:noFill/>
+          </p:spPr>
+          <p:style>
+            <a:lnRef idx="2">
+              <a:schemeClr val="accent1">
+                <a:shade val="50000"/>
+              </a:schemeClr>
+            </a:lnRef>
+            <a:fillRef idx="1">
+              <a:schemeClr val="accent1"/>
+            </a:fillRef>
+            <a:effectRef idx="0">
+              <a:schemeClr val="accent1"/>
+            </a:effectRef>
+            <a:fontRef idx="minor">
+              <a:schemeClr val="lt1"/>
+            </a:fontRef>
+          </p:style>
+          <p:txBody>
+            <a:bodyPr rtlCol="0" anchor="ctr"/>
+            <a:lstStyle/>
+            <a:p>
+              <a:pPr algn="ctr"/>
+              <a:endParaRPr lang="en-US"/>
+            </a:p>
+          </p:txBody>
+        </p:sp>
+        <p:sp>
+          <p:nvSpPr>
+            <p:cNvPr id="9" name="TextBox 8">
+              <a:extLst>
+                <a:ext uri="{FF2B5EF4-FFF2-40B4-BE49-F238E27FC236}">
+                  <a16:creationId xmlns:a16="http://schemas.microsoft.com/office/drawing/2014/main" xmlns="" id="{56FF7CF5-5CC0-4132-8128-49F5B8F194CE}"/>
+                </a:ext>
+              </a:extLst>
+            </p:cNvPr>
+            <p:cNvSpPr txBox="1"/>
+            <p:nvPr/>
+          </p:nvSpPr>
+          <p:spPr>
+            <a:xfrm>
+              <a:off x="4572000" y="1808480"/>
+              <a:ext cx="3007360" cy="369332"/>
+            </a:xfrm>
+            <a:prstGeom prst="rect">
+              <a:avLst/>
+            </a:prstGeom>
+            <a:noFill/>
+          </p:spPr>
+          <p:txBody>
+            <a:bodyPr wrap="square" rtlCol="0">
+              <a:spAutoFit/>
+            </a:bodyPr>
+            <a:lstStyle/>
+            <a:p>
+              <a:r>
+                <a:rPr lang="en-US" dirty="0"/>
+                <a:t>Develop branch (child of Main</a:t>
+              </a:r>
+            </a:p>
+          </p:txBody>
+        </p:sp>
+        <p:cxnSp>
+          <p:nvCxnSpPr>
+            <p:cNvPr id="12" name="Straight Connector 11">
+              <a:extLst>
+                <a:ext uri="{FF2B5EF4-FFF2-40B4-BE49-F238E27FC236}">
+                  <a16:creationId xmlns:a16="http://schemas.microsoft.com/office/drawing/2014/main" xmlns="" id="{B8E257B8-94BC-4EE5-B79A-F8DE2A59751F}"/>
+                </a:ext>
+              </a:extLst>
+            </p:cNvPr>
+            <p:cNvCxnSpPr>
+              <a:cxnSpLocks/>
+              <a:stCxn id="8" idx="2"/>
+            </p:cNvCxnSpPr>
+            <p:nvPr/>
+          </p:nvCxnSpPr>
+          <p:spPr>
+            <a:xfrm>
+              <a:off x="5918200" y="2265680"/>
+              <a:ext cx="0" cy="487680"/>
+            </a:xfrm>
+            <a:prstGeom prst="line">
+              <a:avLst/>
+            </a:prstGeom>
+          </p:spPr>
+          <p:style>
+            <a:lnRef idx="1">
+              <a:schemeClr val="accent1"/>
+            </a:lnRef>
+            <a:fillRef idx="0">
+              <a:schemeClr val="accent1"/>
+            </a:fillRef>
+            <a:effectRef idx="0">
+              <a:schemeClr val="accent1"/>
+            </a:effectRef>
+            <a:fontRef idx="minor">
+              <a:schemeClr val="tx1"/>
+            </a:fontRef>
+          </p:style>
+        </p:cxnSp>
+        <p:cxnSp>
+          <p:nvCxnSpPr>
+            <p:cNvPr id="14" name="Straight Connector 13">
+              <a:extLst>
+                <a:ext uri="{FF2B5EF4-FFF2-40B4-BE49-F238E27FC236}">
+                  <a16:creationId xmlns:a16="http://schemas.microsoft.com/office/drawing/2014/main" xmlns="" id="{062B4D7B-9553-467D-8F20-CBE53C50E1D2}"/>
+                </a:ext>
+              </a:extLst>
+            </p:cNvPr>
+            <p:cNvCxnSpPr/>
+            <p:nvPr/>
+          </p:nvCxnSpPr>
+          <p:spPr>
+            <a:xfrm>
+              <a:off x="1529080" y="2763520"/>
+              <a:ext cx="9133840" cy="0"/>
+            </a:xfrm>
+            <a:prstGeom prst="line">
+              <a:avLst/>
+            </a:prstGeom>
+          </p:spPr>
+          <p:style>
+            <a:lnRef idx="1">
+              <a:schemeClr val="accent1"/>
+            </a:lnRef>
+            <a:fillRef idx="0">
+              <a:schemeClr val="accent1"/>
+            </a:fillRef>
+            <a:effectRef idx="0">
+              <a:schemeClr val="accent1"/>
+            </a:effectRef>
+            <a:fontRef idx="minor">
+              <a:schemeClr val="tx1"/>
+            </a:fontRef>
+          </p:style>
+        </p:cxnSp>
+        <p:cxnSp>
+          <p:nvCxnSpPr>
+            <p:cNvPr id="17" name="Straight Connector 16">
+              <a:extLst>
+                <a:ext uri="{FF2B5EF4-FFF2-40B4-BE49-F238E27FC236}">
+                  <a16:creationId xmlns:a16="http://schemas.microsoft.com/office/drawing/2014/main" xmlns="" id="{D4D8EC26-3092-4BEE-A15F-09F9FB4B79E2}"/>
+                </a:ext>
+              </a:extLst>
+            </p:cNvPr>
+            <p:cNvCxnSpPr/>
+            <p:nvPr/>
+          </p:nvCxnSpPr>
+          <p:spPr>
+            <a:xfrm>
+              <a:off x="1534160" y="2753360"/>
+              <a:ext cx="0" cy="365760"/>
+            </a:xfrm>
+            <a:prstGeom prst="line">
+              <a:avLst/>
+            </a:prstGeom>
+          </p:spPr>
+          <p:style>
+            <a:lnRef idx="1">
+              <a:schemeClr val="accent1"/>
+            </a:lnRef>
+            <a:fillRef idx="0">
+              <a:schemeClr val="accent1"/>
+            </a:fillRef>
+            <a:effectRef idx="0">
+              <a:schemeClr val="accent1"/>
+            </a:effectRef>
+            <a:fontRef idx="minor">
+              <a:schemeClr val="tx1"/>
+            </a:fontRef>
+          </p:style>
+        </p:cxnSp>
+        <p:cxnSp>
+          <p:nvCxnSpPr>
+            <p:cNvPr id="19" name="Straight Connector 18">
+              <a:extLst>
+                <a:ext uri="{FF2B5EF4-FFF2-40B4-BE49-F238E27FC236}">
+                  <a16:creationId xmlns:a16="http://schemas.microsoft.com/office/drawing/2014/main" xmlns="" id="{F88C590A-CD49-4E76-93C1-DBAECF777645}"/>
+                </a:ext>
+              </a:extLst>
+            </p:cNvPr>
+            <p:cNvCxnSpPr/>
+            <p:nvPr/>
+          </p:nvCxnSpPr>
+          <p:spPr>
+            <a:xfrm>
+              <a:off x="3708400" y="2753360"/>
+              <a:ext cx="0" cy="365760"/>
+            </a:xfrm>
+            <a:prstGeom prst="line">
+              <a:avLst/>
+            </a:prstGeom>
+          </p:spPr>
+          <p:style>
+            <a:lnRef idx="1">
+              <a:schemeClr val="accent1"/>
+            </a:lnRef>
+            <a:fillRef idx="0">
+              <a:schemeClr val="accent1"/>
+            </a:fillRef>
+            <a:effectRef idx="0">
+              <a:schemeClr val="accent1"/>
+            </a:effectRef>
+            <a:fontRef idx="minor">
+              <a:schemeClr val="tx1"/>
+            </a:fontRef>
+          </p:style>
+        </p:cxnSp>
+        <p:cxnSp>
+          <p:nvCxnSpPr>
+            <p:cNvPr id="20" name="Straight Connector 19">
+              <a:extLst>
+                <a:ext uri="{FF2B5EF4-FFF2-40B4-BE49-F238E27FC236}">
+                  <a16:creationId xmlns:a16="http://schemas.microsoft.com/office/drawing/2014/main" xmlns="" id="{8FA7ECDC-6889-4CDD-83E5-357686B28B2A}"/>
+                </a:ext>
+              </a:extLst>
+            </p:cNvPr>
+            <p:cNvCxnSpPr/>
+            <p:nvPr/>
+          </p:nvCxnSpPr>
+          <p:spPr>
+            <a:xfrm>
+              <a:off x="5648960" y="2743200"/>
+              <a:ext cx="0" cy="365760"/>
+            </a:xfrm>
+            <a:prstGeom prst="line">
+              <a:avLst/>
+            </a:prstGeom>
+          </p:spPr>
+          <p:style>
+            <a:lnRef idx="1">
+              <a:schemeClr val="accent1"/>
+            </a:lnRef>
+            <a:fillRef idx="0">
+              <a:schemeClr val="accent1"/>
+            </a:fillRef>
+            <a:effectRef idx="0">
+              <a:schemeClr val="accent1"/>
+            </a:effectRef>
+            <a:fontRef idx="minor">
+              <a:schemeClr val="tx1"/>
+            </a:fontRef>
+          </p:style>
+        </p:cxnSp>
+        <p:cxnSp>
+          <p:nvCxnSpPr>
+            <p:cNvPr id="21" name="Straight Connector 20">
+              <a:extLst>
+                <a:ext uri="{FF2B5EF4-FFF2-40B4-BE49-F238E27FC236}">
+                  <a16:creationId xmlns:a16="http://schemas.microsoft.com/office/drawing/2014/main" xmlns="" id="{DA4EA02E-A089-4717-873F-4FC7F7F86923}"/>
+                </a:ext>
+              </a:extLst>
+            </p:cNvPr>
+            <p:cNvCxnSpPr/>
+            <p:nvPr/>
+          </p:nvCxnSpPr>
+          <p:spPr>
+            <a:xfrm>
+              <a:off x="7874000" y="2733040"/>
+              <a:ext cx="0" cy="365760"/>
+            </a:xfrm>
+            <a:prstGeom prst="line">
+              <a:avLst/>
+            </a:prstGeom>
+          </p:spPr>
+          <p:style>
+            <a:lnRef idx="1">
+              <a:schemeClr val="accent1"/>
+            </a:lnRef>
+            <a:fillRef idx="0">
+              <a:schemeClr val="accent1"/>
+            </a:fillRef>
+            <a:effectRef idx="0">
+              <a:schemeClr val="accent1"/>
+            </a:effectRef>
+            <a:fontRef idx="minor">
+              <a:schemeClr val="tx1"/>
+            </a:fontRef>
+          </p:style>
+        </p:cxnSp>
+        <p:cxnSp>
+          <p:nvCxnSpPr>
+            <p:cNvPr id="22" name="Straight Connector 21">
+              <a:extLst>
+                <a:ext uri="{FF2B5EF4-FFF2-40B4-BE49-F238E27FC236}">
+                  <a16:creationId xmlns:a16="http://schemas.microsoft.com/office/drawing/2014/main" xmlns="" id="{AFB21F47-2FD5-430E-B1F0-FAE07309E98E}"/>
+                </a:ext>
+              </a:extLst>
+            </p:cNvPr>
+            <p:cNvCxnSpPr/>
+            <p:nvPr/>
+          </p:nvCxnSpPr>
+          <p:spPr>
+            <a:xfrm>
+              <a:off x="10627360" y="2743200"/>
+              <a:ext cx="0" cy="365760"/>
+            </a:xfrm>
+            <a:prstGeom prst="line">
+              <a:avLst/>
+            </a:prstGeom>
+          </p:spPr>
+          <p:style>
+            <a:lnRef idx="1">
+              <a:schemeClr val="accent1"/>
+            </a:lnRef>
+            <a:fillRef idx="0">
+              <a:schemeClr val="accent1"/>
+            </a:fillRef>
+            <a:effectRef idx="0">
+              <a:schemeClr val="accent1"/>
+            </a:effectRef>
+            <a:fontRef idx="minor">
+              <a:schemeClr val="tx1"/>
+            </a:fontRef>
+          </p:style>
+        </p:cxnSp>
+        <p:sp>
+          <p:nvSpPr>
+            <p:cNvPr id="23" name="TextBox 22">
+              <a:extLst>
+                <a:ext uri="{FF2B5EF4-FFF2-40B4-BE49-F238E27FC236}">
+                  <a16:creationId xmlns:a16="http://schemas.microsoft.com/office/drawing/2014/main" xmlns="" id="{B64BB359-F08B-44C6-A090-1507EB5E8877}"/>
+                </a:ext>
+              </a:extLst>
+            </p:cNvPr>
+            <p:cNvSpPr txBox="1"/>
+            <p:nvPr/>
+          </p:nvSpPr>
+          <p:spPr>
+            <a:xfrm>
+              <a:off x="599440" y="3129280"/>
+              <a:ext cx="2204710" cy="369332"/>
+            </a:xfrm>
+            <a:prstGeom prst="rect">
+              <a:avLst/>
+            </a:prstGeom>
+            <a:noFill/>
+          </p:spPr>
+          <p:txBody>
+            <a:bodyPr wrap="square" rtlCol="0">
+              <a:spAutoFit/>
+            </a:bodyPr>
+            <a:lstStyle/>
+            <a:p>
+              <a:r>
+                <a:rPr lang="en-US" dirty="0"/>
+                <a:t>Feature branch 1</a:t>
+              </a:r>
+            </a:p>
+          </p:txBody>
+        </p:sp>
+        <p:sp>
+          <p:nvSpPr>
+            <p:cNvPr id="24" name="TextBox 23">
+              <a:extLst>
+                <a:ext uri="{FF2B5EF4-FFF2-40B4-BE49-F238E27FC236}">
+                  <a16:creationId xmlns:a16="http://schemas.microsoft.com/office/drawing/2014/main" xmlns="" id="{CAB535A4-5143-4093-843F-192D43D9D1C9}"/>
+                </a:ext>
+              </a:extLst>
+            </p:cNvPr>
+            <p:cNvSpPr txBox="1"/>
+            <p:nvPr/>
+          </p:nvSpPr>
+          <p:spPr>
+            <a:xfrm>
+              <a:off x="2540000" y="3159760"/>
+              <a:ext cx="2204710" cy="369332"/>
+            </a:xfrm>
+            <a:prstGeom prst="rect">
+              <a:avLst/>
+            </a:prstGeom>
+            <a:noFill/>
+          </p:spPr>
+          <p:txBody>
+            <a:bodyPr wrap="square" rtlCol="0">
+              <a:spAutoFit/>
+            </a:bodyPr>
+            <a:lstStyle/>
+            <a:p>
+              <a:r>
+                <a:rPr lang="en-US" dirty="0"/>
+                <a:t>Feature branch 2</a:t>
+              </a:r>
+            </a:p>
+          </p:txBody>
+        </p:sp>
+        <p:sp>
+          <p:nvSpPr>
+            <p:cNvPr id="25" name="TextBox 24">
+              <a:extLst>
+                <a:ext uri="{FF2B5EF4-FFF2-40B4-BE49-F238E27FC236}">
+                  <a16:creationId xmlns:a16="http://schemas.microsoft.com/office/drawing/2014/main" xmlns="" id="{7E9B62C8-2987-43A8-A97F-10B53B645FA6}"/>
+                </a:ext>
+              </a:extLst>
+            </p:cNvPr>
+            <p:cNvSpPr txBox="1"/>
+            <p:nvPr/>
+          </p:nvSpPr>
+          <p:spPr>
+            <a:xfrm>
+              <a:off x="4500880" y="3139440"/>
+              <a:ext cx="2204710" cy="369332"/>
+            </a:xfrm>
+            <a:prstGeom prst="rect">
+              <a:avLst/>
+            </a:prstGeom>
+            <a:noFill/>
+          </p:spPr>
+          <p:txBody>
+            <a:bodyPr wrap="square" rtlCol="0">
+              <a:spAutoFit/>
+            </a:bodyPr>
+            <a:lstStyle/>
+            <a:p>
+              <a:r>
+                <a:rPr lang="en-US" dirty="0"/>
+                <a:t>Feature branch 3</a:t>
+              </a:r>
+            </a:p>
+          </p:txBody>
+        </p:sp>
+        <p:sp>
+          <p:nvSpPr>
+            <p:cNvPr id="26" name="TextBox 25">
+              <a:extLst>
+                <a:ext uri="{FF2B5EF4-FFF2-40B4-BE49-F238E27FC236}">
+                  <a16:creationId xmlns:a16="http://schemas.microsoft.com/office/drawing/2014/main" xmlns="" id="{62927BCB-32A0-46C0-9591-9F6D13637A23}"/>
+                </a:ext>
+              </a:extLst>
+            </p:cNvPr>
+            <p:cNvSpPr txBox="1"/>
+            <p:nvPr/>
+          </p:nvSpPr>
+          <p:spPr>
+            <a:xfrm>
+              <a:off x="6725920" y="3139440"/>
+              <a:ext cx="2204710" cy="369332"/>
+            </a:xfrm>
+            <a:prstGeom prst="rect">
+              <a:avLst/>
+            </a:prstGeom>
+            <a:noFill/>
+          </p:spPr>
+          <p:txBody>
+            <a:bodyPr wrap="square" rtlCol="0">
+              <a:spAutoFit/>
+            </a:bodyPr>
+            <a:lstStyle/>
+            <a:p>
+              <a:r>
+                <a:rPr lang="en-US" dirty="0"/>
+                <a:t>Feature branch 4</a:t>
+              </a:r>
+            </a:p>
+          </p:txBody>
+        </p:sp>
+        <p:sp>
+          <p:nvSpPr>
+            <p:cNvPr id="27" name="TextBox 26">
+              <a:extLst>
+                <a:ext uri="{FF2B5EF4-FFF2-40B4-BE49-F238E27FC236}">
+                  <a16:creationId xmlns:a16="http://schemas.microsoft.com/office/drawing/2014/main" xmlns="" id="{E517DA92-FFD1-4BFF-A547-67F0671E2DEB}"/>
+                </a:ext>
+              </a:extLst>
+            </p:cNvPr>
+            <p:cNvSpPr txBox="1"/>
+            <p:nvPr/>
+          </p:nvSpPr>
+          <p:spPr>
+            <a:xfrm>
+              <a:off x="9438640" y="3119120"/>
+              <a:ext cx="2204710" cy="369332"/>
+            </a:xfrm>
+            <a:prstGeom prst="rect">
+              <a:avLst/>
+            </a:prstGeom>
+            <a:noFill/>
+          </p:spPr>
+          <p:txBody>
+            <a:bodyPr wrap="square" rtlCol="0">
+              <a:spAutoFit/>
+            </a:bodyPr>
+            <a:lstStyle/>
+            <a:p>
+              <a:r>
+                <a:rPr lang="en-US" dirty="0"/>
+                <a:t>Feature branch 5</a:t>
+              </a:r>
+            </a:p>
+          </p:txBody>
+        </p:sp>
+        <p:sp>
+          <p:nvSpPr>
+            <p:cNvPr id="28" name="TextBox 27">
+              <a:extLst>
+                <a:ext uri="{FF2B5EF4-FFF2-40B4-BE49-F238E27FC236}">
+                  <a16:creationId xmlns:a16="http://schemas.microsoft.com/office/drawing/2014/main" xmlns="" id="{161252B9-C3FC-47BC-BFE0-9A707FD0EB6C}"/>
+                </a:ext>
+              </a:extLst>
+            </p:cNvPr>
+            <p:cNvSpPr txBox="1"/>
+            <p:nvPr/>
+          </p:nvSpPr>
+          <p:spPr>
+            <a:xfrm>
+              <a:off x="8493760" y="812800"/>
+              <a:ext cx="2468873" cy="369332"/>
+            </a:xfrm>
+            <a:prstGeom prst="rect">
+              <a:avLst/>
+            </a:prstGeom>
+            <a:noFill/>
+          </p:spPr>
+          <p:txBody>
+            <a:bodyPr wrap="square" rtlCol="0">
+              <a:spAutoFit/>
+            </a:bodyPr>
+            <a:lstStyle/>
+            <a:p>
+              <a:r>
+                <a:rPr lang="en-US" dirty="0"/>
+                <a:t>Production env</a:t>
+              </a:r>
+            </a:p>
+          </p:txBody>
+        </p:sp>
+      </p:grpSp>
+      <p:sp>
+        <p:nvSpPr>
+          <p:cNvPr id="30" name="TextBox 29">
+            <a:extLst>
+              <a:ext uri="{FF2B5EF4-FFF2-40B4-BE49-F238E27FC236}">
+                <a16:creationId xmlns:a16="http://schemas.microsoft.com/office/drawing/2014/main" xmlns="" id="{B544C6B0-EF6C-4250-91BF-FF09779362BA}"/>
               </a:ext>
             </a:extLst>
           </p:cNvPr>
@@ -5634,8 +6345,8 @@
         </p:nvSpPr>
         <p:spPr>
           <a:xfrm>
-            <a:off x="4500880" y="558800"/>
-            <a:ext cx="2631440" cy="833120"/>
+            <a:off x="0" y="182880"/>
+            <a:ext cx="12192000" cy="707886"/>
           </a:xfrm>
           <a:prstGeom prst="rect">
             <a:avLst/>
@@ -5648,48 +6359,26 @@
           </a:bodyPr>
           <a:lstStyle/>
           <a:p>
-            <a:endParaRPr lang="en-US" dirty="0"/>
-          </a:p>
-        </p:txBody>
-      </p:sp>
-      <p:sp>
-        <p:nvSpPr>
-          <p:cNvPr id="3" name="TextBox 2">
-            <a:extLst>
-              <a:ext uri="{FF2B5EF4-FFF2-40B4-BE49-F238E27FC236}">
-                <a16:creationId xmlns:a16="http://schemas.microsoft.com/office/drawing/2014/main" id="{B544C6B0-EF6C-4250-91BF-FF09779362BA}"/>
-              </a:ext>
-            </a:extLst>
-          </p:cNvPr>
-          <p:cNvSpPr txBox="1"/>
-          <p:nvPr/>
-        </p:nvSpPr>
-        <p:spPr>
-          <a:xfrm>
-            <a:off x="0" y="182880"/>
-            <a:ext cx="12192000" cy="707886"/>
-          </a:xfrm>
-          <a:prstGeom prst="rect">
-            <a:avLst/>
-          </a:prstGeom>
-          <a:noFill/>
-        </p:spPr>
-        <p:txBody>
-          <a:bodyPr wrap="square" rtlCol="0">
-            <a:spAutoFit/>
-          </a:bodyPr>
-          <a:lstStyle/>
-          <a:p>
             <a:pPr algn="ctr"/>
             <a:r>
-              <a:rPr lang="en-US" sz="4000" dirty="0">
-                <a:solidFill>
-                  <a:schemeClr val="bg1">
-                    <a:lumMod val="50000"/>
-                  </a:schemeClr>
-                </a:solidFill>
-              </a:rPr>
-              <a:t>Common Git Commands</a:t>
+              <a:rPr lang="en-US" sz="4000" dirty="0" err="1" smtClean="0">
+                <a:solidFill>
+                  <a:schemeClr val="bg1">
+                    <a:lumMod val="50000"/>
+                  </a:schemeClr>
+                </a:solidFill>
+              </a:rPr>
+              <a:t>Git</a:t>
+            </a:r>
+            <a:r>
+              <a:rPr lang="en-US" sz="4000" dirty="0" smtClean="0">
+                <a:solidFill>
+                  <a:schemeClr val="bg1">
+                    <a:lumMod val="50000"/>
+                  </a:schemeClr>
+                </a:solidFill>
+              </a:rPr>
+              <a:t> Branching</a:t>
             </a:r>
             <a:endParaRPr lang="en-US" sz="4000" b="1" dirty="0">
               <a:solidFill>
@@ -5702,172 +6391,10 @@
           </a:p>
         </p:txBody>
       </p:sp>
-      <p:sp>
-        <p:nvSpPr>
-          <p:cNvPr id="4" name="TextBox 3">
-            <a:extLst>
-              <a:ext uri="{FF2B5EF4-FFF2-40B4-BE49-F238E27FC236}">
-                <a16:creationId xmlns:a16="http://schemas.microsoft.com/office/drawing/2014/main" id="{9B8DFFC6-F5A1-437C-96C6-D9151B948833}"/>
-              </a:ext>
-            </a:extLst>
-          </p:cNvPr>
-          <p:cNvSpPr txBox="1"/>
-          <p:nvPr/>
-        </p:nvSpPr>
-        <p:spPr>
-          <a:xfrm>
-            <a:off x="599440" y="944880"/>
-            <a:ext cx="8564880" cy="2708434"/>
-          </a:xfrm>
-          <a:prstGeom prst="rect">
-            <a:avLst/>
-          </a:prstGeom>
-          <a:noFill/>
-        </p:spPr>
-        <p:txBody>
-          <a:bodyPr wrap="square" rtlCol="0">
-            <a:spAutoFit/>
-          </a:bodyPr>
-          <a:lstStyle/>
-          <a:p>
-            <a:pPr marL="800100" lvl="1" indent="-342900">
-              <a:buFont typeface="Wingdings" panose="05000000000000000000" pitchFamily="2" charset="2"/>
-              <a:buChar char="§"/>
-            </a:pPr>
-            <a:r>
-              <a:rPr lang="en-US" sz="2400" dirty="0">
-                <a:solidFill>
-                  <a:schemeClr val="bg1">
-                    <a:lumMod val="50000"/>
-                  </a:schemeClr>
-                </a:solidFill>
-              </a:rPr>
-              <a:t>Chery-Pick</a:t>
-            </a:r>
-          </a:p>
-          <a:p>
-            <a:pPr lvl="2"/>
-            <a:r>
-              <a:rPr lang="en-US" sz="2400" dirty="0">
-                <a:solidFill>
-                  <a:schemeClr val="bg1">
-                    <a:lumMod val="50000"/>
-                  </a:schemeClr>
-                </a:solidFill>
-              </a:rPr>
-              <a:t>Used for merging a particular commit from one branch to another branch.</a:t>
-            </a:r>
-          </a:p>
-          <a:p>
-            <a:pPr lvl="2"/>
-            <a:endParaRPr lang="en-US" sz="2400" dirty="0">
-              <a:solidFill>
-                <a:schemeClr val="bg1">
-                  <a:lumMod val="50000"/>
-                </a:schemeClr>
-              </a:solidFill>
-            </a:endParaRPr>
-          </a:p>
-          <a:p>
-            <a:pPr marL="1371600" lvl="2" indent="-457200">
-              <a:buFont typeface="+mj-lt"/>
-              <a:buAutoNum type="arabicPeriod"/>
-            </a:pPr>
-            <a:r>
-              <a:rPr lang="en-US" dirty="0">
-                <a:solidFill>
-                  <a:schemeClr val="bg1">
-                    <a:lumMod val="50000"/>
-                  </a:schemeClr>
-                </a:solidFill>
-              </a:rPr>
-              <a:t>First you need to checkout to the target branch </a:t>
-            </a:r>
-          </a:p>
-          <a:p>
-            <a:pPr marL="1371600" lvl="2" indent="-457200">
-              <a:buFont typeface="+mj-lt"/>
-              <a:buAutoNum type="arabicPeriod"/>
-            </a:pPr>
-            <a:r>
-              <a:rPr lang="en-US" dirty="0">
-                <a:solidFill>
-                  <a:schemeClr val="bg1">
-                    <a:lumMod val="50000"/>
-                  </a:schemeClr>
-                </a:solidFill>
-              </a:rPr>
-              <a:t>Use command-</a:t>
-            </a:r>
-          </a:p>
-          <a:p>
-            <a:pPr marL="1371600" lvl="2" indent="-457200">
-              <a:buFont typeface="+mj-lt"/>
-              <a:buAutoNum type="arabicPeriod"/>
-            </a:pPr>
-            <a:r>
-              <a:rPr lang="en-US" dirty="0">
-                <a:solidFill>
-                  <a:schemeClr val="bg1">
-                    <a:lumMod val="50000"/>
-                  </a:schemeClr>
-                </a:solidFill>
-              </a:rPr>
-              <a:t>	git cherry-pick &lt;</a:t>
-            </a:r>
-            <a:r>
-              <a:rPr lang="en-US" dirty="0" err="1">
-                <a:solidFill>
-                  <a:schemeClr val="bg1">
-                    <a:lumMod val="50000"/>
-                  </a:schemeClr>
-                </a:solidFill>
-              </a:rPr>
-              <a:t>commitid</a:t>
-            </a:r>
-            <a:r>
-              <a:rPr lang="en-US" dirty="0">
-                <a:solidFill>
-                  <a:schemeClr val="bg1">
-                    <a:lumMod val="50000"/>
-                  </a:schemeClr>
-                </a:solidFill>
-              </a:rPr>
-              <a:t>&gt;</a:t>
-            </a:r>
-          </a:p>
-          <a:p>
-            <a:pPr marL="1371600" lvl="2" indent="-457200">
-              <a:buFont typeface="+mj-lt"/>
-              <a:buAutoNum type="arabicPeriod"/>
-            </a:pPr>
-            <a:r>
-              <a:rPr lang="en-US" sz="1400" dirty="0">
-                <a:solidFill>
-                  <a:schemeClr val="bg1">
-                    <a:lumMod val="50000"/>
-                  </a:schemeClr>
-                </a:solidFill>
-              </a:rPr>
-              <a:t>Co</a:t>
-            </a:r>
-            <a:r>
-              <a:rPr lang="en-US" dirty="0">
-                <a:solidFill>
-                  <a:schemeClr val="bg1">
-                    <a:lumMod val="50000"/>
-                  </a:schemeClr>
-                </a:solidFill>
-              </a:rPr>
-              <a:t>mmit the changes and push it to remote target branch</a:t>
-            </a:r>
-          </a:p>
-        </p:txBody>
-      </p:sp>
     </p:spTree>
     <p:extLst>
       <p:ext uri="{BB962C8B-B14F-4D97-AF65-F5344CB8AC3E}">
-        <p14:creationId xmlns:p14="http://schemas.microsoft.com/office/powerpoint/2010/main" val="1380878122"/>
+        <p14:creationId xmlns:p14="http://schemas.microsoft.com/office/powerpoint/2010/main" xmlns="" val="1699318202"/>
       </p:ext>
     </p:extLst>
   </p:cSld>
@@ -5896,57 +6423,42 @@
       </p:grpSpPr>
       <p:sp>
         <p:nvSpPr>
-          <p:cNvPr id="4" name="Rectangle 3">
-            <a:extLst>
-              <a:ext uri="{FF2B5EF4-FFF2-40B4-BE49-F238E27FC236}">
-                <a16:creationId xmlns:a16="http://schemas.microsoft.com/office/drawing/2014/main" id="{EC5143AD-4D67-4C7B-AD8E-160E06C245D1}"/>
-              </a:ext>
-            </a:extLst>
-          </p:cNvPr>
-          <p:cNvSpPr/>
+          <p:cNvPr id="2" name="TextBox 1">
+            <a:extLst>
+              <a:ext uri="{FF2B5EF4-FFF2-40B4-BE49-F238E27FC236}">
+                <a16:creationId xmlns:a16="http://schemas.microsoft.com/office/drawing/2014/main" xmlns="" id="{8DA34F60-C036-4B57-8DAB-1153FCC4B013}"/>
+              </a:ext>
+            </a:extLst>
+          </p:cNvPr>
+          <p:cNvSpPr txBox="1"/>
           <p:nvPr/>
         </p:nvSpPr>
         <p:spPr>
           <a:xfrm>
-            <a:off x="3942080" y="701040"/>
-            <a:ext cx="3881120" cy="548640"/>
+            <a:off x="4500880" y="558800"/>
+            <a:ext cx="2631440" cy="833120"/>
           </a:xfrm>
           <a:prstGeom prst="rect">
             <a:avLst/>
           </a:prstGeom>
           <a:noFill/>
         </p:spPr>
-        <p:style>
-          <a:lnRef idx="2">
-            <a:schemeClr val="accent1">
-              <a:shade val="50000"/>
-            </a:schemeClr>
-          </a:lnRef>
-          <a:fillRef idx="1">
-            <a:schemeClr val="accent1"/>
-          </a:fillRef>
-          <a:effectRef idx="0">
-            <a:schemeClr val="accent1"/>
-          </a:effectRef>
-          <a:fontRef idx="minor">
-            <a:schemeClr val="lt1"/>
-          </a:fontRef>
-        </p:style>
-        <p:txBody>
-          <a:bodyPr rtlCol="0" anchor="ctr"/>
-          <a:lstStyle/>
-          <a:p>
-            <a:pPr algn="ctr"/>
-            <a:endParaRPr lang="en-US"/>
-          </a:p>
-        </p:txBody>
-      </p:sp>
-      <p:sp>
-        <p:nvSpPr>
-          <p:cNvPr id="5" name="TextBox 4">
-            <a:extLst>
-              <a:ext uri="{FF2B5EF4-FFF2-40B4-BE49-F238E27FC236}">
-                <a16:creationId xmlns:a16="http://schemas.microsoft.com/office/drawing/2014/main" id="{8C56556E-E067-4FC4-B0B5-ED770D22DC5F}"/>
+        <p:txBody>
+          <a:bodyPr wrap="square" rtlCol="0">
+            <a:spAutoFit/>
+          </a:bodyPr>
+          <a:lstStyle/>
+          <a:p>
+            <a:endParaRPr lang="en-US" dirty="0"/>
+          </a:p>
+        </p:txBody>
+      </p:sp>
+      <p:sp>
+        <p:nvSpPr>
+          <p:cNvPr id="3" name="TextBox 2">
+            <a:extLst>
+              <a:ext uri="{FF2B5EF4-FFF2-40B4-BE49-F238E27FC236}">
+                <a16:creationId xmlns:a16="http://schemas.microsoft.com/office/drawing/2014/main" xmlns="" id="{B544C6B0-EF6C-4250-91BF-FF09779362BA}"/>
               </a:ext>
             </a:extLst>
           </p:cNvPr>
@@ -5955,8 +6467,8 @@
         </p:nvSpPr>
         <p:spPr>
           <a:xfrm>
-            <a:off x="5049520" y="812800"/>
-            <a:ext cx="1402080" cy="369332"/>
+            <a:off x="0" y="42200"/>
+            <a:ext cx="12192000" cy="707886"/>
           </a:xfrm>
           <a:prstGeom prst="rect">
             <a:avLst/>
@@ -5969,604 +6481,542 @@
           </a:bodyPr>
           <a:lstStyle/>
           <a:p>
-            <a:r>
-              <a:rPr lang="en-US" dirty="0"/>
-              <a:t>Main branch</a:t>
-            </a:r>
-          </a:p>
-        </p:txBody>
-      </p:sp>
-      <p:cxnSp>
-        <p:nvCxnSpPr>
-          <p:cNvPr id="7" name="Straight Connector 6">
-            <a:extLst>
-              <a:ext uri="{FF2B5EF4-FFF2-40B4-BE49-F238E27FC236}">
-                <a16:creationId xmlns:a16="http://schemas.microsoft.com/office/drawing/2014/main" id="{19BBE1A2-E3F7-4197-BF83-99EAA1C6DAEE}"/>
-              </a:ext>
-            </a:extLst>
-          </p:cNvPr>
-          <p:cNvCxnSpPr>
-            <a:cxnSpLocks/>
-            <a:stCxn id="4" idx="2"/>
-            <a:endCxn id="8" idx="0"/>
-          </p:cNvCxnSpPr>
+            <a:pPr algn="ctr"/>
+            <a:r>
+              <a:rPr lang="en-US" sz="4000" dirty="0" smtClean="0">
+                <a:solidFill>
+                  <a:schemeClr val="bg1">
+                    <a:lumMod val="50000"/>
+                  </a:schemeClr>
+                </a:solidFill>
+              </a:rPr>
+              <a:t>Advanced </a:t>
+            </a:r>
+            <a:r>
+              <a:rPr lang="en-US" sz="4000" dirty="0">
+                <a:solidFill>
+                  <a:schemeClr val="bg1">
+                    <a:lumMod val="50000"/>
+                  </a:schemeClr>
+                </a:solidFill>
+              </a:rPr>
+              <a:t>Git Commands</a:t>
+            </a:r>
+            <a:endParaRPr lang="en-US" sz="4000" b="1" dirty="0">
+              <a:solidFill>
+                <a:schemeClr val="bg1">
+                  <a:lumMod val="50000"/>
+                </a:schemeClr>
+              </a:solidFill>
+              <a:latin typeface="+mj-lt"/>
+            </a:endParaRPr>
+          </a:p>
+        </p:txBody>
+      </p:sp>
+      <p:sp>
+        <p:nvSpPr>
+          <p:cNvPr id="4" name="TextBox 3">
+            <a:extLst>
+              <a:ext uri="{FF2B5EF4-FFF2-40B4-BE49-F238E27FC236}">
+                <a16:creationId xmlns:a16="http://schemas.microsoft.com/office/drawing/2014/main" xmlns="" id="{9B8DFFC6-F5A1-437C-96C6-D9151B948833}"/>
+              </a:ext>
+            </a:extLst>
+          </p:cNvPr>
+          <p:cNvSpPr txBox="1"/>
           <p:nvPr/>
-        </p:nvCxnSpPr>
-        <p:spPr>
-          <a:xfrm>
-            <a:off x="5882640" y="1249680"/>
-            <a:ext cx="35560" cy="467360"/>
-          </a:xfrm>
-          <a:prstGeom prst="line">
-            <a:avLst/>
-          </a:prstGeom>
-        </p:spPr>
-        <p:style>
-          <a:lnRef idx="1">
-            <a:schemeClr val="accent1"/>
-          </a:lnRef>
-          <a:fillRef idx="0">
-            <a:schemeClr val="accent1"/>
-          </a:fillRef>
-          <a:effectRef idx="0">
-            <a:schemeClr val="accent1"/>
-          </a:effectRef>
-          <a:fontRef idx="minor">
-            <a:schemeClr val="tx1"/>
-          </a:fontRef>
-        </p:style>
-      </p:cxnSp>
-      <p:sp>
-        <p:nvSpPr>
-          <p:cNvPr id="8" name="Rectangle 7">
-            <a:extLst>
-              <a:ext uri="{FF2B5EF4-FFF2-40B4-BE49-F238E27FC236}">
-                <a16:creationId xmlns:a16="http://schemas.microsoft.com/office/drawing/2014/main" id="{53FB852D-81CE-4E91-88D7-F5A6315E7F9D}"/>
-              </a:ext>
-            </a:extLst>
-          </p:cNvPr>
-          <p:cNvSpPr/>
-          <p:nvPr/>
-        </p:nvSpPr>
-        <p:spPr>
-          <a:xfrm>
-            <a:off x="3942080" y="1717040"/>
-            <a:ext cx="3952240" cy="548640"/>
+        </p:nvSpPr>
+        <p:spPr>
+          <a:xfrm>
+            <a:off x="599439" y="590840"/>
+            <a:ext cx="11273693" cy="6698661"/>
           </a:xfrm>
           <a:prstGeom prst="rect">
             <a:avLst/>
           </a:prstGeom>
           <a:noFill/>
         </p:spPr>
-        <p:style>
-          <a:lnRef idx="2">
-            <a:schemeClr val="accent1">
-              <a:shade val="50000"/>
-            </a:schemeClr>
-          </a:lnRef>
-          <a:fillRef idx="1">
-            <a:schemeClr val="accent1"/>
-          </a:fillRef>
-          <a:effectRef idx="0">
-            <a:schemeClr val="accent1"/>
-          </a:effectRef>
-          <a:fontRef idx="minor">
-            <a:schemeClr val="lt1"/>
-          </a:fontRef>
-        </p:style>
-        <p:txBody>
-          <a:bodyPr rtlCol="0" anchor="ctr"/>
-          <a:lstStyle/>
-          <a:p>
-            <a:pPr algn="ctr"/>
-            <a:endParaRPr lang="en-US"/>
-          </a:p>
-        </p:txBody>
-      </p:sp>
-      <p:sp>
-        <p:nvSpPr>
-          <p:cNvPr id="9" name="TextBox 8">
-            <a:extLst>
-              <a:ext uri="{FF2B5EF4-FFF2-40B4-BE49-F238E27FC236}">
-                <a16:creationId xmlns:a16="http://schemas.microsoft.com/office/drawing/2014/main" id="{56FF7CF5-5CC0-4132-8128-49F5B8F194CE}"/>
-              </a:ext>
-            </a:extLst>
-          </p:cNvPr>
-          <p:cNvSpPr txBox="1"/>
-          <p:nvPr/>
-        </p:nvSpPr>
-        <p:spPr>
-          <a:xfrm>
-            <a:off x="4572000" y="1808480"/>
-            <a:ext cx="3007360" cy="369332"/>
-          </a:xfrm>
-          <a:prstGeom prst="rect">
-            <a:avLst/>
-          </a:prstGeom>
-          <a:noFill/>
-        </p:spPr>
         <p:txBody>
           <a:bodyPr wrap="square" rtlCol="0">
             <a:spAutoFit/>
           </a:bodyPr>
           <a:lstStyle/>
           <a:p>
-            <a:r>
-              <a:rPr lang="en-US" dirty="0"/>
-              <a:t>Develop branch (child of Main</a:t>
-            </a:r>
-          </a:p>
-        </p:txBody>
-      </p:sp>
-      <p:cxnSp>
-        <p:nvCxnSpPr>
-          <p:cNvPr id="12" name="Straight Connector 11">
-            <a:extLst>
-              <a:ext uri="{FF2B5EF4-FFF2-40B4-BE49-F238E27FC236}">
-                <a16:creationId xmlns:a16="http://schemas.microsoft.com/office/drawing/2014/main" id="{B8E257B8-94BC-4EE5-B79A-F8DE2A59751F}"/>
-              </a:ext>
-            </a:extLst>
-          </p:cNvPr>
-          <p:cNvCxnSpPr>
-            <a:cxnSpLocks/>
-            <a:stCxn id="8" idx="2"/>
-          </p:cNvCxnSpPr>
-          <p:nvPr/>
-        </p:nvCxnSpPr>
-        <p:spPr>
-          <a:xfrm>
-            <a:off x="5918200" y="2265680"/>
-            <a:ext cx="0" cy="487680"/>
-          </a:xfrm>
-          <a:prstGeom prst="line">
-            <a:avLst/>
-          </a:prstGeom>
-        </p:spPr>
-        <p:style>
-          <a:lnRef idx="1">
-            <a:schemeClr val="accent1"/>
-          </a:lnRef>
-          <a:fillRef idx="0">
-            <a:schemeClr val="accent1"/>
-          </a:fillRef>
-          <a:effectRef idx="0">
-            <a:schemeClr val="accent1"/>
-          </a:effectRef>
-          <a:fontRef idx="minor">
-            <a:schemeClr val="tx1"/>
-          </a:fontRef>
-        </p:style>
-      </p:cxnSp>
-      <p:cxnSp>
-        <p:nvCxnSpPr>
-          <p:cNvPr id="14" name="Straight Connector 13">
-            <a:extLst>
-              <a:ext uri="{FF2B5EF4-FFF2-40B4-BE49-F238E27FC236}">
-                <a16:creationId xmlns:a16="http://schemas.microsoft.com/office/drawing/2014/main" id="{062B4D7B-9553-467D-8F20-CBE53C50E1D2}"/>
-              </a:ext>
-            </a:extLst>
-          </p:cNvPr>
-          <p:cNvCxnSpPr/>
-          <p:nvPr/>
-        </p:nvCxnSpPr>
-        <p:spPr>
-          <a:xfrm>
-            <a:off x="1529080" y="2763520"/>
-            <a:ext cx="9133840" cy="0"/>
-          </a:xfrm>
-          <a:prstGeom prst="line">
-            <a:avLst/>
-          </a:prstGeom>
-        </p:spPr>
-        <p:style>
-          <a:lnRef idx="1">
-            <a:schemeClr val="accent1"/>
-          </a:lnRef>
-          <a:fillRef idx="0">
-            <a:schemeClr val="accent1"/>
-          </a:fillRef>
-          <a:effectRef idx="0">
-            <a:schemeClr val="accent1"/>
-          </a:effectRef>
-          <a:fontRef idx="minor">
-            <a:schemeClr val="tx1"/>
-          </a:fontRef>
-        </p:style>
-      </p:cxnSp>
-      <p:cxnSp>
-        <p:nvCxnSpPr>
-          <p:cNvPr id="17" name="Straight Connector 16">
-            <a:extLst>
-              <a:ext uri="{FF2B5EF4-FFF2-40B4-BE49-F238E27FC236}">
-                <a16:creationId xmlns:a16="http://schemas.microsoft.com/office/drawing/2014/main" id="{D4D8EC26-3092-4BEE-A15F-09F9FB4B79E2}"/>
-              </a:ext>
-            </a:extLst>
-          </p:cNvPr>
-          <p:cNvCxnSpPr/>
-          <p:nvPr/>
-        </p:nvCxnSpPr>
-        <p:spPr>
-          <a:xfrm>
-            <a:off x="1534160" y="2753360"/>
-            <a:ext cx="0" cy="365760"/>
-          </a:xfrm>
-          <a:prstGeom prst="line">
-            <a:avLst/>
-          </a:prstGeom>
-        </p:spPr>
-        <p:style>
-          <a:lnRef idx="1">
-            <a:schemeClr val="accent1"/>
-          </a:lnRef>
-          <a:fillRef idx="0">
-            <a:schemeClr val="accent1"/>
-          </a:fillRef>
-          <a:effectRef idx="0">
-            <a:schemeClr val="accent1"/>
-          </a:effectRef>
-          <a:fontRef idx="minor">
-            <a:schemeClr val="tx1"/>
-          </a:fontRef>
-        </p:style>
-      </p:cxnSp>
-      <p:cxnSp>
-        <p:nvCxnSpPr>
-          <p:cNvPr id="19" name="Straight Connector 18">
-            <a:extLst>
-              <a:ext uri="{FF2B5EF4-FFF2-40B4-BE49-F238E27FC236}">
-                <a16:creationId xmlns:a16="http://schemas.microsoft.com/office/drawing/2014/main" id="{F88C590A-CD49-4E76-93C1-DBAECF777645}"/>
-              </a:ext>
-            </a:extLst>
-          </p:cNvPr>
-          <p:cNvCxnSpPr/>
-          <p:nvPr/>
-        </p:nvCxnSpPr>
-        <p:spPr>
-          <a:xfrm>
-            <a:off x="3708400" y="2753360"/>
-            <a:ext cx="0" cy="365760"/>
-          </a:xfrm>
-          <a:prstGeom prst="line">
-            <a:avLst/>
-          </a:prstGeom>
-        </p:spPr>
-        <p:style>
-          <a:lnRef idx="1">
-            <a:schemeClr val="accent1"/>
-          </a:lnRef>
-          <a:fillRef idx="0">
-            <a:schemeClr val="accent1"/>
-          </a:fillRef>
-          <a:effectRef idx="0">
-            <a:schemeClr val="accent1"/>
-          </a:effectRef>
-          <a:fontRef idx="minor">
-            <a:schemeClr val="tx1"/>
-          </a:fontRef>
-        </p:style>
-      </p:cxnSp>
-      <p:cxnSp>
-        <p:nvCxnSpPr>
-          <p:cNvPr id="20" name="Straight Connector 19">
-            <a:extLst>
-              <a:ext uri="{FF2B5EF4-FFF2-40B4-BE49-F238E27FC236}">
-                <a16:creationId xmlns:a16="http://schemas.microsoft.com/office/drawing/2014/main" id="{8FA7ECDC-6889-4CDD-83E5-357686B28B2A}"/>
-              </a:ext>
-            </a:extLst>
-          </p:cNvPr>
-          <p:cNvCxnSpPr/>
-          <p:nvPr/>
-        </p:nvCxnSpPr>
-        <p:spPr>
-          <a:xfrm>
-            <a:off x="5648960" y="2743200"/>
-            <a:ext cx="0" cy="365760"/>
-          </a:xfrm>
-          <a:prstGeom prst="line">
-            <a:avLst/>
-          </a:prstGeom>
-        </p:spPr>
-        <p:style>
-          <a:lnRef idx="1">
-            <a:schemeClr val="accent1"/>
-          </a:lnRef>
-          <a:fillRef idx="0">
-            <a:schemeClr val="accent1"/>
-          </a:fillRef>
-          <a:effectRef idx="0">
-            <a:schemeClr val="accent1"/>
-          </a:effectRef>
-          <a:fontRef idx="minor">
-            <a:schemeClr val="tx1"/>
-          </a:fontRef>
-        </p:style>
-      </p:cxnSp>
-      <p:cxnSp>
-        <p:nvCxnSpPr>
-          <p:cNvPr id="21" name="Straight Connector 20">
-            <a:extLst>
-              <a:ext uri="{FF2B5EF4-FFF2-40B4-BE49-F238E27FC236}">
-                <a16:creationId xmlns:a16="http://schemas.microsoft.com/office/drawing/2014/main" id="{DA4EA02E-A089-4717-873F-4FC7F7F86923}"/>
-              </a:ext>
-            </a:extLst>
-          </p:cNvPr>
-          <p:cNvCxnSpPr/>
-          <p:nvPr/>
-        </p:nvCxnSpPr>
-        <p:spPr>
-          <a:xfrm>
-            <a:off x="7874000" y="2733040"/>
-            <a:ext cx="0" cy="365760"/>
-          </a:xfrm>
-          <a:prstGeom prst="line">
-            <a:avLst/>
-          </a:prstGeom>
-        </p:spPr>
-        <p:style>
-          <a:lnRef idx="1">
-            <a:schemeClr val="accent1"/>
-          </a:lnRef>
-          <a:fillRef idx="0">
-            <a:schemeClr val="accent1"/>
-          </a:fillRef>
-          <a:effectRef idx="0">
-            <a:schemeClr val="accent1"/>
-          </a:effectRef>
-          <a:fontRef idx="minor">
-            <a:schemeClr val="tx1"/>
-          </a:fontRef>
-        </p:style>
-      </p:cxnSp>
-      <p:cxnSp>
-        <p:nvCxnSpPr>
-          <p:cNvPr id="22" name="Straight Connector 21">
-            <a:extLst>
-              <a:ext uri="{FF2B5EF4-FFF2-40B4-BE49-F238E27FC236}">
-                <a16:creationId xmlns:a16="http://schemas.microsoft.com/office/drawing/2014/main" id="{AFB21F47-2FD5-430E-B1F0-FAE07309E98E}"/>
-              </a:ext>
-            </a:extLst>
-          </p:cNvPr>
-          <p:cNvCxnSpPr/>
-          <p:nvPr/>
-        </p:nvCxnSpPr>
-        <p:spPr>
-          <a:xfrm>
-            <a:off x="10627360" y="2743200"/>
-            <a:ext cx="0" cy="365760"/>
-          </a:xfrm>
-          <a:prstGeom prst="line">
-            <a:avLst/>
-          </a:prstGeom>
-        </p:spPr>
-        <p:style>
-          <a:lnRef idx="1">
-            <a:schemeClr val="accent1"/>
-          </a:lnRef>
-          <a:fillRef idx="0">
-            <a:schemeClr val="accent1"/>
-          </a:fillRef>
-          <a:effectRef idx="0">
-            <a:schemeClr val="accent1"/>
-          </a:effectRef>
-          <a:fontRef idx="minor">
-            <a:schemeClr val="tx1"/>
-          </a:fontRef>
-        </p:style>
-      </p:cxnSp>
-      <p:sp>
-        <p:nvSpPr>
-          <p:cNvPr id="23" name="TextBox 22">
-            <a:extLst>
-              <a:ext uri="{FF2B5EF4-FFF2-40B4-BE49-F238E27FC236}">
-                <a16:creationId xmlns:a16="http://schemas.microsoft.com/office/drawing/2014/main" id="{B64BB359-F08B-44C6-A090-1507EB5E8877}"/>
-              </a:ext>
-            </a:extLst>
-          </p:cNvPr>
-          <p:cNvSpPr txBox="1"/>
-          <p:nvPr/>
-        </p:nvSpPr>
-        <p:spPr>
-          <a:xfrm>
-            <a:off x="599440" y="3129280"/>
-            <a:ext cx="2204710" cy="369332"/>
-          </a:xfrm>
-          <a:prstGeom prst="rect">
-            <a:avLst/>
-          </a:prstGeom>
-          <a:noFill/>
-        </p:spPr>
-        <p:txBody>
-          <a:bodyPr wrap="square" rtlCol="0">
-            <a:spAutoFit/>
-          </a:bodyPr>
-          <a:lstStyle/>
-          <a:p>
-            <a:r>
-              <a:rPr lang="en-US" dirty="0"/>
-              <a:t>Feature branch 1</a:t>
-            </a:r>
-          </a:p>
-        </p:txBody>
-      </p:sp>
-      <p:sp>
-        <p:nvSpPr>
-          <p:cNvPr id="24" name="TextBox 23">
-            <a:extLst>
-              <a:ext uri="{FF2B5EF4-FFF2-40B4-BE49-F238E27FC236}">
-                <a16:creationId xmlns:a16="http://schemas.microsoft.com/office/drawing/2014/main" id="{CAB535A4-5143-4093-843F-192D43D9D1C9}"/>
-              </a:ext>
-            </a:extLst>
-          </p:cNvPr>
-          <p:cNvSpPr txBox="1"/>
-          <p:nvPr/>
-        </p:nvSpPr>
-        <p:spPr>
-          <a:xfrm>
-            <a:off x="2540000" y="3159760"/>
-            <a:ext cx="2204710" cy="369332"/>
-          </a:xfrm>
-          <a:prstGeom prst="rect">
-            <a:avLst/>
-          </a:prstGeom>
-          <a:noFill/>
-        </p:spPr>
-        <p:txBody>
-          <a:bodyPr wrap="square" rtlCol="0">
-            <a:spAutoFit/>
-          </a:bodyPr>
-          <a:lstStyle/>
-          <a:p>
-            <a:r>
-              <a:rPr lang="en-US" dirty="0"/>
-              <a:t>Feature branch 2</a:t>
-            </a:r>
-          </a:p>
-        </p:txBody>
-      </p:sp>
-      <p:sp>
-        <p:nvSpPr>
-          <p:cNvPr id="25" name="TextBox 24">
-            <a:extLst>
-              <a:ext uri="{FF2B5EF4-FFF2-40B4-BE49-F238E27FC236}">
-                <a16:creationId xmlns:a16="http://schemas.microsoft.com/office/drawing/2014/main" id="{7E9B62C8-2987-43A8-A97F-10B53B645FA6}"/>
-              </a:ext>
-            </a:extLst>
-          </p:cNvPr>
-          <p:cNvSpPr txBox="1"/>
-          <p:nvPr/>
-        </p:nvSpPr>
-        <p:spPr>
-          <a:xfrm>
-            <a:off x="4500880" y="3139440"/>
-            <a:ext cx="2204710" cy="369332"/>
-          </a:xfrm>
-          <a:prstGeom prst="rect">
-            <a:avLst/>
-          </a:prstGeom>
-          <a:noFill/>
-        </p:spPr>
-        <p:txBody>
-          <a:bodyPr wrap="square" rtlCol="0">
-            <a:spAutoFit/>
-          </a:bodyPr>
-          <a:lstStyle/>
-          <a:p>
-            <a:r>
-              <a:rPr lang="en-US" dirty="0"/>
-              <a:t>Feature branch 3</a:t>
-            </a:r>
-          </a:p>
-        </p:txBody>
-      </p:sp>
-      <p:sp>
-        <p:nvSpPr>
-          <p:cNvPr id="26" name="TextBox 25">
-            <a:extLst>
-              <a:ext uri="{FF2B5EF4-FFF2-40B4-BE49-F238E27FC236}">
-                <a16:creationId xmlns:a16="http://schemas.microsoft.com/office/drawing/2014/main" id="{62927BCB-32A0-46C0-9591-9F6D13637A23}"/>
-              </a:ext>
-            </a:extLst>
-          </p:cNvPr>
-          <p:cNvSpPr txBox="1"/>
-          <p:nvPr/>
-        </p:nvSpPr>
-        <p:spPr>
-          <a:xfrm>
-            <a:off x="6725920" y="3139440"/>
-            <a:ext cx="2204710" cy="369332"/>
-          </a:xfrm>
-          <a:prstGeom prst="rect">
-            <a:avLst/>
-          </a:prstGeom>
-          <a:noFill/>
-        </p:spPr>
-        <p:txBody>
-          <a:bodyPr wrap="square" rtlCol="0">
-            <a:spAutoFit/>
-          </a:bodyPr>
-          <a:lstStyle/>
-          <a:p>
-            <a:r>
-              <a:rPr lang="en-US" dirty="0"/>
-              <a:t>Feature branch 4</a:t>
-            </a:r>
-          </a:p>
-        </p:txBody>
-      </p:sp>
-      <p:sp>
-        <p:nvSpPr>
-          <p:cNvPr id="27" name="TextBox 26">
-            <a:extLst>
-              <a:ext uri="{FF2B5EF4-FFF2-40B4-BE49-F238E27FC236}">
-                <a16:creationId xmlns:a16="http://schemas.microsoft.com/office/drawing/2014/main" id="{E517DA92-FFD1-4BFF-A547-67F0671E2DEB}"/>
-              </a:ext>
-            </a:extLst>
-          </p:cNvPr>
-          <p:cNvSpPr txBox="1"/>
-          <p:nvPr/>
-        </p:nvSpPr>
-        <p:spPr>
-          <a:xfrm>
-            <a:off x="9438640" y="3119120"/>
-            <a:ext cx="2204710" cy="369332"/>
-          </a:xfrm>
-          <a:prstGeom prst="rect">
-            <a:avLst/>
-          </a:prstGeom>
-          <a:noFill/>
-        </p:spPr>
-        <p:txBody>
-          <a:bodyPr wrap="square" rtlCol="0">
-            <a:spAutoFit/>
-          </a:bodyPr>
-          <a:lstStyle/>
-          <a:p>
-            <a:r>
-              <a:rPr lang="en-US" dirty="0"/>
-              <a:t>Feature branch 5</a:t>
-            </a:r>
-          </a:p>
-        </p:txBody>
-      </p:sp>
-      <p:sp>
-        <p:nvSpPr>
-          <p:cNvPr id="28" name="TextBox 27">
-            <a:extLst>
-              <a:ext uri="{FF2B5EF4-FFF2-40B4-BE49-F238E27FC236}">
-                <a16:creationId xmlns:a16="http://schemas.microsoft.com/office/drawing/2014/main" id="{161252B9-C3FC-47BC-BFE0-9A707FD0EB6C}"/>
-              </a:ext>
-            </a:extLst>
-          </p:cNvPr>
-          <p:cNvSpPr txBox="1"/>
-          <p:nvPr/>
-        </p:nvSpPr>
-        <p:spPr>
-          <a:xfrm>
-            <a:off x="8493760" y="812800"/>
-            <a:ext cx="2468873" cy="369332"/>
-          </a:xfrm>
-          <a:prstGeom prst="rect">
-            <a:avLst/>
-          </a:prstGeom>
-          <a:noFill/>
-        </p:spPr>
-        <p:txBody>
-          <a:bodyPr wrap="square" rtlCol="0">
-            <a:spAutoFit/>
-          </a:bodyPr>
-          <a:lstStyle/>
-          <a:p>
-            <a:r>
-              <a:rPr lang="en-US" dirty="0"/>
-              <a:t>Production env</a:t>
-            </a:r>
+            <a:pPr marL="342900" indent="-342900">
+              <a:buFont typeface="Wingdings" panose="05000000000000000000" pitchFamily="2" charset="2"/>
+              <a:buChar char="§"/>
+            </a:pPr>
+            <a:r>
+              <a:rPr lang="en-US" sz="2400" dirty="0" err="1" smtClean="0">
+                <a:solidFill>
+                  <a:schemeClr val="bg1">
+                    <a:lumMod val="50000"/>
+                  </a:schemeClr>
+                </a:solidFill>
+              </a:rPr>
+              <a:t>git</a:t>
+            </a:r>
+            <a:r>
+              <a:rPr lang="en-US" sz="2400" dirty="0" smtClean="0">
+                <a:solidFill>
+                  <a:schemeClr val="bg1">
+                    <a:lumMod val="50000"/>
+                  </a:schemeClr>
+                </a:solidFill>
+              </a:rPr>
+              <a:t> clone</a:t>
+            </a:r>
+          </a:p>
+          <a:p>
+            <a:pPr marL="342900" indent="-342900"/>
+            <a:r>
+              <a:rPr lang="en-US" sz="2400" dirty="0" smtClean="0">
+                <a:solidFill>
+                  <a:schemeClr val="bg1">
+                    <a:lumMod val="50000"/>
+                  </a:schemeClr>
+                </a:solidFill>
+              </a:rPr>
+              <a:t>	</a:t>
+            </a:r>
+            <a:r>
+              <a:rPr lang="en-US" dirty="0" smtClean="0">
+                <a:solidFill>
+                  <a:schemeClr val="bg1">
+                    <a:lumMod val="50000"/>
+                  </a:schemeClr>
+                </a:solidFill>
+              </a:rPr>
+              <a:t>cloning/getting your existing remote repository to you local</a:t>
+            </a:r>
+          </a:p>
+          <a:p>
+            <a:pPr marL="342900" indent="-342900">
+              <a:buFont typeface="Wingdings" panose="05000000000000000000" pitchFamily="2" charset="2"/>
+              <a:buChar char="§"/>
+            </a:pPr>
+            <a:r>
+              <a:rPr lang="en-US" sz="2400" dirty="0" err="1" smtClean="0">
+                <a:solidFill>
+                  <a:schemeClr val="bg1">
+                    <a:lumMod val="50000"/>
+                  </a:schemeClr>
+                </a:solidFill>
+              </a:rPr>
+              <a:t>git</a:t>
+            </a:r>
+            <a:r>
+              <a:rPr lang="en-US" sz="2400" dirty="0" smtClean="0">
+                <a:solidFill>
+                  <a:schemeClr val="bg1">
+                    <a:lumMod val="50000"/>
+                  </a:schemeClr>
+                </a:solidFill>
+              </a:rPr>
+              <a:t> pull</a:t>
+            </a:r>
+          </a:p>
+          <a:p>
+            <a:pPr marL="342900" indent="-342900"/>
+            <a:r>
+              <a:rPr lang="en-US" sz="2400" dirty="0" smtClean="0">
+                <a:solidFill>
+                  <a:schemeClr val="bg1">
+                    <a:lumMod val="50000"/>
+                  </a:schemeClr>
+                </a:solidFill>
+              </a:rPr>
+              <a:t>	</a:t>
+            </a:r>
+            <a:r>
+              <a:rPr lang="en-US" dirty="0" smtClean="0">
+                <a:solidFill>
+                  <a:schemeClr val="bg1">
+                    <a:lumMod val="50000"/>
+                  </a:schemeClr>
+                </a:solidFill>
+              </a:rPr>
+              <a:t>get/download the latest changes from the remote branch</a:t>
+            </a:r>
+          </a:p>
+          <a:p>
+            <a:pPr marL="342900" indent="-342900">
+              <a:buFont typeface="Wingdings" panose="05000000000000000000" pitchFamily="2" charset="2"/>
+              <a:buChar char="§"/>
+            </a:pPr>
+            <a:r>
+              <a:rPr lang="en-US" sz="2400" dirty="0" err="1" smtClean="0">
+                <a:solidFill>
+                  <a:schemeClr val="bg1">
+                    <a:lumMod val="50000"/>
+                  </a:schemeClr>
+                </a:solidFill>
+              </a:rPr>
+              <a:t>git</a:t>
+            </a:r>
+            <a:r>
+              <a:rPr lang="en-US" sz="2400" dirty="0" smtClean="0">
+                <a:solidFill>
+                  <a:schemeClr val="bg1">
+                    <a:lumMod val="50000"/>
+                  </a:schemeClr>
+                </a:solidFill>
+              </a:rPr>
+              <a:t> fetch</a:t>
+            </a:r>
+          </a:p>
+          <a:p>
+            <a:pPr marL="342900" indent="-342900"/>
+            <a:r>
+              <a:rPr lang="en-US" dirty="0" smtClean="0">
+                <a:solidFill>
+                  <a:schemeClr val="bg1">
+                    <a:lumMod val="50000"/>
+                  </a:schemeClr>
+                </a:solidFill>
+              </a:rPr>
+              <a:t>	fetch down all the branches from remote repository</a:t>
+            </a:r>
+          </a:p>
+          <a:p>
+            <a:pPr marL="342900" indent="-342900">
+              <a:buFont typeface="Wingdings" panose="05000000000000000000" pitchFamily="2" charset="2"/>
+              <a:buChar char="§"/>
+            </a:pPr>
+            <a:r>
+              <a:rPr lang="en-US" sz="2400" dirty="0" err="1" smtClean="0">
+                <a:solidFill>
+                  <a:schemeClr val="bg1">
+                    <a:lumMod val="50000"/>
+                  </a:schemeClr>
+                </a:solidFill>
+              </a:rPr>
+              <a:t>git</a:t>
+            </a:r>
+            <a:r>
+              <a:rPr lang="en-US" sz="2400" dirty="0" smtClean="0">
+                <a:solidFill>
+                  <a:schemeClr val="bg1">
+                    <a:lumMod val="50000"/>
+                  </a:schemeClr>
+                </a:solidFill>
+              </a:rPr>
+              <a:t> branch</a:t>
+            </a:r>
+          </a:p>
+          <a:p>
+            <a:pPr marL="342900" indent="-342900"/>
+            <a:r>
+              <a:rPr lang="en-US" sz="2400" dirty="0" smtClean="0">
+                <a:solidFill>
+                  <a:schemeClr val="bg1">
+                    <a:lumMod val="50000"/>
+                  </a:schemeClr>
+                </a:solidFill>
+              </a:rPr>
+              <a:t>	</a:t>
+            </a:r>
+            <a:r>
+              <a:rPr lang="en-US" dirty="0" smtClean="0">
+                <a:solidFill>
+                  <a:schemeClr val="bg1">
+                    <a:lumMod val="50000"/>
+                  </a:schemeClr>
+                </a:solidFill>
+              </a:rPr>
+              <a:t>list all the branches from your local repository. A '*' will appear next to the current active branch</a:t>
+            </a:r>
+          </a:p>
+          <a:p>
+            <a:pPr marL="342900" indent="-342900">
+              <a:buFont typeface="Wingdings" panose="05000000000000000000" pitchFamily="2" charset="2"/>
+              <a:buChar char="§"/>
+            </a:pPr>
+            <a:r>
+              <a:rPr lang="en-US" sz="2400" dirty="0" err="1" smtClean="0">
+                <a:solidFill>
+                  <a:schemeClr val="bg1">
+                    <a:lumMod val="50000"/>
+                  </a:schemeClr>
+                </a:solidFill>
+              </a:rPr>
+              <a:t>git</a:t>
+            </a:r>
+            <a:r>
+              <a:rPr lang="en-US" sz="2400" dirty="0" smtClean="0">
+                <a:solidFill>
+                  <a:schemeClr val="bg1">
+                    <a:lumMod val="50000"/>
+                  </a:schemeClr>
+                </a:solidFill>
+              </a:rPr>
+              <a:t> branch &lt;branch name&gt;</a:t>
+            </a:r>
+          </a:p>
+          <a:p>
+            <a:pPr marL="342900" indent="-342900"/>
+            <a:r>
+              <a:rPr lang="en-US" sz="2400" dirty="0" smtClean="0">
+                <a:solidFill>
+                  <a:schemeClr val="bg1">
+                    <a:lumMod val="50000"/>
+                  </a:schemeClr>
+                </a:solidFill>
+              </a:rPr>
+              <a:t>	</a:t>
+            </a:r>
+            <a:r>
+              <a:rPr lang="en-US" dirty="0" smtClean="0">
+                <a:solidFill>
+                  <a:schemeClr val="bg1">
+                    <a:lumMod val="50000"/>
+                  </a:schemeClr>
+                </a:solidFill>
+              </a:rPr>
+              <a:t>Creates new branch</a:t>
+            </a:r>
+          </a:p>
+          <a:p>
+            <a:pPr marL="342900" indent="-342900">
+              <a:buFont typeface="Wingdings" panose="05000000000000000000" pitchFamily="2" charset="2"/>
+              <a:buChar char="§"/>
+            </a:pPr>
+            <a:r>
+              <a:rPr lang="en-US" sz="2400" dirty="0" err="1" smtClean="0">
+                <a:solidFill>
+                  <a:schemeClr val="bg1">
+                    <a:lumMod val="50000"/>
+                  </a:schemeClr>
+                </a:solidFill>
+              </a:rPr>
+              <a:t>git</a:t>
+            </a:r>
+            <a:r>
+              <a:rPr lang="en-US" sz="2400" dirty="0" smtClean="0">
+                <a:solidFill>
+                  <a:schemeClr val="bg1">
+                    <a:lumMod val="50000"/>
+                  </a:schemeClr>
+                </a:solidFill>
+              </a:rPr>
+              <a:t> checkout &lt;branch name&gt;</a:t>
+            </a:r>
+          </a:p>
+          <a:p>
+            <a:pPr marL="342900" indent="-342900"/>
+            <a:r>
+              <a:rPr lang="en-US" sz="2400" dirty="0" smtClean="0">
+                <a:solidFill>
+                  <a:schemeClr val="bg1">
+                    <a:lumMod val="50000"/>
+                  </a:schemeClr>
+                </a:solidFill>
+              </a:rPr>
+              <a:t>	</a:t>
+            </a:r>
+            <a:r>
+              <a:rPr lang="en-US" dirty="0" smtClean="0">
+                <a:solidFill>
+                  <a:schemeClr val="bg1">
+                    <a:lumMod val="50000"/>
+                  </a:schemeClr>
+                </a:solidFill>
+              </a:rPr>
+              <a:t>switch to the given branch</a:t>
+            </a:r>
+          </a:p>
+          <a:p>
+            <a:pPr marL="342900" indent="-342900">
+              <a:buFont typeface="Wingdings" pitchFamily="2" charset="2"/>
+              <a:buChar char="§"/>
+            </a:pPr>
+            <a:r>
+              <a:rPr lang="en-US" sz="2400" dirty="0" err="1" smtClean="0">
+                <a:solidFill>
+                  <a:schemeClr val="bg1">
+                    <a:lumMod val="50000"/>
+                  </a:schemeClr>
+                </a:solidFill>
+              </a:rPr>
+              <a:t>git</a:t>
+            </a:r>
+            <a:r>
+              <a:rPr lang="en-US" sz="2400" dirty="0" smtClean="0">
+                <a:solidFill>
+                  <a:schemeClr val="bg1">
+                    <a:lumMod val="50000"/>
+                  </a:schemeClr>
+                </a:solidFill>
+              </a:rPr>
+              <a:t> reset &lt;file name&gt;</a:t>
+            </a:r>
+          </a:p>
+          <a:p>
+            <a:pPr marL="342900" indent="-342900"/>
+            <a:r>
+              <a:rPr lang="en-US" dirty="0" smtClean="0">
+                <a:solidFill>
+                  <a:schemeClr val="bg1">
+                    <a:lumMod val="50000"/>
+                  </a:schemeClr>
+                </a:solidFill>
+              </a:rPr>
+              <a:t>	</a:t>
+            </a:r>
+            <a:r>
+              <a:rPr lang="en-US" dirty="0" err="1" smtClean="0">
+                <a:solidFill>
+                  <a:schemeClr val="bg1">
+                    <a:lumMod val="50000"/>
+                  </a:schemeClr>
+                </a:solidFill>
+              </a:rPr>
+              <a:t>unstage</a:t>
+            </a:r>
+            <a:r>
+              <a:rPr lang="en-US" dirty="0" smtClean="0">
+                <a:solidFill>
+                  <a:schemeClr val="bg1">
+                    <a:lumMod val="50000"/>
+                  </a:schemeClr>
+                </a:solidFill>
+              </a:rPr>
+              <a:t> but keeps the changes in the working </a:t>
+            </a:r>
+            <a:r>
+              <a:rPr lang="en-US" dirty="0" err="1" smtClean="0">
+                <a:solidFill>
+                  <a:schemeClr val="bg1">
+                    <a:lumMod val="50000"/>
+                  </a:schemeClr>
+                </a:solidFill>
+              </a:rPr>
+              <a:t>derectory</a:t>
+            </a:r>
+            <a:r>
+              <a:rPr lang="en-US" dirty="0" smtClean="0">
+                <a:solidFill>
+                  <a:schemeClr val="bg1">
+                    <a:lumMod val="50000"/>
+                  </a:schemeClr>
+                </a:solidFill>
+              </a:rPr>
+              <a:t> for the given file</a:t>
+            </a:r>
+          </a:p>
+          <a:p>
+            <a:pPr marL="342900" indent="-342900">
+              <a:buFont typeface="Wingdings" pitchFamily="2" charset="2"/>
+              <a:buChar char="§"/>
+            </a:pPr>
+            <a:r>
+              <a:rPr lang="en-US" sz="2400" dirty="0" err="1" smtClean="0">
+                <a:solidFill>
+                  <a:schemeClr val="bg1">
+                    <a:lumMod val="50000"/>
+                  </a:schemeClr>
+                </a:solidFill>
+              </a:rPr>
+              <a:t>git</a:t>
+            </a:r>
+            <a:r>
+              <a:rPr lang="en-US" sz="2400" dirty="0" smtClean="0">
+                <a:solidFill>
+                  <a:schemeClr val="bg1">
+                    <a:lumMod val="50000"/>
+                  </a:schemeClr>
+                </a:solidFill>
+              </a:rPr>
+              <a:t> restore --stage &lt;filename&gt;</a:t>
+            </a:r>
+          </a:p>
+          <a:p>
+            <a:pPr marL="342900" indent="-342900"/>
+            <a:r>
+              <a:rPr lang="en-US" dirty="0" smtClean="0">
+                <a:solidFill>
+                  <a:schemeClr val="bg1">
+                    <a:lumMod val="50000"/>
+                  </a:schemeClr>
+                </a:solidFill>
+              </a:rPr>
+              <a:t>	</a:t>
+            </a:r>
+            <a:r>
+              <a:rPr lang="en-US" dirty="0" err="1" smtClean="0">
+                <a:solidFill>
+                  <a:schemeClr val="bg1">
+                    <a:lumMod val="50000"/>
+                  </a:schemeClr>
+                </a:solidFill>
+              </a:rPr>
+              <a:t>unstage</a:t>
+            </a:r>
+            <a:r>
+              <a:rPr lang="en-US" dirty="0" smtClean="0">
+                <a:solidFill>
+                  <a:schemeClr val="bg1">
+                    <a:lumMod val="50000"/>
+                  </a:schemeClr>
+                </a:solidFill>
+              </a:rPr>
+              <a:t> and undo changes from the working directory</a:t>
+            </a:r>
+          </a:p>
+          <a:p>
+            <a:pPr marL="342900" indent="-342900">
+              <a:buFont typeface="Wingdings" pitchFamily="2" charset="2"/>
+              <a:buChar char="§"/>
+            </a:pPr>
+            <a:r>
+              <a:rPr lang="en-US" sz="2400" dirty="0" err="1" smtClean="0">
+                <a:solidFill>
+                  <a:schemeClr val="bg1">
+                    <a:lumMod val="50000"/>
+                  </a:schemeClr>
+                </a:solidFill>
+              </a:rPr>
+              <a:t>git</a:t>
+            </a:r>
+            <a:r>
+              <a:rPr lang="en-US" sz="2400" dirty="0" smtClean="0">
+                <a:solidFill>
+                  <a:schemeClr val="bg1">
+                    <a:lumMod val="50000"/>
+                  </a:schemeClr>
+                </a:solidFill>
+              </a:rPr>
+              <a:t> reset head~1</a:t>
+            </a:r>
+          </a:p>
+          <a:p>
+            <a:pPr marL="342900" indent="-342900"/>
+            <a:r>
+              <a:rPr lang="en-US" dirty="0" smtClean="0">
+                <a:solidFill>
+                  <a:schemeClr val="bg1">
+                    <a:lumMod val="50000"/>
+                  </a:schemeClr>
+                </a:solidFill>
+              </a:rPr>
+              <a:t>	undoing your last one commit</a:t>
+            </a:r>
+          </a:p>
+          <a:p>
+            <a:pPr marL="342900" indent="-342900"/>
+            <a:endParaRPr lang="en-US" dirty="0" smtClean="0">
+              <a:solidFill>
+                <a:schemeClr val="bg1">
+                  <a:lumMod val="50000"/>
+                </a:schemeClr>
+              </a:solidFill>
+            </a:endParaRPr>
           </a:p>
         </p:txBody>
       </p:sp>
     </p:spTree>
     <p:extLst>
       <p:ext uri="{BB962C8B-B14F-4D97-AF65-F5344CB8AC3E}">
-        <p14:creationId xmlns:p14="http://schemas.microsoft.com/office/powerpoint/2010/main" val="1699318202"/>
+        <p14:creationId xmlns:p14="http://schemas.microsoft.com/office/powerpoint/2010/main" xmlns="" val="1591769494"/>
       </p:ext>
     </p:extLst>
   </p:cSld>
@@ -6595,10 +7045,10 @@
       </p:grpSpPr>
       <p:sp>
         <p:nvSpPr>
-          <p:cNvPr id="5" name="TextBox 4">
-            <a:extLst>
-              <a:ext uri="{FF2B5EF4-FFF2-40B4-BE49-F238E27FC236}">
-                <a16:creationId xmlns:a16="http://schemas.microsoft.com/office/drawing/2014/main" id="{342270AA-492E-468C-B5DF-D005AB39834E}"/>
+          <p:cNvPr id="2" name="TextBox 1">
+            <a:extLst>
+              <a:ext uri="{FF2B5EF4-FFF2-40B4-BE49-F238E27FC236}">
+                <a16:creationId xmlns:a16="http://schemas.microsoft.com/office/drawing/2014/main" xmlns="" id="{8DA34F60-C036-4B57-8DAB-1153FCC4B013}"/>
               </a:ext>
             </a:extLst>
           </p:cNvPr>
@@ -6607,8 +7057,8 @@
         </p:nvSpPr>
         <p:spPr>
           <a:xfrm>
-            <a:off x="10159" y="2794000"/>
-            <a:ext cx="12181841" cy="1015663"/>
+            <a:off x="4500880" y="558800"/>
+            <a:ext cx="2631440" cy="833120"/>
           </a:xfrm>
           <a:prstGeom prst="rect">
             <a:avLst/>
@@ -6621,16 +7071,228 @@
           </a:bodyPr>
           <a:lstStyle/>
           <a:p>
+            <a:endParaRPr lang="en-US" dirty="0"/>
+          </a:p>
+        </p:txBody>
+      </p:sp>
+      <p:sp>
+        <p:nvSpPr>
+          <p:cNvPr id="3" name="TextBox 2">
+            <a:extLst>
+              <a:ext uri="{FF2B5EF4-FFF2-40B4-BE49-F238E27FC236}">
+                <a16:creationId xmlns:a16="http://schemas.microsoft.com/office/drawing/2014/main" xmlns="" id="{B544C6B0-EF6C-4250-91BF-FF09779362BA}"/>
+              </a:ext>
+            </a:extLst>
+          </p:cNvPr>
+          <p:cNvSpPr txBox="1"/>
+          <p:nvPr/>
+        </p:nvSpPr>
+        <p:spPr>
+          <a:xfrm>
+            <a:off x="0" y="182880"/>
+            <a:ext cx="12192000" cy="707886"/>
+          </a:xfrm>
+          <a:prstGeom prst="rect">
+            <a:avLst/>
+          </a:prstGeom>
+          <a:noFill/>
+        </p:spPr>
+        <p:txBody>
+          <a:bodyPr wrap="square" rtlCol="0">
+            <a:spAutoFit/>
+          </a:bodyPr>
+          <a:lstStyle/>
+          <a:p>
             <a:pPr algn="ctr"/>
             <a:r>
-              <a:rPr lang="en-US" sz="6000" b="1" dirty="0">
-                <a:solidFill>
-                  <a:schemeClr val="bg1">
-                    <a:lumMod val="50000"/>
-                  </a:schemeClr>
-                </a:solidFill>
-              </a:rPr>
-              <a:t>Thank You</a:t>
+              <a:rPr lang="en-US" sz="4000" dirty="0" smtClean="0">
+                <a:solidFill>
+                  <a:schemeClr val="bg1">
+                    <a:lumMod val="50000"/>
+                  </a:schemeClr>
+                </a:solidFill>
+              </a:rPr>
+              <a:t>Advanced </a:t>
+            </a:r>
+            <a:r>
+              <a:rPr lang="en-US" sz="4000" dirty="0">
+                <a:solidFill>
+                  <a:schemeClr val="bg1">
+                    <a:lumMod val="50000"/>
+                  </a:schemeClr>
+                </a:solidFill>
+              </a:rPr>
+              <a:t>Git Commands</a:t>
+            </a:r>
+            <a:endParaRPr lang="en-US" sz="4000" b="1" dirty="0">
+              <a:solidFill>
+                <a:schemeClr val="bg1">
+                  <a:lumMod val="50000"/>
+                </a:schemeClr>
+              </a:solidFill>
+              <a:latin typeface="+mj-lt"/>
+            </a:endParaRPr>
+          </a:p>
+        </p:txBody>
+      </p:sp>
+      <p:sp>
+        <p:nvSpPr>
+          <p:cNvPr id="4" name="TextBox 3">
+            <a:extLst>
+              <a:ext uri="{FF2B5EF4-FFF2-40B4-BE49-F238E27FC236}">
+                <a16:creationId xmlns:a16="http://schemas.microsoft.com/office/drawing/2014/main" xmlns="" id="{9B8DFFC6-F5A1-437C-96C6-D9151B948833}"/>
+              </a:ext>
+            </a:extLst>
+          </p:cNvPr>
+          <p:cNvSpPr txBox="1"/>
+          <p:nvPr/>
+        </p:nvSpPr>
+        <p:spPr>
+          <a:xfrm>
+            <a:off x="599440" y="944880"/>
+            <a:ext cx="8564880" cy="2708434"/>
+          </a:xfrm>
+          <a:prstGeom prst="rect">
+            <a:avLst/>
+          </a:prstGeom>
+          <a:noFill/>
+        </p:spPr>
+        <p:txBody>
+          <a:bodyPr wrap="square" rtlCol="0">
+            <a:spAutoFit/>
+          </a:bodyPr>
+          <a:lstStyle/>
+          <a:p>
+            <a:pPr marL="800100" lvl="1" indent="-342900">
+              <a:buFont typeface="Wingdings" panose="05000000000000000000" pitchFamily="2" charset="2"/>
+              <a:buChar char="§"/>
+            </a:pPr>
+            <a:r>
+              <a:rPr lang="en-US" sz="2400" dirty="0">
+                <a:solidFill>
+                  <a:schemeClr val="bg1">
+                    <a:lumMod val="50000"/>
+                  </a:schemeClr>
+                </a:solidFill>
+              </a:rPr>
+              <a:t>Chery-Pick</a:t>
+            </a:r>
+          </a:p>
+          <a:p>
+            <a:pPr lvl="2"/>
+            <a:r>
+              <a:rPr lang="en-US" sz="2400" dirty="0">
+                <a:solidFill>
+                  <a:schemeClr val="bg1">
+                    <a:lumMod val="50000"/>
+                  </a:schemeClr>
+                </a:solidFill>
+              </a:rPr>
+              <a:t>Used for merging a particular commit from one branch to another branch.</a:t>
+            </a:r>
+          </a:p>
+          <a:p>
+            <a:pPr lvl="2"/>
+            <a:endParaRPr lang="en-US" sz="2400" dirty="0">
+              <a:solidFill>
+                <a:schemeClr val="bg1">
+                  <a:lumMod val="50000"/>
+                </a:schemeClr>
+              </a:solidFill>
+            </a:endParaRPr>
+          </a:p>
+          <a:p>
+            <a:pPr marL="1371600" lvl="2" indent="-457200">
+              <a:buFont typeface="+mj-lt"/>
+              <a:buAutoNum type="arabicPeriod"/>
+            </a:pPr>
+            <a:r>
+              <a:rPr lang="en-US" dirty="0">
+                <a:solidFill>
+                  <a:schemeClr val="bg1">
+                    <a:lumMod val="50000"/>
+                  </a:schemeClr>
+                </a:solidFill>
+              </a:rPr>
+              <a:t>First you need to checkout to the target branch </a:t>
+            </a:r>
+          </a:p>
+          <a:p>
+            <a:pPr marL="1371600" lvl="2" indent="-457200">
+              <a:buFont typeface="+mj-lt"/>
+              <a:buAutoNum type="arabicPeriod"/>
+            </a:pPr>
+            <a:r>
+              <a:rPr lang="en-US" dirty="0">
+                <a:solidFill>
+                  <a:schemeClr val="bg1">
+                    <a:lumMod val="50000"/>
+                  </a:schemeClr>
+                </a:solidFill>
+              </a:rPr>
+              <a:t>Use command-</a:t>
+            </a:r>
+          </a:p>
+          <a:p>
+            <a:pPr marL="1371600" lvl="2" indent="-457200">
+              <a:buFont typeface="+mj-lt"/>
+              <a:buAutoNum type="arabicPeriod"/>
+            </a:pPr>
+            <a:r>
+              <a:rPr lang="en-US" dirty="0">
+                <a:solidFill>
+                  <a:schemeClr val="bg1">
+                    <a:lumMod val="50000"/>
+                  </a:schemeClr>
+                </a:solidFill>
+              </a:rPr>
+              <a:t>	git cherry-pick &lt;</a:t>
+            </a:r>
+            <a:r>
+              <a:rPr lang="en-US" dirty="0" err="1">
+                <a:solidFill>
+                  <a:schemeClr val="bg1">
+                    <a:lumMod val="50000"/>
+                  </a:schemeClr>
+                </a:solidFill>
+              </a:rPr>
+              <a:t>commitid</a:t>
+            </a:r>
+            <a:r>
+              <a:rPr lang="en-US" dirty="0">
+                <a:solidFill>
+                  <a:schemeClr val="bg1">
+                    <a:lumMod val="50000"/>
+                  </a:schemeClr>
+                </a:solidFill>
+              </a:rPr>
+              <a:t>&gt;</a:t>
+            </a:r>
+          </a:p>
+          <a:p>
+            <a:pPr marL="1371600" lvl="2" indent="-457200">
+              <a:buFont typeface="+mj-lt"/>
+              <a:buAutoNum type="arabicPeriod"/>
+            </a:pPr>
+            <a:r>
+              <a:rPr lang="en-US" sz="1400" dirty="0">
+                <a:solidFill>
+                  <a:schemeClr val="bg1">
+                    <a:lumMod val="50000"/>
+                  </a:schemeClr>
+                </a:solidFill>
+              </a:rPr>
+              <a:t>Co</a:t>
+            </a:r>
+            <a:r>
+              <a:rPr lang="en-US" dirty="0">
+                <a:solidFill>
+                  <a:schemeClr val="bg1">
+                    <a:lumMod val="50000"/>
+                  </a:schemeClr>
+                </a:solidFill>
+              </a:rPr>
+              <a:t>mmit the changes and push it to remote target branch</a:t>
             </a:r>
           </a:p>
         </p:txBody>
@@ -6638,7 +7300,390 @@
     </p:spTree>
     <p:extLst>
       <p:ext uri="{BB962C8B-B14F-4D97-AF65-F5344CB8AC3E}">
-        <p14:creationId xmlns:p14="http://schemas.microsoft.com/office/powerpoint/2010/main" val="3981335253"/>
+        <p14:creationId xmlns:p14="http://schemas.microsoft.com/office/powerpoint/2010/main" xmlns="" val="1380878122"/>
+      </p:ext>
+    </p:extLst>
+  </p:cSld>
+  <p:clrMapOvr>
+    <a:masterClrMapping/>
+  </p:clrMapOvr>
+</p:sld>
+</file>
+
+<file path=ppt/slides/slide23.xml><?xml version="1.0" encoding="utf-8"?>
+<p:sld xmlns:a="http://schemas.openxmlformats.org/drawingml/2006/main" xmlns:r="http://schemas.openxmlformats.org/officeDocument/2006/relationships" xmlns:p="http://schemas.openxmlformats.org/presentationml/2006/main">
+  <p:cSld>
+    <p:spTree>
+      <p:nvGrpSpPr>
+        <p:cNvPr id="1" name=""/>
+        <p:cNvGrpSpPr/>
+        <p:nvPr/>
+      </p:nvGrpSpPr>
+      <p:grpSpPr>
+        <a:xfrm>
+          <a:off x="0" y="0"/>
+          <a:ext cx="0" cy="0"/>
+          <a:chOff x="0" y="0"/>
+          <a:chExt cx="0" cy="0"/>
+        </a:xfrm>
+      </p:grpSpPr>
+      <p:sp>
+        <p:nvSpPr>
+          <p:cNvPr id="2" name="TextBox 1">
+            <a:extLst>
+              <a:ext uri="{FF2B5EF4-FFF2-40B4-BE49-F238E27FC236}">
+                <a16:creationId xmlns:a16="http://schemas.microsoft.com/office/drawing/2014/main" xmlns="" id="{8DA34F60-C036-4B57-8DAB-1153FCC4B013}"/>
+              </a:ext>
+            </a:extLst>
+          </p:cNvPr>
+          <p:cNvSpPr txBox="1"/>
+          <p:nvPr/>
+        </p:nvSpPr>
+        <p:spPr>
+          <a:xfrm>
+            <a:off x="4500880" y="558800"/>
+            <a:ext cx="2631440" cy="833120"/>
+          </a:xfrm>
+          <a:prstGeom prst="rect">
+            <a:avLst/>
+          </a:prstGeom>
+          <a:noFill/>
+        </p:spPr>
+        <p:txBody>
+          <a:bodyPr wrap="square" rtlCol="0">
+            <a:spAutoFit/>
+          </a:bodyPr>
+          <a:lstStyle/>
+          <a:p>
+            <a:endParaRPr lang="en-US" dirty="0"/>
+          </a:p>
+        </p:txBody>
+      </p:sp>
+      <p:sp>
+        <p:nvSpPr>
+          <p:cNvPr id="3" name="TextBox 2">
+            <a:extLst>
+              <a:ext uri="{FF2B5EF4-FFF2-40B4-BE49-F238E27FC236}">
+                <a16:creationId xmlns:a16="http://schemas.microsoft.com/office/drawing/2014/main" xmlns="" id="{B544C6B0-EF6C-4250-91BF-FF09779362BA}"/>
+              </a:ext>
+            </a:extLst>
+          </p:cNvPr>
+          <p:cNvSpPr txBox="1"/>
+          <p:nvPr/>
+        </p:nvSpPr>
+        <p:spPr>
+          <a:xfrm>
+            <a:off x="0" y="182880"/>
+            <a:ext cx="12192000" cy="707886"/>
+          </a:xfrm>
+          <a:prstGeom prst="rect">
+            <a:avLst/>
+          </a:prstGeom>
+          <a:noFill/>
+        </p:spPr>
+        <p:txBody>
+          <a:bodyPr wrap="square" rtlCol="0">
+            <a:spAutoFit/>
+          </a:bodyPr>
+          <a:lstStyle/>
+          <a:p>
+            <a:pPr algn="ctr"/>
+            <a:r>
+              <a:rPr lang="en-US" sz="4000" dirty="0" smtClean="0">
+                <a:solidFill>
+                  <a:schemeClr val="bg1">
+                    <a:lumMod val="50000"/>
+                  </a:schemeClr>
+                </a:solidFill>
+              </a:rPr>
+              <a:t>Continuous Integration -Jenkins</a:t>
+            </a:r>
+          </a:p>
+        </p:txBody>
+      </p:sp>
+      <p:pic>
+        <p:nvPicPr>
+          <p:cNvPr id="1026" name="Picture 2"/>
+          <p:cNvPicPr>
+            <a:picLocks noChangeAspect="1" noChangeArrowheads="1"/>
+          </p:cNvPicPr>
+          <p:nvPr/>
+        </p:nvPicPr>
+        <p:blipFill>
+          <a:blip r:embed="rId2"/>
+          <a:srcRect/>
+          <a:stretch>
+            <a:fillRect/>
+          </a:stretch>
+        </p:blipFill>
+        <p:spPr bwMode="auto">
+          <a:xfrm>
+            <a:off x="2687782" y="1181099"/>
+            <a:ext cx="7370618" cy="5510645"/>
+          </a:xfrm>
+          <a:prstGeom prst="rect">
+            <a:avLst/>
+          </a:prstGeom>
+          <a:noFill/>
+          <a:ln w="9525">
+            <a:noFill/>
+            <a:miter lim="800000"/>
+            <a:headEnd/>
+            <a:tailEnd/>
+          </a:ln>
+          <a:effectLst/>
+        </p:spPr>
+      </p:pic>
+    </p:spTree>
+    <p:extLst>
+      <p:ext uri="{BB962C8B-B14F-4D97-AF65-F5344CB8AC3E}">
+        <p14:creationId xmlns:p14="http://schemas.microsoft.com/office/powerpoint/2010/main" xmlns="" val="1380878122"/>
+      </p:ext>
+    </p:extLst>
+  </p:cSld>
+  <p:clrMapOvr>
+    <a:masterClrMapping/>
+  </p:clrMapOvr>
+</p:sld>
+</file>
+
+<file path=ppt/slides/slide24.xml><?xml version="1.0" encoding="utf-8"?>
+<p:sld xmlns:a="http://schemas.openxmlformats.org/drawingml/2006/main" xmlns:r="http://schemas.openxmlformats.org/officeDocument/2006/relationships" xmlns:p="http://schemas.openxmlformats.org/presentationml/2006/main">
+  <p:cSld>
+    <p:spTree>
+      <p:nvGrpSpPr>
+        <p:cNvPr id="1" name=""/>
+        <p:cNvGrpSpPr/>
+        <p:nvPr/>
+      </p:nvGrpSpPr>
+      <p:grpSpPr>
+        <a:xfrm>
+          <a:off x="0" y="0"/>
+          <a:ext cx="0" cy="0"/>
+          <a:chOff x="0" y="0"/>
+          <a:chExt cx="0" cy="0"/>
+        </a:xfrm>
+      </p:grpSpPr>
+      <p:sp>
+        <p:nvSpPr>
+          <p:cNvPr id="3" name="TextBox 2">
+            <a:extLst>
+              <a:ext uri="{FF2B5EF4-FFF2-40B4-BE49-F238E27FC236}">
+                <a16:creationId xmlns:a16="http://schemas.microsoft.com/office/drawing/2014/main" xmlns="" id="{B544C6B0-EF6C-4250-91BF-FF09779362BA}"/>
+              </a:ext>
+            </a:extLst>
+          </p:cNvPr>
+          <p:cNvSpPr txBox="1"/>
+          <p:nvPr/>
+        </p:nvSpPr>
+        <p:spPr>
+          <a:xfrm>
+            <a:off x="0" y="182880"/>
+            <a:ext cx="12192000" cy="707886"/>
+          </a:xfrm>
+          <a:prstGeom prst="rect">
+            <a:avLst/>
+          </a:prstGeom>
+          <a:noFill/>
+        </p:spPr>
+        <p:txBody>
+          <a:bodyPr wrap="square" rtlCol="0">
+            <a:spAutoFit/>
+          </a:bodyPr>
+          <a:lstStyle/>
+          <a:p>
+            <a:pPr algn="ctr"/>
+            <a:r>
+              <a:rPr lang="en-US" sz="4000" dirty="0" smtClean="0">
+                <a:solidFill>
+                  <a:schemeClr val="bg1">
+                    <a:lumMod val="50000"/>
+                  </a:schemeClr>
+                </a:solidFill>
+              </a:rPr>
+              <a:t>Agenda </a:t>
+            </a:r>
+          </a:p>
+        </p:txBody>
+      </p:sp>
+      <p:sp>
+        <p:nvSpPr>
+          <p:cNvPr id="4" name="TextBox 3"/>
+          <p:cNvSpPr txBox="1"/>
+          <p:nvPr/>
+        </p:nvSpPr>
+        <p:spPr>
+          <a:xfrm>
+            <a:off x="3186629" y="1399308"/>
+            <a:ext cx="6664035" cy="2308324"/>
+          </a:xfrm>
+          <a:prstGeom prst="rect">
+            <a:avLst/>
+          </a:prstGeom>
+          <a:noFill/>
+        </p:spPr>
+        <p:txBody>
+          <a:bodyPr wrap="square" rtlCol="0">
+            <a:spAutoFit/>
+          </a:bodyPr>
+          <a:lstStyle/>
+          <a:p>
+            <a:r>
+              <a:rPr lang="en-US" sz="2400" b="1" dirty="0" smtClean="0">
+                <a:solidFill>
+                  <a:schemeClr val="bg1">
+                    <a:lumMod val="50000"/>
+                  </a:schemeClr>
+                </a:solidFill>
+              </a:rPr>
+              <a:t>1. Why Continuous integration?</a:t>
+            </a:r>
+          </a:p>
+          <a:p>
+            <a:r>
+              <a:rPr lang="en-US" sz="2400" b="1" dirty="0" smtClean="0">
+                <a:solidFill>
+                  <a:schemeClr val="bg1">
+                    <a:lumMod val="50000"/>
+                  </a:schemeClr>
+                </a:solidFill>
+              </a:rPr>
+              <a:t>2. What is Jenkins?</a:t>
+            </a:r>
+          </a:p>
+          <a:p>
+            <a:r>
+              <a:rPr lang="en-US" sz="2400" b="1" dirty="0" smtClean="0">
+                <a:solidFill>
+                  <a:schemeClr val="bg1">
+                    <a:lumMod val="50000"/>
+                  </a:schemeClr>
+                </a:solidFill>
+              </a:rPr>
+              <a:t>3. What are Jenkins Features?</a:t>
+            </a:r>
+          </a:p>
+          <a:p>
+            <a:r>
+              <a:rPr lang="en-US" sz="2400" b="1" dirty="0" smtClean="0">
+                <a:solidFill>
+                  <a:schemeClr val="bg1">
+                    <a:lumMod val="50000"/>
+                  </a:schemeClr>
+                </a:solidFill>
+              </a:rPr>
+              <a:t>4. Jenkins architecture</a:t>
+            </a:r>
+          </a:p>
+          <a:p>
+            <a:r>
+              <a:rPr lang="en-US" sz="2400" b="1" dirty="0" smtClean="0">
+                <a:solidFill>
+                  <a:schemeClr val="bg1">
+                    <a:lumMod val="50000"/>
+                  </a:schemeClr>
+                </a:solidFill>
+              </a:rPr>
+              <a:t>5. Jenkins installation &amp; setup</a:t>
+            </a:r>
+          </a:p>
+          <a:p>
+            <a:r>
+              <a:rPr lang="en-US" sz="2400" b="1" dirty="0" smtClean="0">
+                <a:solidFill>
+                  <a:schemeClr val="bg1">
+                    <a:lumMod val="50000"/>
+                  </a:schemeClr>
+                </a:solidFill>
+              </a:rPr>
+              <a:t>6. Setting up a CI/CD pipeline</a:t>
+            </a:r>
+            <a:endParaRPr lang="en-US" sz="2400" dirty="0">
+              <a:solidFill>
+                <a:schemeClr val="bg1">
+                  <a:lumMod val="50000"/>
+                </a:schemeClr>
+              </a:solidFill>
+            </a:endParaRPr>
+          </a:p>
+        </p:txBody>
+      </p:sp>
+    </p:spTree>
+    <p:extLst>
+      <p:ext uri="{BB962C8B-B14F-4D97-AF65-F5344CB8AC3E}">
+        <p14:creationId xmlns:p14="http://schemas.microsoft.com/office/powerpoint/2010/main" xmlns="" val="1380878122"/>
+      </p:ext>
+    </p:extLst>
+  </p:cSld>
+  <p:clrMapOvr>
+    <a:masterClrMapping/>
+  </p:clrMapOvr>
+</p:sld>
+</file>
+
+<file path=ppt/slides/slide25.xml><?xml version="1.0" encoding="utf-8"?>
+<p:sld xmlns:a="http://schemas.openxmlformats.org/drawingml/2006/main" xmlns:r="http://schemas.openxmlformats.org/officeDocument/2006/relationships" xmlns:p="http://schemas.openxmlformats.org/presentationml/2006/main">
+  <p:cSld>
+    <p:spTree>
+      <p:nvGrpSpPr>
+        <p:cNvPr id="1" name=""/>
+        <p:cNvGrpSpPr/>
+        <p:nvPr/>
+      </p:nvGrpSpPr>
+      <p:grpSpPr>
+        <a:xfrm>
+          <a:off x="0" y="0"/>
+          <a:ext cx="0" cy="0"/>
+          <a:chOff x="0" y="0"/>
+          <a:chExt cx="0" cy="0"/>
+        </a:xfrm>
+      </p:grpSpPr>
+      <p:sp>
+        <p:nvSpPr>
+          <p:cNvPr id="5" name="TextBox 4">
+            <a:extLst>
+              <a:ext uri="{FF2B5EF4-FFF2-40B4-BE49-F238E27FC236}">
+                <a16:creationId xmlns:a16="http://schemas.microsoft.com/office/drawing/2014/main" xmlns="" id="{342270AA-492E-468C-B5DF-D005AB39834E}"/>
+              </a:ext>
+            </a:extLst>
+          </p:cNvPr>
+          <p:cNvSpPr txBox="1"/>
+          <p:nvPr/>
+        </p:nvSpPr>
+        <p:spPr>
+          <a:xfrm>
+            <a:off x="10159" y="2794000"/>
+            <a:ext cx="12181841" cy="1015663"/>
+          </a:xfrm>
+          <a:prstGeom prst="rect">
+            <a:avLst/>
+          </a:prstGeom>
+          <a:noFill/>
+        </p:spPr>
+        <p:txBody>
+          <a:bodyPr wrap="square" rtlCol="0">
+            <a:spAutoFit/>
+          </a:bodyPr>
+          <a:lstStyle/>
+          <a:p>
+            <a:pPr algn="ctr"/>
+            <a:r>
+              <a:rPr lang="en-US" sz="6000" b="1" dirty="0">
+                <a:solidFill>
+                  <a:schemeClr val="bg1">
+                    <a:lumMod val="50000"/>
+                  </a:schemeClr>
+                </a:solidFill>
+              </a:rPr>
+              <a:t>Thank You</a:t>
+            </a:r>
+          </a:p>
+        </p:txBody>
+      </p:sp>
+    </p:spTree>
+    <p:extLst>
+      <p:ext uri="{BB962C8B-B14F-4D97-AF65-F5344CB8AC3E}">
+        <p14:creationId xmlns:p14="http://schemas.microsoft.com/office/powerpoint/2010/main" xmlns="" val="3981335253"/>
       </p:ext>
     </p:extLst>
   </p:cSld>
@@ -6670,7 +7715,7 @@
           <p:cNvPr id="5" name="TextBox 4">
             <a:extLst>
               <a:ext uri="{FF2B5EF4-FFF2-40B4-BE49-F238E27FC236}">
-                <a16:creationId xmlns:a16="http://schemas.microsoft.com/office/drawing/2014/main" id="{342270AA-492E-468C-B5DF-D005AB39834E}"/>
+                <a16:creationId xmlns:a16="http://schemas.microsoft.com/office/drawing/2014/main" xmlns="" id="{342270AA-492E-468C-B5DF-D005AB39834E}"/>
               </a:ext>
             </a:extLst>
           </p:cNvPr>
@@ -6712,7 +7757,7 @@
           <p:cNvPr id="4" name="Picture 3">
             <a:extLst>
               <a:ext uri="{FF2B5EF4-FFF2-40B4-BE49-F238E27FC236}">
-                <a16:creationId xmlns:a16="http://schemas.microsoft.com/office/drawing/2014/main" id="{B9C8FE3E-35D3-4129-8633-6BE0E6E26E9A}"/>
+                <a16:creationId xmlns:a16="http://schemas.microsoft.com/office/drawing/2014/main" xmlns="" id="{B9C8FE3E-35D3-4129-8633-6BE0E6E26E9A}"/>
               </a:ext>
             </a:extLst>
           </p:cNvPr>
@@ -6740,7 +7785,7 @@
     </p:spTree>
     <p:extLst>
       <p:ext uri="{BB962C8B-B14F-4D97-AF65-F5344CB8AC3E}">
-        <p14:creationId xmlns:p14="http://schemas.microsoft.com/office/powerpoint/2010/main" val="1193679221"/>
+        <p14:creationId xmlns:p14="http://schemas.microsoft.com/office/powerpoint/2010/main" xmlns="" val="1193679221"/>
       </p:ext>
     </p:extLst>
   </p:cSld>
@@ -6772,7 +7817,7 @@
           <p:cNvPr id="2" name="TextBox 1">
             <a:extLst>
               <a:ext uri="{FF2B5EF4-FFF2-40B4-BE49-F238E27FC236}">
-                <a16:creationId xmlns:a16="http://schemas.microsoft.com/office/drawing/2014/main" id="{8DA34F60-C036-4B57-8DAB-1153FCC4B013}"/>
+                <a16:creationId xmlns:a16="http://schemas.microsoft.com/office/drawing/2014/main" xmlns="" id="{8DA34F60-C036-4B57-8DAB-1153FCC4B013}"/>
               </a:ext>
             </a:extLst>
           </p:cNvPr>
@@ -6804,7 +7849,7 @@
           <p:cNvPr id="3" name="TextBox 2">
             <a:extLst>
               <a:ext uri="{FF2B5EF4-FFF2-40B4-BE49-F238E27FC236}">
-                <a16:creationId xmlns:a16="http://schemas.microsoft.com/office/drawing/2014/main" id="{B544C6B0-EF6C-4250-91BF-FF09779362BA}"/>
+                <a16:creationId xmlns:a16="http://schemas.microsoft.com/office/drawing/2014/main" xmlns="" id="{B544C6B0-EF6C-4250-91BF-FF09779362BA}"/>
               </a:ext>
             </a:extLst>
           </p:cNvPr>
@@ -6847,7 +7892,7 @@
           <p:cNvPr id="6" name="Picture 5">
             <a:extLst>
               <a:ext uri="{FF2B5EF4-FFF2-40B4-BE49-F238E27FC236}">
-                <a16:creationId xmlns:a16="http://schemas.microsoft.com/office/drawing/2014/main" id="{3EAF93C3-FEA4-4E5F-A9E8-EA07466836E3}"/>
+                <a16:creationId xmlns:a16="http://schemas.microsoft.com/office/drawing/2014/main" xmlns="" id="{3EAF93C3-FEA4-4E5F-A9E8-EA07466836E3}"/>
               </a:ext>
             </a:extLst>
           </p:cNvPr>
@@ -6877,7 +7922,7 @@
           <p:cNvPr id="7" name="TextBox 6">
             <a:extLst>
               <a:ext uri="{FF2B5EF4-FFF2-40B4-BE49-F238E27FC236}">
-                <a16:creationId xmlns:a16="http://schemas.microsoft.com/office/drawing/2014/main" id="{5205BA0B-441B-4D66-A356-F6C0076D797D}"/>
+                <a16:creationId xmlns:a16="http://schemas.microsoft.com/office/drawing/2014/main" xmlns="" id="{5205BA0B-441B-4D66-A356-F6C0076D797D}"/>
               </a:ext>
             </a:extLst>
           </p:cNvPr>
@@ -6963,7 +8008,7 @@
     </p:spTree>
     <p:extLst>
       <p:ext uri="{BB962C8B-B14F-4D97-AF65-F5344CB8AC3E}">
-        <p14:creationId xmlns:p14="http://schemas.microsoft.com/office/powerpoint/2010/main" val="4199085327"/>
+        <p14:creationId xmlns:p14="http://schemas.microsoft.com/office/powerpoint/2010/main" xmlns="" val="4199085327"/>
       </p:ext>
     </p:extLst>
   </p:cSld>
@@ -6995,7 +8040,7 @@
           <p:cNvPr id="2" name="TextBox 1">
             <a:extLst>
               <a:ext uri="{FF2B5EF4-FFF2-40B4-BE49-F238E27FC236}">
-                <a16:creationId xmlns:a16="http://schemas.microsoft.com/office/drawing/2014/main" id="{8DA34F60-C036-4B57-8DAB-1153FCC4B013}"/>
+                <a16:creationId xmlns:a16="http://schemas.microsoft.com/office/drawing/2014/main" xmlns="" id="{8DA34F60-C036-4B57-8DAB-1153FCC4B013}"/>
               </a:ext>
             </a:extLst>
           </p:cNvPr>
@@ -7027,7 +8072,7 @@
           <p:cNvPr id="3" name="TextBox 2">
             <a:extLst>
               <a:ext uri="{FF2B5EF4-FFF2-40B4-BE49-F238E27FC236}">
-                <a16:creationId xmlns:a16="http://schemas.microsoft.com/office/drawing/2014/main" id="{B544C6B0-EF6C-4250-91BF-FF09779362BA}"/>
+                <a16:creationId xmlns:a16="http://schemas.microsoft.com/office/drawing/2014/main" xmlns="" id="{B544C6B0-EF6C-4250-91BF-FF09779362BA}"/>
               </a:ext>
             </a:extLst>
           </p:cNvPr>
@@ -7077,7 +8122,7 @@
           <p:cNvPr id="4" name="Picture 3">
             <a:extLst>
               <a:ext uri="{FF2B5EF4-FFF2-40B4-BE49-F238E27FC236}">
-                <a16:creationId xmlns:a16="http://schemas.microsoft.com/office/drawing/2014/main" id="{A18C768D-3280-4CCA-8703-8E8F8F3D35B7}"/>
+                <a16:creationId xmlns:a16="http://schemas.microsoft.com/office/drawing/2014/main" xmlns="" id="{A18C768D-3280-4CCA-8703-8E8F8F3D35B7}"/>
               </a:ext>
             </a:extLst>
           </p:cNvPr>
@@ -7105,7 +8150,7 @@
     </p:spTree>
     <p:extLst>
       <p:ext uri="{BB962C8B-B14F-4D97-AF65-F5344CB8AC3E}">
-        <p14:creationId xmlns:p14="http://schemas.microsoft.com/office/powerpoint/2010/main" val="2637947620"/>
+        <p14:creationId xmlns:p14="http://schemas.microsoft.com/office/powerpoint/2010/main" xmlns="" val="2637947620"/>
       </p:ext>
     </p:extLst>
   </p:cSld>
@@ -7137,7 +8182,7 @@
           <p:cNvPr id="3" name="TextBox 2">
             <a:extLst>
               <a:ext uri="{FF2B5EF4-FFF2-40B4-BE49-F238E27FC236}">
-                <a16:creationId xmlns:a16="http://schemas.microsoft.com/office/drawing/2014/main" id="{B544C6B0-EF6C-4250-91BF-FF09779362BA}"/>
+                <a16:creationId xmlns:a16="http://schemas.microsoft.com/office/drawing/2014/main" xmlns="" id="{B544C6B0-EF6C-4250-91BF-FF09779362BA}"/>
               </a:ext>
             </a:extLst>
           </p:cNvPr>
@@ -7187,7 +8232,7 @@
           <p:cNvPr id="6" name="TextBox 5">
             <a:extLst>
               <a:ext uri="{FF2B5EF4-FFF2-40B4-BE49-F238E27FC236}">
-                <a16:creationId xmlns:a16="http://schemas.microsoft.com/office/drawing/2014/main" id="{640BB658-D346-4643-A9C7-7F3BD503A7C1}"/>
+                <a16:creationId xmlns:a16="http://schemas.microsoft.com/office/drawing/2014/main" xmlns="" id="{640BB658-D346-4643-A9C7-7F3BD503A7C1}"/>
               </a:ext>
             </a:extLst>
           </p:cNvPr>
@@ -7228,7 +8273,7 @@
           <p:cNvPr id="7" name="Picture 6">
             <a:extLst>
               <a:ext uri="{FF2B5EF4-FFF2-40B4-BE49-F238E27FC236}">
-                <a16:creationId xmlns:a16="http://schemas.microsoft.com/office/drawing/2014/main" id="{FB29A71E-1CB8-4485-B7A9-A1E8C39F6774}"/>
+                <a16:creationId xmlns:a16="http://schemas.microsoft.com/office/drawing/2014/main" xmlns="" id="{FB29A71E-1CB8-4485-B7A9-A1E8C39F6774}"/>
               </a:ext>
             </a:extLst>
           </p:cNvPr>
@@ -7256,7 +8301,7 @@
     </p:spTree>
     <p:extLst>
       <p:ext uri="{BB962C8B-B14F-4D97-AF65-F5344CB8AC3E}">
-        <p14:creationId xmlns:p14="http://schemas.microsoft.com/office/powerpoint/2010/main" val="4142731611"/>
+        <p14:creationId xmlns:p14="http://schemas.microsoft.com/office/powerpoint/2010/main" xmlns="" val="4142731611"/>
       </p:ext>
     </p:extLst>
   </p:cSld>
@@ -7288,7 +8333,7 @@
           <p:cNvPr id="2" name="TextBox 1">
             <a:extLst>
               <a:ext uri="{FF2B5EF4-FFF2-40B4-BE49-F238E27FC236}">
-                <a16:creationId xmlns:a16="http://schemas.microsoft.com/office/drawing/2014/main" id="{8DA34F60-C036-4B57-8DAB-1153FCC4B013}"/>
+                <a16:creationId xmlns:a16="http://schemas.microsoft.com/office/drawing/2014/main" xmlns="" id="{8DA34F60-C036-4B57-8DAB-1153FCC4B013}"/>
               </a:ext>
             </a:extLst>
           </p:cNvPr>
@@ -7320,7 +8365,7 @@
           <p:cNvPr id="3" name="TextBox 2">
             <a:extLst>
               <a:ext uri="{FF2B5EF4-FFF2-40B4-BE49-F238E27FC236}">
-                <a16:creationId xmlns:a16="http://schemas.microsoft.com/office/drawing/2014/main" id="{B544C6B0-EF6C-4250-91BF-FF09779362BA}"/>
+                <a16:creationId xmlns:a16="http://schemas.microsoft.com/office/drawing/2014/main" xmlns="" id="{B544C6B0-EF6C-4250-91BF-FF09779362BA}"/>
               </a:ext>
             </a:extLst>
           </p:cNvPr>
@@ -7370,7 +8415,7 @@
           <p:cNvPr id="5" name="TextBox 4">
             <a:extLst>
               <a:ext uri="{FF2B5EF4-FFF2-40B4-BE49-F238E27FC236}">
-                <a16:creationId xmlns:a16="http://schemas.microsoft.com/office/drawing/2014/main" id="{71212FCE-4877-450F-9633-F9048A38CCF7}"/>
+                <a16:creationId xmlns:a16="http://schemas.microsoft.com/office/drawing/2014/main" xmlns="" id="{71212FCE-4877-450F-9633-F9048A38CCF7}"/>
               </a:ext>
             </a:extLst>
           </p:cNvPr>
@@ -7412,7 +8457,7 @@
           <p:cNvPr id="6" name="Picture 5">
             <a:extLst>
               <a:ext uri="{FF2B5EF4-FFF2-40B4-BE49-F238E27FC236}">
-                <a16:creationId xmlns:a16="http://schemas.microsoft.com/office/drawing/2014/main" id="{360BC874-6D5C-400E-803C-8CDE1D04E0FE}"/>
+                <a16:creationId xmlns:a16="http://schemas.microsoft.com/office/drawing/2014/main" xmlns="" id="{360BC874-6D5C-400E-803C-8CDE1D04E0FE}"/>
               </a:ext>
             </a:extLst>
           </p:cNvPr>
@@ -7440,7 +8485,7 @@
     </p:spTree>
     <p:extLst>
       <p:ext uri="{BB962C8B-B14F-4D97-AF65-F5344CB8AC3E}">
-        <p14:creationId xmlns:p14="http://schemas.microsoft.com/office/powerpoint/2010/main" val="2219346209"/>
+        <p14:creationId xmlns:p14="http://schemas.microsoft.com/office/powerpoint/2010/main" xmlns="" val="2219346209"/>
       </p:ext>
     </p:extLst>
   </p:cSld>
@@ -7472,7 +8517,7 @@
           <p:cNvPr id="2" name="TextBox 1">
             <a:extLst>
               <a:ext uri="{FF2B5EF4-FFF2-40B4-BE49-F238E27FC236}">
-                <a16:creationId xmlns:a16="http://schemas.microsoft.com/office/drawing/2014/main" id="{8DA34F60-C036-4B57-8DAB-1153FCC4B013}"/>
+                <a16:creationId xmlns:a16="http://schemas.microsoft.com/office/drawing/2014/main" xmlns="" id="{8DA34F60-C036-4B57-8DAB-1153FCC4B013}"/>
               </a:ext>
             </a:extLst>
           </p:cNvPr>
@@ -7504,7 +8549,7 @@
           <p:cNvPr id="3" name="TextBox 2">
             <a:extLst>
               <a:ext uri="{FF2B5EF4-FFF2-40B4-BE49-F238E27FC236}">
-                <a16:creationId xmlns:a16="http://schemas.microsoft.com/office/drawing/2014/main" id="{B544C6B0-EF6C-4250-91BF-FF09779362BA}"/>
+                <a16:creationId xmlns:a16="http://schemas.microsoft.com/office/drawing/2014/main" xmlns="" id="{B544C6B0-EF6C-4250-91BF-FF09779362BA}"/>
               </a:ext>
             </a:extLst>
           </p:cNvPr>
@@ -7554,7 +8599,7 @@
           <p:cNvPr id="4" name="Picture 3">
             <a:extLst>
               <a:ext uri="{FF2B5EF4-FFF2-40B4-BE49-F238E27FC236}">
-                <a16:creationId xmlns:a16="http://schemas.microsoft.com/office/drawing/2014/main" id="{C60C186D-9A6C-455F-B568-D87CB97AF63E}"/>
+                <a16:creationId xmlns:a16="http://schemas.microsoft.com/office/drawing/2014/main" xmlns="" id="{C60C186D-9A6C-455F-B568-D87CB97AF63E}"/>
               </a:ext>
             </a:extLst>
           </p:cNvPr>
@@ -7582,7 +8627,7 @@
     </p:spTree>
     <p:extLst>
       <p:ext uri="{BB962C8B-B14F-4D97-AF65-F5344CB8AC3E}">
-        <p14:creationId xmlns:p14="http://schemas.microsoft.com/office/powerpoint/2010/main" val="1411206396"/>
+        <p14:creationId xmlns:p14="http://schemas.microsoft.com/office/powerpoint/2010/main" xmlns="" val="1411206396"/>
       </p:ext>
     </p:extLst>
   </p:cSld>
@@ -7614,7 +8659,7 @@
           <p:cNvPr id="2" name="TextBox 1">
             <a:extLst>
               <a:ext uri="{FF2B5EF4-FFF2-40B4-BE49-F238E27FC236}">
-                <a16:creationId xmlns:a16="http://schemas.microsoft.com/office/drawing/2014/main" id="{8DA34F60-C036-4B57-8DAB-1153FCC4B013}"/>
+                <a16:creationId xmlns:a16="http://schemas.microsoft.com/office/drawing/2014/main" xmlns="" id="{8DA34F60-C036-4B57-8DAB-1153FCC4B013}"/>
               </a:ext>
             </a:extLst>
           </p:cNvPr>
@@ -7646,7 +8691,7 @@
           <p:cNvPr id="3" name="TextBox 2">
             <a:extLst>
               <a:ext uri="{FF2B5EF4-FFF2-40B4-BE49-F238E27FC236}">
-                <a16:creationId xmlns:a16="http://schemas.microsoft.com/office/drawing/2014/main" id="{B544C6B0-EF6C-4250-91BF-FF09779362BA}"/>
+                <a16:creationId xmlns:a16="http://schemas.microsoft.com/office/drawing/2014/main" xmlns="" id="{B544C6B0-EF6C-4250-91BF-FF09779362BA}"/>
               </a:ext>
             </a:extLst>
           </p:cNvPr>
@@ -7696,7 +8741,7 @@
           <p:cNvPr id="4" name="Picture 3">
             <a:extLst>
               <a:ext uri="{FF2B5EF4-FFF2-40B4-BE49-F238E27FC236}">
-                <a16:creationId xmlns:a16="http://schemas.microsoft.com/office/drawing/2014/main" id="{D57C87F1-68AD-4C82-B863-3771DD261942}"/>
+                <a16:creationId xmlns:a16="http://schemas.microsoft.com/office/drawing/2014/main" xmlns="" id="{D57C87F1-68AD-4C82-B863-3771DD261942}"/>
               </a:ext>
             </a:extLst>
           </p:cNvPr>
@@ -7724,7 +8769,7 @@
     </p:spTree>
     <p:extLst>
       <p:ext uri="{BB962C8B-B14F-4D97-AF65-F5344CB8AC3E}">
-        <p14:creationId xmlns:p14="http://schemas.microsoft.com/office/powerpoint/2010/main" val="2783770015"/>
+        <p14:creationId xmlns:p14="http://schemas.microsoft.com/office/powerpoint/2010/main" xmlns="" val="2783770015"/>
       </p:ext>
     </p:extLst>
   </p:cSld>
@@ -7777,7 +8822,7 @@
     </a:clrScheme>
     <a:fontScheme name="Office">
       <a:majorFont>
-        <a:latin typeface="Calibri Light" panose="020F0302020204030204"/>
+        <a:latin typeface="Calibri Light"/>
         <a:ea typeface=""/>
         <a:cs typeface=""/>
         <a:font script="Jpan" typeface="游ゴシック Light"/>
@@ -7829,7 +8874,7 @@
         <a:font script="Tfng" typeface="Ebrima"/>
       </a:majorFont>
       <a:minorFont>
-        <a:latin typeface="Calibri" panose="020F0502020204030204"/>
+        <a:latin typeface="Calibri"/>
         <a:ea typeface=""/>
         <a:cs typeface=""/>
         <a:font script="Jpan" typeface="游ゴシック"/>
@@ -8023,7 +9068,7 @@
   <a:extraClrSchemeLst/>
   <a:extLst>
     <a:ext uri="{05A4C25C-085E-4340-85A3-A5531E510DB2}">
-      <thm15:themeFamily xmlns:thm15="http://schemas.microsoft.com/office/thememl/2012/main" name="Office Theme" id="{62F939B6-93AF-4DB8-9C6B-D6C7DFDC589F}" vid="{4A3C46E8-61CC-4603-A589-7422A47A8E4A}"/>
+      <thm15:themeFamily xmlns:thm15="http://schemas.microsoft.com/office/thememl/2012/main" xmlns="" name="Office Theme" id="{62F939B6-93AF-4DB8-9C6B-D6C7DFDC589F}" vid="{4A3C46E8-61CC-4603-A589-7422A47A8E4A}"/>
     </a:ext>
   </a:extLst>
 </a:theme>

</xml_diff>